<commit_message>
Report, Introduction, Why Zephyr
</commit_message>
<xml_diff>
--- a/0_Report/SchemaBlock.pptx
+++ b/0_Report/SchemaBlock.pptx
@@ -252,7 +252,7 @@
           <a:p>
             <a:fld id="{8A4BC5C4-3B83-4D40-A2F2-85A6DFEA9E29}" type="datetimeFigureOut">
               <a:rPr lang="en-GB" smtClean="0"/>
-              <a:t>08/07/2017</a:t>
+              <a:t>23/07/2017</a:t>
             </a:fld>
             <a:endParaRPr lang="en-GB"/>
           </a:p>
@@ -422,7 +422,7 @@
           <a:p>
             <a:fld id="{8A4BC5C4-3B83-4D40-A2F2-85A6DFEA9E29}" type="datetimeFigureOut">
               <a:rPr lang="en-GB" smtClean="0"/>
-              <a:t>08/07/2017</a:t>
+              <a:t>23/07/2017</a:t>
             </a:fld>
             <a:endParaRPr lang="en-GB"/>
           </a:p>
@@ -602,7 +602,7 @@
           <a:p>
             <a:fld id="{8A4BC5C4-3B83-4D40-A2F2-85A6DFEA9E29}" type="datetimeFigureOut">
               <a:rPr lang="en-GB" smtClean="0"/>
-              <a:t>08/07/2017</a:t>
+              <a:t>23/07/2017</a:t>
             </a:fld>
             <a:endParaRPr lang="en-GB"/>
           </a:p>
@@ -772,7 +772,7 @@
           <a:p>
             <a:fld id="{8A4BC5C4-3B83-4D40-A2F2-85A6DFEA9E29}" type="datetimeFigureOut">
               <a:rPr lang="en-GB" smtClean="0"/>
-              <a:t>08/07/2017</a:t>
+              <a:t>23/07/2017</a:t>
             </a:fld>
             <a:endParaRPr lang="en-GB"/>
           </a:p>
@@ -1018,7 +1018,7 @@
           <a:p>
             <a:fld id="{8A4BC5C4-3B83-4D40-A2F2-85A6DFEA9E29}" type="datetimeFigureOut">
               <a:rPr lang="en-GB" smtClean="0"/>
-              <a:t>08/07/2017</a:t>
+              <a:t>23/07/2017</a:t>
             </a:fld>
             <a:endParaRPr lang="en-GB"/>
           </a:p>
@@ -1250,7 +1250,7 @@
           <a:p>
             <a:fld id="{8A4BC5C4-3B83-4D40-A2F2-85A6DFEA9E29}" type="datetimeFigureOut">
               <a:rPr lang="en-GB" smtClean="0"/>
-              <a:t>08/07/2017</a:t>
+              <a:t>23/07/2017</a:t>
             </a:fld>
             <a:endParaRPr lang="en-GB"/>
           </a:p>
@@ -1617,7 +1617,7 @@
           <a:p>
             <a:fld id="{8A4BC5C4-3B83-4D40-A2F2-85A6DFEA9E29}" type="datetimeFigureOut">
               <a:rPr lang="en-GB" smtClean="0"/>
-              <a:t>08/07/2017</a:t>
+              <a:t>23/07/2017</a:t>
             </a:fld>
             <a:endParaRPr lang="en-GB"/>
           </a:p>
@@ -1735,7 +1735,7 @@
           <a:p>
             <a:fld id="{8A4BC5C4-3B83-4D40-A2F2-85A6DFEA9E29}" type="datetimeFigureOut">
               <a:rPr lang="en-GB" smtClean="0"/>
-              <a:t>08/07/2017</a:t>
+              <a:t>23/07/2017</a:t>
             </a:fld>
             <a:endParaRPr lang="en-GB"/>
           </a:p>
@@ -1830,7 +1830,7 @@
           <a:p>
             <a:fld id="{8A4BC5C4-3B83-4D40-A2F2-85A6DFEA9E29}" type="datetimeFigureOut">
               <a:rPr lang="en-GB" smtClean="0"/>
-              <a:t>08/07/2017</a:t>
+              <a:t>23/07/2017</a:t>
             </a:fld>
             <a:endParaRPr lang="en-GB"/>
           </a:p>
@@ -2107,7 +2107,7 @@
           <a:p>
             <a:fld id="{8A4BC5C4-3B83-4D40-A2F2-85A6DFEA9E29}" type="datetimeFigureOut">
               <a:rPr lang="en-GB" smtClean="0"/>
-              <a:t>08/07/2017</a:t>
+              <a:t>23/07/2017</a:t>
             </a:fld>
             <a:endParaRPr lang="en-GB"/>
           </a:p>
@@ -2360,7 +2360,7 @@
           <a:p>
             <a:fld id="{8A4BC5C4-3B83-4D40-A2F2-85A6DFEA9E29}" type="datetimeFigureOut">
               <a:rPr lang="en-GB" smtClean="0"/>
-              <a:t>08/07/2017</a:t>
+              <a:t>23/07/2017</a:t>
             </a:fld>
             <a:endParaRPr lang="en-GB"/>
           </a:p>
@@ -2573,7 +2573,7 @@
           <a:p>
             <a:fld id="{8A4BC5C4-3B83-4D40-A2F2-85A6DFEA9E29}" type="datetimeFigureOut">
               <a:rPr lang="en-GB" smtClean="0"/>
-              <a:t>08/07/2017</a:t>
+              <a:t>23/07/2017</a:t>
             </a:fld>
             <a:endParaRPr lang="en-GB"/>
           </a:p>
@@ -2986,8 +2986,8 @@
         </p:nvSpPr>
         <p:spPr>
           <a:xfrm>
-            <a:off x="8579404" y="1637996"/>
-            <a:ext cx="3068456" cy="4348003"/>
+            <a:off x="8589376" y="3621751"/>
+            <a:ext cx="3068456" cy="2276796"/>
           </a:xfrm>
           <a:prstGeom prst="roundRect">
             <a:avLst/>
@@ -3018,20 +3018,8 @@
                   <a:schemeClr val="accent1"/>
                 </a:solidFill>
               </a:rPr>
-              <a:t>Central PC</a:t>
-            </a:r>
-          </a:p>
-          <a:p>
-            <a:endParaRPr lang="en-GB" dirty="0"/>
-          </a:p>
-          <a:p>
-            <a:endParaRPr lang="en-GB" dirty="0"/>
-          </a:p>
-          <a:p>
-            <a:endParaRPr lang="en-GB" dirty="0"/>
-          </a:p>
-          <a:p>
-            <a:endParaRPr lang="en-GB" dirty="0"/>
+              <a:t>PC</a:t>
+            </a:r>
           </a:p>
           <a:p>
             <a:endParaRPr lang="en-GB" dirty="0"/>
@@ -3173,7 +3161,7 @@
             </a:pPr>
             <a:r>
               <a:rPr lang="en-GB" dirty="0"/>
-              <a:t>Bare metal</a:t>
+              <a:t>Bare Metal</a:t>
             </a:r>
           </a:p>
           <a:p>
@@ -3193,133 +3181,13 @@
       </p:sp>
       <p:sp>
         <p:nvSpPr>
-          <p:cNvPr id="6" name="Ellipse 5"/>
-          <p:cNvSpPr/>
-          <p:nvPr/>
-        </p:nvSpPr>
-        <p:spPr>
-          <a:xfrm>
-            <a:off x="162374" y="3267009"/>
-            <a:ext cx="1163970" cy="658744"/>
-          </a:xfrm>
-          <a:prstGeom prst="ellipse">
-            <a:avLst/>
-          </a:prstGeom>
-        </p:spPr>
-        <p:style>
-          <a:lnRef idx="1">
-            <a:schemeClr val="accent1"/>
-          </a:lnRef>
-          <a:fillRef idx="2">
-            <a:schemeClr val="accent1"/>
-          </a:fillRef>
-          <a:effectRef idx="1">
-            <a:schemeClr val="accent1"/>
-          </a:effectRef>
-          <a:fontRef idx="minor">
-            <a:schemeClr val="dk1"/>
-          </a:fontRef>
-        </p:style>
-        <p:txBody>
-          <a:bodyPr rtlCol="0" anchor="ctr"/>
-          <a:lstStyle/>
-          <a:p>
-            <a:pPr algn="ctr"/>
-            <a:r>
-              <a:rPr lang="en-GB" dirty="0"/>
-              <a:t>Sensor</a:t>
-            </a:r>
-          </a:p>
-        </p:txBody>
-      </p:sp>
-      <p:sp>
-        <p:nvSpPr>
-          <p:cNvPr id="8" name="Ellipse 7"/>
-          <p:cNvSpPr/>
-          <p:nvPr/>
-        </p:nvSpPr>
-        <p:spPr>
-          <a:xfrm>
-            <a:off x="7130838" y="3267009"/>
-            <a:ext cx="1293353" cy="718018"/>
-          </a:xfrm>
-          <a:prstGeom prst="ellipse">
-            <a:avLst/>
-          </a:prstGeom>
-        </p:spPr>
-        <p:style>
-          <a:lnRef idx="1">
-            <a:schemeClr val="accent1"/>
-          </a:lnRef>
-          <a:fillRef idx="2">
-            <a:schemeClr val="accent1"/>
-          </a:fillRef>
-          <a:effectRef idx="1">
-            <a:schemeClr val="accent1"/>
-          </a:effectRef>
-          <a:fontRef idx="minor">
-            <a:schemeClr val="dk1"/>
-          </a:fontRef>
-        </p:style>
-        <p:txBody>
-          <a:bodyPr rtlCol="0" anchor="ctr"/>
-          <a:lstStyle/>
-          <a:p>
-            <a:pPr algn="ctr"/>
-            <a:r>
-              <a:rPr lang="en-GB" dirty="0" err="1"/>
-              <a:t>nRF</a:t>
-            </a:r>
-            <a:r>
-              <a:rPr lang="en-GB" dirty="0"/>
-              <a:t> KIT</a:t>
-            </a:r>
-          </a:p>
-        </p:txBody>
-      </p:sp>
-      <p:cxnSp>
-        <p:nvCxnSpPr>
-          <p:cNvPr id="14" name="Connecteur droit 13"/>
-          <p:cNvCxnSpPr>
-            <a:cxnSpLocks/>
-            <a:endCxn id="6" idx="6"/>
-          </p:cNvCxnSpPr>
-          <p:nvPr/>
-        </p:nvCxnSpPr>
-        <p:spPr>
-          <a:xfrm flipH="1" flipV="1">
-            <a:off x="1326344" y="3596381"/>
-            <a:ext cx="210699" cy="5161"/>
-          </a:xfrm>
-          <a:prstGeom prst="line">
-            <a:avLst/>
-          </a:prstGeom>
-          <a:ln w="38100"/>
-        </p:spPr>
-        <p:style>
-          <a:lnRef idx="1">
-            <a:schemeClr val="accent1"/>
-          </a:lnRef>
-          <a:fillRef idx="0">
-            <a:schemeClr val="accent1"/>
-          </a:fillRef>
-          <a:effectRef idx="0">
-            <a:schemeClr val="accent1"/>
-          </a:effectRef>
-          <a:fontRef idx="minor">
-            <a:schemeClr val="tx1"/>
-          </a:fontRef>
-        </p:style>
-      </p:cxnSp>
-      <p:sp>
-        <p:nvSpPr>
           <p:cNvPr id="41" name="ZoneTexte 40"/>
           <p:cNvSpPr txBox="1"/>
           <p:nvPr/>
         </p:nvSpPr>
         <p:spPr>
-          <a:xfrm>
-            <a:off x="4927941" y="3251525"/>
+          <a:xfrm rot="1223626">
+            <a:off x="5921556" y="3462379"/>
             <a:ext cx="2282420" cy="369332"/>
           </a:xfrm>
           <a:prstGeom prst="rect">
@@ -3353,9 +3221,9 @@
           <p:nvPr/>
         </p:nvCxnSpPr>
         <p:spPr>
-          <a:xfrm flipH="1">
-            <a:off x="4917969" y="3620857"/>
-            <a:ext cx="2212869" cy="0"/>
+          <a:xfrm flipH="1" flipV="1">
+            <a:off x="4947885" y="3114804"/>
+            <a:ext cx="3641491" cy="1377495"/>
           </a:xfrm>
           <a:prstGeom prst="straightConnector1">
             <a:avLst/>
@@ -3380,40 +3248,6 @@
           </a:fontRef>
         </p:style>
       </p:cxnSp>
-      <p:cxnSp>
-        <p:nvCxnSpPr>
-          <p:cNvPr id="53" name="Connecteur droit 52"/>
-          <p:cNvCxnSpPr>
-            <a:cxnSpLocks/>
-            <a:stCxn id="8" idx="6"/>
-          </p:cNvCxnSpPr>
-          <p:nvPr/>
-        </p:nvCxnSpPr>
-        <p:spPr>
-          <a:xfrm>
-            <a:off x="8424191" y="3626018"/>
-            <a:ext cx="145241" cy="1"/>
-          </a:xfrm>
-          <a:prstGeom prst="line">
-            <a:avLst/>
-          </a:prstGeom>
-          <a:ln w="38100"/>
-        </p:spPr>
-        <p:style>
-          <a:lnRef idx="1">
-            <a:schemeClr val="accent1"/>
-          </a:lnRef>
-          <a:fillRef idx="0">
-            <a:schemeClr val="accent1"/>
-          </a:fillRef>
-          <a:effectRef idx="0">
-            <a:schemeClr val="accent1"/>
-          </a:effectRef>
-          <a:fontRef idx="minor">
-            <a:schemeClr val="tx1"/>
-          </a:fontRef>
-        </p:style>
-      </p:cxnSp>
       <p:sp>
         <p:nvSpPr>
           <p:cNvPr id="2" name="Left-Right Arrow 1"/>
@@ -3422,8 +3256,8 @@
         </p:nvSpPr>
         <p:spPr>
           <a:xfrm>
-            <a:off x="4917969" y="4170764"/>
-            <a:ext cx="3641491" cy="588937"/>
+            <a:off x="4947885" y="4999247"/>
+            <a:ext cx="3611575" cy="588937"/>
           </a:xfrm>
           <a:prstGeom prst="leftRightArrow">
             <a:avLst/>
@@ -3448,16 +3282,13 @@
           <a:lstStyle/>
           <a:p>
             <a:pPr algn="ctr"/>
-            <a:r>
-              <a:rPr lang="nb-NO" b="1" dirty="0">
-                <a:solidFill>
-                  <a:schemeClr val="accent2">
-                    <a:lumMod val="75000"/>
-                  </a:schemeClr>
-                </a:solidFill>
-              </a:rPr>
-              <a:t>Segger RTT</a:t>
-            </a:r>
+            <a:endParaRPr lang="nb-NO" b="1" dirty="0">
+              <a:solidFill>
+                <a:schemeClr val="accent2">
+                  <a:lumMod val="75000"/>
+                </a:schemeClr>
+              </a:solidFill>
+            </a:endParaRPr>
           </a:p>
         </p:txBody>
       </p:sp>
@@ -3483,7 +3314,7 @@
         </p:blipFill>
         <p:spPr>
           <a:xfrm>
-            <a:off x="8724645" y="3412905"/>
+            <a:off x="8734617" y="4217813"/>
             <a:ext cx="415904" cy="415904"/>
           </a:xfrm>
           <a:prstGeom prst="rect">
@@ -3491,6 +3322,192 @@
           </a:prstGeom>
         </p:spPr>
       </p:pic>
+      <p:sp>
+        <p:nvSpPr>
+          <p:cNvPr id="8" name="Rectangle : coins arrondis 7">
+            <a:extLst>
+              <a:ext uri="{FF2B5EF4-FFF2-40B4-BE49-F238E27FC236}">
+                <a16:creationId xmlns:a16="http://schemas.microsoft.com/office/drawing/2014/main" id="{9EB44BB2-D073-4AEA-A7B1-1CC86E17B706}"/>
+              </a:ext>
+            </a:extLst>
+          </p:cNvPr>
+          <p:cNvSpPr/>
+          <p:nvPr/>
+        </p:nvSpPr>
+        <p:spPr>
+          <a:xfrm>
+            <a:off x="8589376" y="304374"/>
+            <a:ext cx="3068456" cy="2276796"/>
+          </a:xfrm>
+          <a:prstGeom prst="roundRect">
+            <a:avLst/>
+          </a:prstGeom>
+          <a:ln w="57150"/>
+        </p:spPr>
+        <p:style>
+          <a:lnRef idx="2">
+            <a:schemeClr val="accent1"/>
+          </a:lnRef>
+          <a:fillRef idx="1">
+            <a:schemeClr val="lt1"/>
+          </a:fillRef>
+          <a:effectRef idx="0">
+            <a:schemeClr val="accent1"/>
+          </a:effectRef>
+          <a:fontRef idx="minor">
+            <a:schemeClr val="dk1"/>
+          </a:fontRef>
+        </p:style>
+        <p:txBody>
+          <a:bodyPr rtlCol="0" anchor="t"/>
+          <a:lstStyle/>
+          <a:p>
+            <a:r>
+              <a:rPr lang="en-GB" b="1" dirty="0">
+                <a:solidFill>
+                  <a:schemeClr val="accent1"/>
+                </a:solidFill>
+              </a:rPr>
+              <a:t>Central</a:t>
+            </a:r>
+          </a:p>
+          <a:p>
+            <a:endParaRPr lang="en-GB" dirty="0"/>
+          </a:p>
+        </p:txBody>
+      </p:sp>
+      <p:cxnSp>
+        <p:nvCxnSpPr>
+          <p:cNvPr id="10" name="Connecteur droit avec flèche 9">
+            <a:extLst>
+              <a:ext uri="{FF2B5EF4-FFF2-40B4-BE49-F238E27FC236}">
+                <a16:creationId xmlns:a16="http://schemas.microsoft.com/office/drawing/2014/main" id="{E7F95707-D33E-4173-90C9-6A9C6DEF2348}"/>
+              </a:ext>
+            </a:extLst>
+          </p:cNvPr>
+          <p:cNvCxnSpPr>
+            <a:cxnSpLocks/>
+            <a:stCxn id="8" idx="1"/>
+          </p:cNvCxnSpPr>
+          <p:nvPr/>
+        </p:nvCxnSpPr>
+        <p:spPr>
+          <a:xfrm flipH="1">
+            <a:off x="4947885" y="1442772"/>
+            <a:ext cx="3641491" cy="1672032"/>
+          </a:xfrm>
+          <a:prstGeom prst="straightConnector1">
+            <a:avLst/>
+          </a:prstGeom>
+          <a:ln w="38100">
+            <a:headEnd type="triangle"/>
+            <a:tailEnd type="triangle"/>
+          </a:ln>
+        </p:spPr>
+        <p:style>
+          <a:lnRef idx="1">
+            <a:schemeClr val="accent1"/>
+          </a:lnRef>
+          <a:fillRef idx="0">
+            <a:schemeClr val="accent1"/>
+          </a:fillRef>
+          <a:effectRef idx="0">
+            <a:schemeClr val="accent1"/>
+          </a:effectRef>
+          <a:fontRef idx="minor">
+            <a:schemeClr val="tx1"/>
+          </a:fontRef>
+        </p:style>
+      </p:cxnSp>
+      <p:sp>
+        <p:nvSpPr>
+          <p:cNvPr id="14" name="Left-Right Arrow 1">
+            <a:extLst>
+              <a:ext uri="{FF2B5EF4-FFF2-40B4-BE49-F238E27FC236}">
+                <a16:creationId xmlns:a16="http://schemas.microsoft.com/office/drawing/2014/main" id="{163CF0EC-D8E9-47AE-A3CB-6FBF6718265C}"/>
+              </a:ext>
+            </a:extLst>
+          </p:cNvPr>
+          <p:cNvSpPr/>
+          <p:nvPr/>
+        </p:nvSpPr>
+        <p:spPr>
+          <a:xfrm rot="5400000">
+            <a:off x="9582981" y="2816577"/>
+            <a:ext cx="1021412" cy="588937"/>
+          </a:xfrm>
+          <a:prstGeom prst="leftRightArrow">
+            <a:avLst/>
+          </a:prstGeom>
+        </p:spPr>
+        <p:style>
+          <a:lnRef idx="1">
+            <a:schemeClr val="accent2"/>
+          </a:lnRef>
+          <a:fillRef idx="2">
+            <a:schemeClr val="accent2"/>
+          </a:fillRef>
+          <a:effectRef idx="1">
+            <a:schemeClr val="accent2"/>
+          </a:effectRef>
+          <a:fontRef idx="minor">
+            <a:schemeClr val="dk1"/>
+          </a:fontRef>
+        </p:style>
+        <p:txBody>
+          <a:bodyPr rtlCol="0" anchor="ctr"/>
+          <a:lstStyle/>
+          <a:p>
+            <a:pPr algn="ctr"/>
+            <a:endParaRPr lang="nb-NO" b="1" dirty="0">
+              <a:solidFill>
+                <a:schemeClr val="accent2">
+                  <a:lumMod val="75000"/>
+                </a:schemeClr>
+              </a:solidFill>
+            </a:endParaRPr>
+          </a:p>
+        </p:txBody>
+      </p:sp>
+      <p:sp>
+        <p:nvSpPr>
+          <p:cNvPr id="15" name="ZoneTexte 14">
+            <a:extLst>
+              <a:ext uri="{FF2B5EF4-FFF2-40B4-BE49-F238E27FC236}">
+                <a16:creationId xmlns:a16="http://schemas.microsoft.com/office/drawing/2014/main" id="{E0D694A5-7DD1-42CE-B19C-1A4EAD191525}"/>
+              </a:ext>
+            </a:extLst>
+          </p:cNvPr>
+          <p:cNvSpPr txBox="1"/>
+          <p:nvPr/>
+        </p:nvSpPr>
+        <p:spPr>
+          <a:xfrm rot="20094926">
+            <a:off x="5627421" y="1788600"/>
+            <a:ext cx="2282420" cy="369332"/>
+          </a:xfrm>
+          <a:prstGeom prst="rect">
+            <a:avLst/>
+          </a:prstGeom>
+          <a:noFill/>
+        </p:spPr>
+        <p:txBody>
+          <a:bodyPr wrap="none" rtlCol="0">
+            <a:spAutoFit/>
+          </a:bodyPr>
+          <a:lstStyle/>
+          <a:p>
+            <a:r>
+              <a:rPr lang="en-GB" b="1" dirty="0">
+                <a:solidFill>
+                  <a:schemeClr val="accent1"/>
+                </a:solidFill>
+              </a:rPr>
+              <a:t>Bluetooth Low Energy</a:t>
+            </a:r>
+          </a:p>
+        </p:txBody>
+      </p:sp>
     </p:spTree>
     <p:extLst>
       <p:ext uri="{BB962C8B-B14F-4D97-AF65-F5344CB8AC3E}">
@@ -8408,8 +8425,8 @@
         </p:nvSpPr>
         <p:spPr>
           <a:xfrm>
-            <a:off x="205468" y="206374"/>
-            <a:ext cx="7784646" cy="3488418"/>
+            <a:off x="223879" y="181826"/>
+            <a:ext cx="4139466" cy="3488418"/>
           </a:xfrm>
           <a:prstGeom prst="rect">
             <a:avLst/>
@@ -8459,7 +8476,7 @@
         <p:spPr>
           <a:xfrm>
             <a:off x="402318" y="593724"/>
-            <a:ext cx="7377340" cy="2934154"/>
+            <a:ext cx="3789193" cy="2934154"/>
           </a:xfrm>
           <a:prstGeom prst="rect">
             <a:avLst/>
@@ -8853,291 +8870,6 @@
             <a:r>
               <a:rPr lang="en-GB" dirty="0"/>
               <a:t>R | NOTIFY</a:t>
-            </a:r>
-          </a:p>
-        </p:txBody>
-      </p:sp>
-      <p:sp>
-        <p:nvSpPr>
-          <p:cNvPr id="74" name="Rectangle 73">
-            <a:extLst>
-              <a:ext uri="{FF2B5EF4-FFF2-40B4-BE49-F238E27FC236}">
-                <a16:creationId xmlns:a16="http://schemas.microsoft.com/office/drawing/2014/main" id="{2B6E87A7-632E-4EA0-A397-7016E68A1C24}"/>
-              </a:ext>
-            </a:extLst>
-          </p:cNvPr>
-          <p:cNvSpPr/>
-          <p:nvPr/>
-        </p:nvSpPr>
-        <p:spPr>
-          <a:xfrm>
-            <a:off x="4152449" y="1387474"/>
-            <a:ext cx="3460750" cy="1952625"/>
-          </a:xfrm>
-          <a:prstGeom prst="rect">
-            <a:avLst/>
-          </a:prstGeom>
-          <a:solidFill>
-            <a:schemeClr val="accent1">
-              <a:lumMod val="20000"/>
-              <a:lumOff val="80000"/>
-            </a:schemeClr>
-          </a:solidFill>
-          <a:ln w="9525" cap="flat" cmpd="sng" algn="ctr">
-            <a:noFill/>
-            <a:prstDash val="solid"/>
-            <a:round/>
-            <a:headEnd type="none" w="med" len="med"/>
-            <a:tailEnd type="none" w="med" len="med"/>
-          </a:ln>
-        </p:spPr>
-        <p:style>
-          <a:lnRef idx="0">
-            <a:scrgbClr r="0" g="0" b="0"/>
-          </a:lnRef>
-          <a:fillRef idx="0">
-            <a:scrgbClr r="0" g="0" b="0"/>
-          </a:fillRef>
-          <a:effectRef idx="0">
-            <a:scrgbClr r="0" g="0" b="0"/>
-          </a:effectRef>
-          <a:fontRef idx="minor">
-            <a:schemeClr val="dk1"/>
-          </a:fontRef>
-        </p:style>
-        <p:txBody>
-          <a:bodyPr rtlCol="0" anchor="t"/>
-          <a:lstStyle/>
-          <a:p>
-            <a:r>
-              <a:rPr lang="en-GB" dirty="0"/>
-              <a:t>Characteristic </a:t>
-            </a:r>
-            <a:r>
-              <a:rPr lang="en-GB" b="1" dirty="0"/>
-              <a:t>SLEEP</a:t>
-            </a:r>
-          </a:p>
-        </p:txBody>
-      </p:sp>
-      <p:sp>
-        <p:nvSpPr>
-          <p:cNvPr id="75" name="Rectangle 74">
-            <a:extLst>
-              <a:ext uri="{FF2B5EF4-FFF2-40B4-BE49-F238E27FC236}">
-                <a16:creationId xmlns:a16="http://schemas.microsoft.com/office/drawing/2014/main" id="{316318F6-AA81-40E0-9449-FE4EECA57CAE}"/>
-              </a:ext>
-            </a:extLst>
-          </p:cNvPr>
-          <p:cNvSpPr/>
-          <p:nvPr/>
-        </p:nvSpPr>
-        <p:spPr>
-          <a:xfrm>
-            <a:off x="4250874" y="1791624"/>
-            <a:ext cx="3251200" cy="288000"/>
-          </a:xfrm>
-          <a:prstGeom prst="rect">
-            <a:avLst/>
-          </a:prstGeom>
-          <a:ln>
-            <a:noFill/>
-            <a:headEnd type="none" w="med" len="med"/>
-            <a:tailEnd type="none" w="med" len="med"/>
-          </a:ln>
-        </p:spPr>
-        <p:style>
-          <a:lnRef idx="2">
-            <a:schemeClr val="dk1"/>
-          </a:lnRef>
-          <a:fillRef idx="1">
-            <a:schemeClr val="lt1"/>
-          </a:fillRef>
-          <a:effectRef idx="0">
-            <a:schemeClr val="dk1"/>
-          </a:effectRef>
-          <a:fontRef idx="minor">
-            <a:schemeClr val="dk1"/>
-          </a:fontRef>
-        </p:style>
-        <p:txBody>
-          <a:bodyPr rtlCol="0" anchor="ctr"/>
-          <a:lstStyle/>
-          <a:p>
-            <a:r>
-              <a:rPr lang="en-GB" b="1"/>
-              <a:t>UUID</a:t>
-            </a:r>
-            <a:r>
-              <a:rPr lang="en-GB"/>
-              <a:t> 0x2AC</a:t>
-            </a:r>
-            <a:endParaRPr lang="en-GB" dirty="0"/>
-          </a:p>
-        </p:txBody>
-      </p:sp>
-      <p:sp>
-        <p:nvSpPr>
-          <p:cNvPr id="76" name="Rectangle 75">
-            <a:extLst>
-              <a:ext uri="{FF2B5EF4-FFF2-40B4-BE49-F238E27FC236}">
-                <a16:creationId xmlns:a16="http://schemas.microsoft.com/office/drawing/2014/main" id="{D785081D-1770-469A-8E97-7A0B3F7E4D5C}"/>
-              </a:ext>
-            </a:extLst>
-          </p:cNvPr>
-          <p:cNvSpPr/>
-          <p:nvPr/>
-        </p:nvSpPr>
-        <p:spPr>
-          <a:xfrm>
-            <a:off x="4257224" y="2178974"/>
-            <a:ext cx="3251200" cy="288000"/>
-          </a:xfrm>
-          <a:prstGeom prst="rect">
-            <a:avLst/>
-          </a:prstGeom>
-          <a:ln>
-            <a:noFill/>
-            <a:headEnd type="none" w="med" len="med"/>
-            <a:tailEnd type="none" w="med" len="med"/>
-          </a:ln>
-        </p:spPr>
-        <p:style>
-          <a:lnRef idx="2">
-            <a:schemeClr val="dk1"/>
-          </a:lnRef>
-          <a:fillRef idx="1">
-            <a:schemeClr val="lt1"/>
-          </a:fillRef>
-          <a:effectRef idx="0">
-            <a:schemeClr val="dk1"/>
-          </a:effectRef>
-          <a:fontRef idx="minor">
-            <a:schemeClr val="dk1"/>
-          </a:fontRef>
-        </p:style>
-        <p:txBody>
-          <a:bodyPr rtlCol="0" anchor="ctr"/>
-          <a:lstStyle/>
-          <a:p>
-            <a:r>
-              <a:rPr lang="en-GB" b="1" dirty="0"/>
-              <a:t>Value </a:t>
-            </a:r>
-            <a:r>
-              <a:rPr lang="en-GB" dirty="0"/>
-              <a:t>Sleep</a:t>
-            </a:r>
-          </a:p>
-        </p:txBody>
-      </p:sp>
-      <p:sp>
-        <p:nvSpPr>
-          <p:cNvPr id="77" name="Rectangle 76">
-            <a:extLst>
-              <a:ext uri="{FF2B5EF4-FFF2-40B4-BE49-F238E27FC236}">
-                <a16:creationId xmlns:a16="http://schemas.microsoft.com/office/drawing/2014/main" id="{54DE3A70-3D52-4459-8F55-0C147CD73E02}"/>
-              </a:ext>
-            </a:extLst>
-          </p:cNvPr>
-          <p:cNvSpPr/>
-          <p:nvPr/>
-        </p:nvSpPr>
-        <p:spPr>
-          <a:xfrm>
-            <a:off x="4257224" y="2566324"/>
-            <a:ext cx="3251200" cy="288000"/>
-          </a:xfrm>
-          <a:prstGeom prst="rect">
-            <a:avLst/>
-          </a:prstGeom>
-          <a:ln>
-            <a:noFill/>
-            <a:headEnd type="none" w="med" len="med"/>
-            <a:tailEnd type="none" w="med" len="med"/>
-          </a:ln>
-        </p:spPr>
-        <p:style>
-          <a:lnRef idx="2">
-            <a:schemeClr val="dk1"/>
-          </a:lnRef>
-          <a:fillRef idx="1">
-            <a:schemeClr val="lt1"/>
-          </a:fillRef>
-          <a:effectRef idx="0">
-            <a:schemeClr val="dk1"/>
-          </a:effectRef>
-          <a:fontRef idx="minor">
-            <a:schemeClr val="dk1"/>
-          </a:fontRef>
-        </p:style>
-        <p:txBody>
-          <a:bodyPr rtlCol="0" anchor="ctr"/>
-          <a:lstStyle/>
-          <a:p>
-            <a:r>
-              <a:rPr lang="en-GB" b="1" dirty="0"/>
-              <a:t>Value type </a:t>
-            </a:r>
-            <a:r>
-              <a:rPr lang="en-GB" dirty="0"/>
-              <a:t>Boolean</a:t>
-            </a:r>
-            <a:endParaRPr lang="en-GB" b="1" dirty="0"/>
-          </a:p>
-        </p:txBody>
-      </p:sp>
-      <p:sp>
-        <p:nvSpPr>
-          <p:cNvPr id="78" name="Rectangle 77">
-            <a:extLst>
-              <a:ext uri="{FF2B5EF4-FFF2-40B4-BE49-F238E27FC236}">
-                <a16:creationId xmlns:a16="http://schemas.microsoft.com/office/drawing/2014/main" id="{1534C298-8A90-4E07-929B-D9C61FAB2395}"/>
-              </a:ext>
-            </a:extLst>
-          </p:cNvPr>
-          <p:cNvSpPr/>
-          <p:nvPr/>
-        </p:nvSpPr>
-        <p:spPr>
-          <a:xfrm>
-            <a:off x="4257224" y="2953674"/>
-            <a:ext cx="3251200" cy="288000"/>
-          </a:xfrm>
-          <a:prstGeom prst="rect">
-            <a:avLst/>
-          </a:prstGeom>
-          <a:ln>
-            <a:noFill/>
-            <a:headEnd type="none" w="med" len="med"/>
-            <a:tailEnd type="none" w="med" len="med"/>
-          </a:ln>
-        </p:spPr>
-        <p:style>
-          <a:lnRef idx="2">
-            <a:schemeClr val="dk1"/>
-          </a:lnRef>
-          <a:fillRef idx="1">
-            <a:schemeClr val="lt1"/>
-          </a:fillRef>
-          <a:effectRef idx="0">
-            <a:schemeClr val="dk1"/>
-          </a:effectRef>
-          <a:fontRef idx="minor">
-            <a:schemeClr val="dk1"/>
-          </a:fontRef>
-        </p:style>
-        <p:txBody>
-          <a:bodyPr rtlCol="0" anchor="ctr"/>
-          <a:lstStyle/>
-          <a:p>
-            <a:r>
-              <a:rPr lang="en-GB" b="1" dirty="0"/>
-              <a:t>Properties </a:t>
-            </a:r>
-            <a:r>
-              <a:rPr lang="en-GB" dirty="0"/>
-              <a:t>W | R | NOTIFY</a:t>
             </a:r>
           </a:p>
         </p:txBody>

</xml_diff>

<commit_message>
Report Specification, Software achritecure
</commit_message>
<xml_diff>
--- a/0_Report/SchemaBlock.pptx
+++ b/0_Report/SchemaBlock.pptx
@@ -6,11 +6,13 @@
   </p:sldMasterIdLst>
   <p:sldIdLst>
     <p:sldId id="256" r:id="rId2"/>
-    <p:sldId id="257" r:id="rId3"/>
-    <p:sldId id="258" r:id="rId4"/>
-    <p:sldId id="259" r:id="rId5"/>
-    <p:sldId id="260" r:id="rId6"/>
-    <p:sldId id="261" r:id="rId7"/>
+    <p:sldId id="262" r:id="rId3"/>
+    <p:sldId id="257" r:id="rId4"/>
+    <p:sldId id="258" r:id="rId5"/>
+    <p:sldId id="259" r:id="rId6"/>
+    <p:sldId id="260" r:id="rId7"/>
+    <p:sldId id="261" r:id="rId8"/>
+    <p:sldId id="263" r:id="rId9"/>
   </p:sldIdLst>
   <p:sldSz cx="12192000" cy="6858000"/>
   <p:notesSz cx="6858000" cy="9144000"/>
@@ -252,7 +254,7 @@
           <a:p>
             <a:fld id="{8A4BC5C4-3B83-4D40-A2F2-85A6DFEA9E29}" type="datetimeFigureOut">
               <a:rPr lang="en-GB" smtClean="0"/>
-              <a:t>25/07/2017</a:t>
+              <a:t>31/07/2017</a:t>
             </a:fld>
             <a:endParaRPr lang="en-GB"/>
           </a:p>
@@ -422,7 +424,7 @@
           <a:p>
             <a:fld id="{8A4BC5C4-3B83-4D40-A2F2-85A6DFEA9E29}" type="datetimeFigureOut">
               <a:rPr lang="en-GB" smtClean="0"/>
-              <a:t>25/07/2017</a:t>
+              <a:t>31/07/2017</a:t>
             </a:fld>
             <a:endParaRPr lang="en-GB"/>
           </a:p>
@@ -602,7 +604,7 @@
           <a:p>
             <a:fld id="{8A4BC5C4-3B83-4D40-A2F2-85A6DFEA9E29}" type="datetimeFigureOut">
               <a:rPr lang="en-GB" smtClean="0"/>
-              <a:t>25/07/2017</a:t>
+              <a:t>31/07/2017</a:t>
             </a:fld>
             <a:endParaRPr lang="en-GB"/>
           </a:p>
@@ -772,7 +774,7 @@
           <a:p>
             <a:fld id="{8A4BC5C4-3B83-4D40-A2F2-85A6DFEA9E29}" type="datetimeFigureOut">
               <a:rPr lang="en-GB" smtClean="0"/>
-              <a:t>25/07/2017</a:t>
+              <a:t>31/07/2017</a:t>
             </a:fld>
             <a:endParaRPr lang="en-GB"/>
           </a:p>
@@ -1018,7 +1020,7 @@
           <a:p>
             <a:fld id="{8A4BC5C4-3B83-4D40-A2F2-85A6DFEA9E29}" type="datetimeFigureOut">
               <a:rPr lang="en-GB" smtClean="0"/>
-              <a:t>25/07/2017</a:t>
+              <a:t>31/07/2017</a:t>
             </a:fld>
             <a:endParaRPr lang="en-GB"/>
           </a:p>
@@ -1250,7 +1252,7 @@
           <a:p>
             <a:fld id="{8A4BC5C4-3B83-4D40-A2F2-85A6DFEA9E29}" type="datetimeFigureOut">
               <a:rPr lang="en-GB" smtClean="0"/>
-              <a:t>25/07/2017</a:t>
+              <a:t>31/07/2017</a:t>
             </a:fld>
             <a:endParaRPr lang="en-GB"/>
           </a:p>
@@ -1617,7 +1619,7 @@
           <a:p>
             <a:fld id="{8A4BC5C4-3B83-4D40-A2F2-85A6DFEA9E29}" type="datetimeFigureOut">
               <a:rPr lang="en-GB" smtClean="0"/>
-              <a:t>25/07/2017</a:t>
+              <a:t>31/07/2017</a:t>
             </a:fld>
             <a:endParaRPr lang="en-GB"/>
           </a:p>
@@ -1735,7 +1737,7 @@
           <a:p>
             <a:fld id="{8A4BC5C4-3B83-4D40-A2F2-85A6DFEA9E29}" type="datetimeFigureOut">
               <a:rPr lang="en-GB" smtClean="0"/>
-              <a:t>25/07/2017</a:t>
+              <a:t>31/07/2017</a:t>
             </a:fld>
             <a:endParaRPr lang="en-GB"/>
           </a:p>
@@ -1830,7 +1832,7 @@
           <a:p>
             <a:fld id="{8A4BC5C4-3B83-4D40-A2F2-85A6DFEA9E29}" type="datetimeFigureOut">
               <a:rPr lang="en-GB" smtClean="0"/>
-              <a:t>25/07/2017</a:t>
+              <a:t>31/07/2017</a:t>
             </a:fld>
             <a:endParaRPr lang="en-GB"/>
           </a:p>
@@ -2107,7 +2109,7 @@
           <a:p>
             <a:fld id="{8A4BC5C4-3B83-4D40-A2F2-85A6DFEA9E29}" type="datetimeFigureOut">
               <a:rPr lang="en-GB" smtClean="0"/>
-              <a:t>25/07/2017</a:t>
+              <a:t>31/07/2017</a:t>
             </a:fld>
             <a:endParaRPr lang="en-GB"/>
           </a:p>
@@ -2360,7 +2362,7 @@
           <a:p>
             <a:fld id="{8A4BC5C4-3B83-4D40-A2F2-85A6DFEA9E29}" type="datetimeFigureOut">
               <a:rPr lang="en-GB" smtClean="0"/>
-              <a:t>25/07/2017</a:t>
+              <a:t>31/07/2017</a:t>
             </a:fld>
             <a:endParaRPr lang="en-GB"/>
           </a:p>
@@ -2573,7 +2575,7 @@
           <a:p>
             <a:fld id="{8A4BC5C4-3B83-4D40-A2F2-85A6DFEA9E29}" type="datetimeFigureOut">
               <a:rPr lang="en-GB" smtClean="0"/>
-              <a:t>25/07/2017</a:t>
+              <a:t>31/07/2017</a:t>
             </a:fld>
             <a:endParaRPr lang="en-GB"/>
           </a:p>
@@ -2986,8 +2988,8 @@
         </p:nvSpPr>
         <p:spPr>
           <a:xfrm>
-            <a:off x="8589376" y="3621751"/>
-            <a:ext cx="3068456" cy="2276796"/>
+            <a:off x="7818046" y="2204418"/>
+            <a:ext cx="3068456" cy="1714440"/>
           </a:xfrm>
           <a:prstGeom prst="roundRect">
             <a:avLst/>
@@ -3018,7 +3020,7 @@
                   <a:schemeClr val="accent1"/>
                 </a:solidFill>
               </a:rPr>
-              <a:t>PC</a:t>
+              <a:t>Central</a:t>
             </a:r>
           </a:p>
           <a:p>
@@ -3040,12 +3042,6 @@
           <a:p>
             <a:endParaRPr lang="en-GB" dirty="0"/>
           </a:p>
-          <a:p>
-            <a:r>
-              <a:rPr lang="en-GB" b="1" dirty="0"/>
-              <a:t>Desktop application</a:t>
-            </a:r>
-          </a:p>
         </p:txBody>
       </p:sp>
       <p:sp>
@@ -3056,7 +3052,7 @@
         </p:nvSpPr>
         <p:spPr>
           <a:xfrm>
-            <a:off x="1534229" y="1725446"/>
+            <a:off x="762899" y="2204417"/>
             <a:ext cx="3393712" cy="4173101"/>
           </a:xfrm>
           <a:prstGeom prst="roundRect">
@@ -3094,7 +3090,26 @@
           <a:p>
             <a:r>
               <a:rPr lang="en-GB" b="1" dirty="0"/>
-              <a:t>Hardware</a:t>
+              <a:t>nRF52x Development Kit</a:t>
+            </a:r>
+          </a:p>
+          <a:p>
+            <a:r>
+              <a:rPr lang="en-GB" b="1" dirty="0"/>
+              <a:t>Nordic Power Profiler Kit</a:t>
+            </a:r>
+          </a:p>
+          <a:p>
+            <a:endParaRPr lang="en-GB" b="1" dirty="0">
+              <a:solidFill>
+                <a:schemeClr val="accent1"/>
+              </a:solidFill>
+            </a:endParaRPr>
+          </a:p>
+          <a:p>
+            <a:r>
+              <a:rPr lang="en-GB" b="1" dirty="0"/>
+              <a:t>Extension board</a:t>
             </a:r>
           </a:p>
           <a:p>
@@ -3104,7 +3119,7 @@
             </a:pPr>
             <a:r>
               <a:rPr lang="en-GB" dirty="0"/>
-              <a:t>nRF52x Development Kit</a:t>
+              <a:t>Accelerometer</a:t>
             </a:r>
           </a:p>
           <a:p>
@@ -3114,7 +3129,7 @@
             </a:pPr>
             <a:r>
               <a:rPr lang="en-GB" dirty="0"/>
-              <a:t>Nordic Power Profiler Kit</a:t>
+              <a:t>A/D Converter</a:t>
             </a:r>
           </a:p>
           <a:p>
@@ -3124,25 +3139,7 @@
             </a:pPr>
             <a:r>
               <a:rPr lang="en-GB" dirty="0"/>
-              <a:t>Extension board</a:t>
-            </a:r>
-          </a:p>
-          <a:p>
-            <a:r>
-              <a:rPr lang="en-GB" dirty="0"/>
-              <a:t>	Accelerometer</a:t>
-            </a:r>
-          </a:p>
-          <a:p>
-            <a:r>
-              <a:rPr lang="en-GB" dirty="0"/>
-              <a:t>	A/D Converter</a:t>
-            </a:r>
-          </a:p>
-          <a:p>
-            <a:r>
-              <a:rPr lang="en-GB" dirty="0"/>
-              <a:t>	Interrupt generator</a:t>
+              <a:t>Interrupt generator</a:t>
             </a:r>
           </a:p>
           <a:p>
@@ -3161,7 +3158,7 @@
             </a:pPr>
             <a:r>
               <a:rPr lang="en-GB" dirty="0"/>
-              <a:t>Bare Metal</a:t>
+              <a:t>Nordic SDK + SD</a:t>
             </a:r>
           </a:p>
           <a:p>
@@ -3186,8 +3183,8 @@
           <p:nvPr/>
         </p:nvSpPr>
         <p:spPr>
-          <a:xfrm rot="1223626">
-            <a:off x="5921556" y="3462379"/>
+          <a:xfrm>
+            <a:off x="4846118" y="2733032"/>
             <a:ext cx="2282420" cy="369332"/>
           </a:xfrm>
           <a:prstGeom prst="rect">
@@ -3221,9 +3218,9 @@
           <p:nvPr/>
         </p:nvCxnSpPr>
         <p:spPr>
-          <a:xfrm flipH="1" flipV="1">
-            <a:off x="4947885" y="3114804"/>
-            <a:ext cx="3641491" cy="1377495"/>
+          <a:xfrm flipH="1">
+            <a:off x="4176556" y="3102364"/>
+            <a:ext cx="3611574" cy="0"/>
           </a:xfrm>
           <a:prstGeom prst="straightConnector1">
             <a:avLst/>
@@ -3256,8 +3253,8 @@
         </p:nvSpPr>
         <p:spPr>
           <a:xfrm>
-            <a:off x="4947885" y="4999247"/>
-            <a:ext cx="3611575" cy="588937"/>
+            <a:off x="4156611" y="4853718"/>
+            <a:ext cx="3631519" cy="588937"/>
           </a:xfrm>
           <a:prstGeom prst="leftRightArrow">
             <a:avLst/>
@@ -3314,7 +3311,7 @@
         </p:blipFill>
         <p:spPr>
           <a:xfrm>
-            <a:off x="8734617" y="4217813"/>
+            <a:off x="7924932" y="2846276"/>
             <a:ext cx="415904" cy="415904"/>
           </a:xfrm>
           <a:prstGeom prst="rect">
@@ -3324,10 +3321,10 @@
       </p:pic>
       <p:sp>
         <p:nvSpPr>
-          <p:cNvPr id="8" name="Rectangle : coins arrondis 7">
+          <p:cNvPr id="16" name="Rectangle : coins arrondis 15">
             <a:extLst>
               <a:ext uri="{FF2B5EF4-FFF2-40B4-BE49-F238E27FC236}">
-                <a16:creationId xmlns:a16="http://schemas.microsoft.com/office/drawing/2014/main" id="{9EB44BB2-D073-4AEA-A7B1-1CC86E17B706}"/>
+                <a16:creationId xmlns:a16="http://schemas.microsoft.com/office/drawing/2014/main" id="{C64BEDF1-4043-47DA-AF01-03F361BD4AA3}"/>
               </a:ext>
             </a:extLst>
           </p:cNvPr>
@@ -3336,8 +3333,8 @@
         </p:nvSpPr>
         <p:spPr>
           <a:xfrm>
-            <a:off x="8589376" y="304374"/>
-            <a:ext cx="3068456" cy="2276796"/>
+            <a:off x="7818045" y="4290967"/>
+            <a:ext cx="3919865" cy="1714440"/>
           </a:xfrm>
           <a:prstGeom prst="roundRect">
             <a:avLst/>
@@ -3368,143 +3365,20 @@
                   <a:schemeClr val="accent1"/>
                 </a:solidFill>
               </a:rPr>
-              <a:t>Central</a:t>
+              <a:t>PC</a:t>
             </a:r>
           </a:p>
           <a:p>
             <a:endParaRPr lang="en-GB" dirty="0"/>
           </a:p>
-        </p:txBody>
-      </p:sp>
-      <p:cxnSp>
-        <p:nvCxnSpPr>
-          <p:cNvPr id="10" name="Connecteur droit avec flèche 9">
-            <a:extLst>
-              <a:ext uri="{FF2B5EF4-FFF2-40B4-BE49-F238E27FC236}">
-                <a16:creationId xmlns:a16="http://schemas.microsoft.com/office/drawing/2014/main" id="{E7F95707-D33E-4173-90C9-6A9C6DEF2348}"/>
-              </a:ext>
-            </a:extLst>
-          </p:cNvPr>
-          <p:cNvCxnSpPr>
-            <a:cxnSpLocks/>
-            <a:stCxn id="8" idx="1"/>
-          </p:cNvCxnSpPr>
-          <p:nvPr/>
-        </p:nvCxnSpPr>
-        <p:spPr>
-          <a:xfrm flipH="1">
-            <a:off x="4947885" y="1442772"/>
-            <a:ext cx="3641491" cy="1672032"/>
-          </a:xfrm>
-          <a:prstGeom prst="straightConnector1">
-            <a:avLst/>
-          </a:prstGeom>
-          <a:ln w="38100">
-            <a:headEnd type="triangle"/>
-            <a:tailEnd type="triangle"/>
-          </a:ln>
-        </p:spPr>
-        <p:style>
-          <a:lnRef idx="1">
-            <a:schemeClr val="accent1"/>
-          </a:lnRef>
-          <a:fillRef idx="0">
-            <a:schemeClr val="accent1"/>
-          </a:fillRef>
-          <a:effectRef idx="0">
-            <a:schemeClr val="accent1"/>
-          </a:effectRef>
-          <a:fontRef idx="minor">
-            <a:schemeClr val="tx1"/>
-          </a:fontRef>
-        </p:style>
-      </p:cxnSp>
-      <p:sp>
-        <p:nvSpPr>
-          <p:cNvPr id="14" name="Left-Right Arrow 1">
-            <a:extLst>
-              <a:ext uri="{FF2B5EF4-FFF2-40B4-BE49-F238E27FC236}">
-                <a16:creationId xmlns:a16="http://schemas.microsoft.com/office/drawing/2014/main" id="{163CF0EC-D8E9-47AE-A3CB-6FBF6718265C}"/>
-              </a:ext>
-            </a:extLst>
-          </p:cNvPr>
-          <p:cNvSpPr/>
-          <p:nvPr/>
-        </p:nvSpPr>
-        <p:spPr>
-          <a:xfrm rot="5400000">
-            <a:off x="9582981" y="2816577"/>
-            <a:ext cx="1021412" cy="588937"/>
-          </a:xfrm>
-          <a:prstGeom prst="leftRightArrow">
-            <a:avLst/>
-          </a:prstGeom>
-        </p:spPr>
-        <p:style>
-          <a:lnRef idx="1">
-            <a:schemeClr val="accent2"/>
-          </a:lnRef>
-          <a:fillRef idx="2">
-            <a:schemeClr val="accent2"/>
-          </a:fillRef>
-          <a:effectRef idx="1">
-            <a:schemeClr val="accent2"/>
-          </a:effectRef>
-          <a:fontRef idx="minor">
-            <a:schemeClr val="dk1"/>
-          </a:fontRef>
-        </p:style>
-        <p:txBody>
-          <a:bodyPr rtlCol="0" anchor="ctr"/>
-          <a:lstStyle/>
-          <a:p>
-            <a:pPr algn="ctr"/>
-            <a:endParaRPr lang="nb-NO" b="1" dirty="0">
-              <a:solidFill>
-                <a:schemeClr val="accent2">
-                  <a:lumMod val="75000"/>
-                </a:schemeClr>
-              </a:solidFill>
-            </a:endParaRPr>
-          </a:p>
-        </p:txBody>
-      </p:sp>
-      <p:sp>
-        <p:nvSpPr>
-          <p:cNvPr id="15" name="ZoneTexte 14">
-            <a:extLst>
-              <a:ext uri="{FF2B5EF4-FFF2-40B4-BE49-F238E27FC236}">
-                <a16:creationId xmlns:a16="http://schemas.microsoft.com/office/drawing/2014/main" id="{E0D694A5-7DD1-42CE-B19C-1A4EAD191525}"/>
-              </a:ext>
-            </a:extLst>
-          </p:cNvPr>
-          <p:cNvSpPr txBox="1"/>
-          <p:nvPr/>
-        </p:nvSpPr>
-        <p:spPr>
-          <a:xfrm rot="20094926">
-            <a:off x="5627421" y="1788600"/>
-            <a:ext cx="2282420" cy="369332"/>
-          </a:xfrm>
-          <a:prstGeom prst="rect">
-            <a:avLst/>
-          </a:prstGeom>
-          <a:noFill/>
-        </p:spPr>
-        <p:txBody>
-          <a:bodyPr wrap="none" rtlCol="0">
-            <a:spAutoFit/>
-          </a:bodyPr>
-          <a:lstStyle/>
-          <a:p>
-            <a:r>
-              <a:rPr lang="en-GB" b="1" dirty="0">
-                <a:solidFill>
-                  <a:schemeClr val="accent1"/>
-                </a:solidFill>
-              </a:rPr>
-              <a:t>Bluetooth Low Energy</a:t>
-            </a:r>
+          <a:p>
+            <a:r>
+              <a:rPr lang="en-GB" b="1" dirty="0"/>
+              <a:t>Power Profiler Kit Desktop Application</a:t>
+            </a:r>
+          </a:p>
+          <a:p>
+            <a:endParaRPr lang="en-GB" dirty="0"/>
           </a:p>
         </p:txBody>
       </p:sp>
@@ -3546,22 +3420,169 @@
         </p:nvSpPr>
         <p:spPr>
           <a:xfrm>
-            <a:off x="4945224" y="2805404"/>
-            <a:ext cx="2021632" cy="995266"/>
+            <a:off x="4266835" y="1463753"/>
+            <a:ext cx="3068456" cy="2320078"/>
           </a:xfrm>
           <a:prstGeom prst="roundRect">
             <a:avLst/>
           </a:prstGeom>
+          <a:ln w="57150"/>
+        </p:spPr>
+        <p:style>
+          <a:lnRef idx="2">
+            <a:schemeClr val="accent1"/>
+          </a:lnRef>
+          <a:fillRef idx="1">
+            <a:schemeClr val="lt1"/>
+          </a:fillRef>
+          <a:effectRef idx="0">
+            <a:schemeClr val="accent1"/>
+          </a:effectRef>
+          <a:fontRef idx="minor">
+            <a:schemeClr val="dk1"/>
+          </a:fontRef>
+        </p:style>
+        <p:txBody>
+          <a:bodyPr rtlCol="0" anchor="t"/>
+          <a:lstStyle/>
+          <a:p>
+            <a:r>
+              <a:rPr lang="en-GB" b="1" dirty="0">
+                <a:solidFill>
+                  <a:schemeClr val="accent1"/>
+                </a:solidFill>
+              </a:rPr>
+              <a:t>Central</a:t>
+            </a:r>
+          </a:p>
+          <a:p>
+            <a:r>
+              <a:rPr lang="en-GB" b="1" dirty="0"/>
+              <a:t>nRF52x Development Kit</a:t>
+            </a:r>
+          </a:p>
+          <a:p>
+            <a:r>
+              <a:rPr lang="en-GB" b="1" dirty="0"/>
+              <a:t>Nordic Power Profiler Kit</a:t>
+            </a:r>
+          </a:p>
+          <a:p>
+            <a:endParaRPr lang="en-GB" dirty="0"/>
+          </a:p>
+          <a:p>
+            <a:r>
+              <a:rPr lang="en-GB" b="1" dirty="0"/>
+              <a:t>Software</a:t>
+            </a:r>
+          </a:p>
+          <a:p>
+            <a:pPr marL="285750" indent="-285750">
+              <a:buFont typeface="Arial" panose="020B0604020202020204" pitchFamily="34" charset="0"/>
+              <a:buChar char="•"/>
+            </a:pPr>
+            <a:r>
+              <a:rPr lang="en-GB" dirty="0"/>
+              <a:t>Nordic SDK + SD</a:t>
+            </a:r>
+          </a:p>
+          <a:p>
+            <a:pPr marL="285750" indent="-285750">
+              <a:buFont typeface="Arial" panose="020B0604020202020204" pitchFamily="34" charset="0"/>
+              <a:buChar char="•"/>
+            </a:pPr>
+            <a:r>
+              <a:rPr lang="en-GB" dirty="0"/>
+              <a:t>Zephyr RTOS</a:t>
+            </a:r>
+          </a:p>
+          <a:p>
+            <a:endParaRPr lang="en-GB" dirty="0"/>
+          </a:p>
+          <a:p>
+            <a:r>
+              <a:rPr lang="en-GB" dirty="0"/>
+              <a:t>       </a:t>
+            </a:r>
+          </a:p>
+          <a:p>
+            <a:endParaRPr lang="en-GB" dirty="0"/>
+          </a:p>
+        </p:txBody>
+      </p:sp>
+      <p:sp>
+        <p:nvSpPr>
+          <p:cNvPr id="5" name="Rectangle : coins arrondis 4"/>
+          <p:cNvSpPr/>
+          <p:nvPr/>
+        </p:nvSpPr>
+        <p:spPr>
+          <a:xfrm>
+            <a:off x="9000755" y="316246"/>
+            <a:ext cx="2422987" cy="857221"/>
+          </a:xfrm>
+          <a:prstGeom prst="roundRect">
+            <a:avLst/>
+          </a:prstGeom>
+          <a:ln w="57150"/>
+        </p:spPr>
+        <p:style>
+          <a:lnRef idx="2">
+            <a:schemeClr val="accent1"/>
+          </a:lnRef>
+          <a:fillRef idx="1">
+            <a:schemeClr val="lt1"/>
+          </a:fillRef>
+          <a:effectRef idx="0">
+            <a:schemeClr val="accent1"/>
+          </a:effectRef>
+          <a:fontRef idx="minor">
+            <a:schemeClr val="dk1"/>
+          </a:fontRef>
+        </p:style>
+        <p:txBody>
+          <a:bodyPr rtlCol="0" anchor="ctr"/>
+          <a:lstStyle/>
+          <a:p>
+            <a:pPr algn="ctr"/>
+            <a:r>
+              <a:rPr lang="en-GB" b="1" dirty="0">
+                <a:solidFill>
+                  <a:schemeClr val="accent1"/>
+                </a:solidFill>
+              </a:rPr>
+              <a:t>Peripheral</a:t>
+            </a:r>
+          </a:p>
+          <a:p>
+            <a:endParaRPr lang="en-GB" dirty="0"/>
+          </a:p>
+        </p:txBody>
+      </p:sp>
+      <p:sp>
+        <p:nvSpPr>
+          <p:cNvPr id="2" name="Left-Right Arrow 1"/>
+          <p:cNvSpPr/>
+          <p:nvPr/>
+        </p:nvSpPr>
+        <p:spPr>
+          <a:xfrm rot="5400000">
+            <a:off x="5381869" y="3947894"/>
+            <a:ext cx="887142" cy="588937"/>
+          </a:xfrm>
+          <a:prstGeom prst="leftRightArrow">
+            <a:avLst/>
+          </a:prstGeom>
         </p:spPr>
         <p:style>
           <a:lnRef idx="1">
-            <a:schemeClr val="accent1"/>
+            <a:schemeClr val="accent2"/>
           </a:lnRef>
           <a:fillRef idx="2">
-            <a:schemeClr val="accent1"/>
+            <a:schemeClr val="accent2"/>
           </a:fillRef>
           <a:effectRef idx="1">
-            <a:schemeClr val="accent1"/>
+            <a:schemeClr val="accent2"/>
           </a:effectRef>
           <a:fontRef idx="minor">
             <a:schemeClr val="dk1"/>
@@ -3572,44 +3593,165 @@
           <a:lstStyle/>
           <a:p>
             <a:pPr algn="ctr"/>
-            <a:r>
-              <a:rPr lang="en-GB" dirty="0"/>
-              <a:t>Central</a:t>
-            </a:r>
-          </a:p>
+            <a:endParaRPr lang="nb-NO" b="1" dirty="0">
+              <a:solidFill>
+                <a:schemeClr val="accent2">
+                  <a:lumMod val="75000"/>
+                </a:schemeClr>
+              </a:solidFill>
+            </a:endParaRPr>
+          </a:p>
+        </p:txBody>
+      </p:sp>
+      <p:sp>
+        <p:nvSpPr>
+          <p:cNvPr id="16" name="Rectangle : coins arrondis 15">
+            <a:extLst>
+              <a:ext uri="{FF2B5EF4-FFF2-40B4-BE49-F238E27FC236}">
+                <a16:creationId xmlns:a16="http://schemas.microsoft.com/office/drawing/2014/main" id="{C64BEDF1-4043-47DA-AF01-03F361BD4AA3}"/>
+              </a:ext>
+            </a:extLst>
+          </p:cNvPr>
+          <p:cNvSpPr/>
+          <p:nvPr/>
+        </p:nvSpPr>
+        <p:spPr>
+          <a:xfrm>
+            <a:off x="3865507" y="4670971"/>
+            <a:ext cx="3919865" cy="1714440"/>
+          </a:xfrm>
+          <a:prstGeom prst="roundRect">
+            <a:avLst/>
+          </a:prstGeom>
+          <a:ln w="57150"/>
+        </p:spPr>
+        <p:style>
+          <a:lnRef idx="2">
+            <a:schemeClr val="accent1"/>
+          </a:lnRef>
+          <a:fillRef idx="1">
+            <a:schemeClr val="lt1"/>
+          </a:fillRef>
+          <a:effectRef idx="0">
+            <a:schemeClr val="accent1"/>
+          </a:effectRef>
+          <a:fontRef idx="minor">
+            <a:schemeClr val="dk1"/>
+          </a:fontRef>
+        </p:style>
+        <p:txBody>
+          <a:bodyPr rtlCol="0" anchor="t"/>
+          <a:lstStyle/>
+          <a:p>
+            <a:r>
+              <a:rPr lang="en-GB" b="1" dirty="0">
+                <a:solidFill>
+                  <a:schemeClr val="accent1"/>
+                </a:solidFill>
+              </a:rPr>
+              <a:t>PC</a:t>
+            </a:r>
+          </a:p>
+          <a:p>
+            <a:endParaRPr lang="en-GB" dirty="0"/>
+          </a:p>
+          <a:p>
+            <a:r>
+              <a:rPr lang="en-GB" b="1" dirty="0"/>
+              <a:t>Power Profiler Kit Desktop Application</a:t>
+            </a:r>
+          </a:p>
+          <a:p>
+            <a:endParaRPr lang="en-GB" dirty="0"/>
+          </a:p>
+        </p:txBody>
+      </p:sp>
+      <p:sp>
+        <p:nvSpPr>
+          <p:cNvPr id="9" name="Rectangle : coins arrondis 8">
+            <a:extLst>
+              <a:ext uri="{FF2B5EF4-FFF2-40B4-BE49-F238E27FC236}">
+                <a16:creationId xmlns:a16="http://schemas.microsoft.com/office/drawing/2014/main" id="{7BDDC70A-4463-44BA-8876-5042A3AC444F}"/>
+              </a:ext>
+            </a:extLst>
+          </p:cNvPr>
+          <p:cNvSpPr/>
+          <p:nvPr/>
+        </p:nvSpPr>
+        <p:spPr>
+          <a:xfrm>
+            <a:off x="9000755" y="1528189"/>
+            <a:ext cx="2422987" cy="857221"/>
+          </a:xfrm>
+          <a:prstGeom prst="roundRect">
+            <a:avLst/>
+          </a:prstGeom>
+          <a:ln w="57150"/>
+        </p:spPr>
+        <p:style>
+          <a:lnRef idx="2">
+            <a:schemeClr val="accent1"/>
+          </a:lnRef>
+          <a:fillRef idx="1">
+            <a:schemeClr val="lt1"/>
+          </a:fillRef>
+          <a:effectRef idx="0">
+            <a:schemeClr val="accent1"/>
+          </a:effectRef>
+          <a:fontRef idx="minor">
+            <a:schemeClr val="dk1"/>
+          </a:fontRef>
+        </p:style>
+        <p:txBody>
+          <a:bodyPr rtlCol="0" anchor="ctr"/>
+          <a:lstStyle/>
           <a:p>
             <a:pPr algn="ctr"/>
             <a:r>
-              <a:rPr lang="en-GB" dirty="0"/>
-              <a:t>PC</a:t>
-            </a:r>
-          </a:p>
-        </p:txBody>
-      </p:sp>
-      <p:sp>
-        <p:nvSpPr>
-          <p:cNvPr id="5" name="Ellipse 4"/>
+              <a:rPr lang="en-GB" b="1" dirty="0">
+                <a:solidFill>
+                  <a:schemeClr val="accent1"/>
+                </a:solidFill>
+              </a:rPr>
+              <a:t>Peripheral</a:t>
+            </a:r>
+          </a:p>
+          <a:p>
+            <a:endParaRPr lang="en-GB" dirty="0"/>
+          </a:p>
+        </p:txBody>
+      </p:sp>
+      <p:sp>
+        <p:nvSpPr>
+          <p:cNvPr id="10" name="Rectangle : coins arrondis 9">
+            <a:extLst>
+              <a:ext uri="{FF2B5EF4-FFF2-40B4-BE49-F238E27FC236}">
+                <a16:creationId xmlns:a16="http://schemas.microsoft.com/office/drawing/2014/main" id="{6EAD901E-E2A1-49D0-B25A-9EBB52B91BDA}"/>
+              </a:ext>
+            </a:extLst>
+          </p:cNvPr>
           <p:cNvSpPr/>
           <p:nvPr/>
         </p:nvSpPr>
         <p:spPr>
           <a:xfrm>
-            <a:off x="8204719" y="2929813"/>
-            <a:ext cx="2506825" cy="746448"/>
-          </a:xfrm>
-          <a:prstGeom prst="ellipse">
-            <a:avLst/>
-          </a:prstGeom>
-        </p:spPr>
-        <p:style>
-          <a:lnRef idx="1">
-            <a:schemeClr val="accent5"/>
-          </a:lnRef>
-          <a:fillRef idx="2">
-            <a:schemeClr val="accent5"/>
-          </a:fillRef>
-          <a:effectRef idx="1">
-            <a:schemeClr val="accent5"/>
+            <a:off x="9000754" y="2740132"/>
+            <a:ext cx="2422987" cy="857221"/>
+          </a:xfrm>
+          <a:prstGeom prst="roundRect">
+            <a:avLst/>
+          </a:prstGeom>
+          <a:ln w="57150"/>
+        </p:spPr>
+        <p:style>
+          <a:lnRef idx="2">
+            <a:schemeClr val="accent1"/>
+          </a:lnRef>
+          <a:fillRef idx="1">
+            <a:schemeClr val="lt1"/>
+          </a:fillRef>
+          <a:effectRef idx="0">
+            <a:schemeClr val="accent1"/>
           </a:effectRef>
           <a:fontRef idx="minor">
             <a:schemeClr val="dk1"/>
@@ -3621,43 +3763,105 @@
           <a:p>
             <a:pPr algn="ctr"/>
             <a:r>
-              <a:rPr lang="en-GB" dirty="0"/>
+              <a:rPr lang="en-GB" b="1" dirty="0">
+                <a:solidFill>
+                  <a:schemeClr val="accent1"/>
+                </a:solidFill>
+              </a:rPr>
               <a:t>Peripheral</a:t>
             </a:r>
           </a:p>
           <a:p>
+            <a:endParaRPr lang="en-GB" dirty="0"/>
+          </a:p>
+        </p:txBody>
+      </p:sp>
+      <p:sp>
+        <p:nvSpPr>
+          <p:cNvPr id="11" name="Rectangle : coins arrondis 10">
+            <a:extLst>
+              <a:ext uri="{FF2B5EF4-FFF2-40B4-BE49-F238E27FC236}">
+                <a16:creationId xmlns:a16="http://schemas.microsoft.com/office/drawing/2014/main" id="{0358AB5A-628E-444E-9F80-0795702A6BDB}"/>
+              </a:ext>
+            </a:extLst>
+          </p:cNvPr>
+          <p:cNvSpPr/>
+          <p:nvPr/>
+        </p:nvSpPr>
+        <p:spPr>
+          <a:xfrm>
+            <a:off x="9000754" y="3952075"/>
+            <a:ext cx="2422987" cy="857221"/>
+          </a:xfrm>
+          <a:prstGeom prst="roundRect">
+            <a:avLst/>
+          </a:prstGeom>
+          <a:ln w="57150"/>
+        </p:spPr>
+        <p:style>
+          <a:lnRef idx="2">
+            <a:schemeClr val="accent1"/>
+          </a:lnRef>
+          <a:fillRef idx="1">
+            <a:schemeClr val="lt1"/>
+          </a:fillRef>
+          <a:effectRef idx="0">
+            <a:schemeClr val="accent1"/>
+          </a:effectRef>
+          <a:fontRef idx="minor">
+            <a:schemeClr val="dk1"/>
+          </a:fontRef>
+        </p:style>
+        <p:txBody>
+          <a:bodyPr rtlCol="0" anchor="ctr"/>
+          <a:lstStyle/>
+          <a:p>
             <a:pPr algn="ctr"/>
             <a:r>
-              <a:rPr lang="en-GB" dirty="0"/>
-              <a:t>Sensor</a:t>
-            </a:r>
-          </a:p>
-        </p:txBody>
-      </p:sp>
-      <p:sp>
-        <p:nvSpPr>
-          <p:cNvPr id="6" name="Ellipse 5"/>
+              <a:rPr lang="en-GB" b="1" dirty="0">
+                <a:solidFill>
+                  <a:schemeClr val="accent1"/>
+                </a:solidFill>
+              </a:rPr>
+              <a:t>Peripheral</a:t>
+            </a:r>
+          </a:p>
+          <a:p>
+            <a:endParaRPr lang="en-GB" dirty="0"/>
+          </a:p>
+        </p:txBody>
+      </p:sp>
+      <p:sp>
+        <p:nvSpPr>
+          <p:cNvPr id="12" name="Rectangle : coins arrondis 11">
+            <a:extLst>
+              <a:ext uri="{FF2B5EF4-FFF2-40B4-BE49-F238E27FC236}">
+                <a16:creationId xmlns:a16="http://schemas.microsoft.com/office/drawing/2014/main" id="{9C11DBA5-823C-4742-8175-C7A355190617}"/>
+              </a:ext>
+            </a:extLst>
+          </p:cNvPr>
           <p:cNvSpPr/>
           <p:nvPr/>
         </p:nvSpPr>
         <p:spPr>
           <a:xfrm>
-            <a:off x="8204718" y="1300066"/>
-            <a:ext cx="2506825" cy="746448"/>
-          </a:xfrm>
-          <a:prstGeom prst="ellipse">
-            <a:avLst/>
-          </a:prstGeom>
-        </p:spPr>
-        <p:style>
-          <a:lnRef idx="1">
-            <a:schemeClr val="accent5"/>
-          </a:lnRef>
-          <a:fillRef idx="2">
-            <a:schemeClr val="accent5"/>
-          </a:fillRef>
-          <a:effectRef idx="1">
-            <a:schemeClr val="accent5"/>
+            <a:off x="231027" y="316246"/>
+            <a:ext cx="2422987" cy="857221"/>
+          </a:xfrm>
+          <a:prstGeom prst="roundRect">
+            <a:avLst/>
+          </a:prstGeom>
+          <a:ln w="57150"/>
+        </p:spPr>
+        <p:style>
+          <a:lnRef idx="2">
+            <a:schemeClr val="accent1"/>
+          </a:lnRef>
+          <a:fillRef idx="1">
+            <a:schemeClr val="lt1"/>
+          </a:fillRef>
+          <a:effectRef idx="0">
+            <a:schemeClr val="accent1"/>
           </a:effectRef>
           <a:fontRef idx="minor">
             <a:schemeClr val="dk1"/>
@@ -3669,43 +3873,105 @@
           <a:p>
             <a:pPr algn="ctr"/>
             <a:r>
-              <a:rPr lang="en-GB" dirty="0"/>
+              <a:rPr lang="en-GB" b="1" dirty="0">
+                <a:solidFill>
+                  <a:schemeClr val="accent1"/>
+                </a:solidFill>
+              </a:rPr>
               <a:t>Peripheral</a:t>
             </a:r>
           </a:p>
           <a:p>
+            <a:endParaRPr lang="en-GB" dirty="0"/>
+          </a:p>
+        </p:txBody>
+      </p:sp>
+      <p:sp>
+        <p:nvSpPr>
+          <p:cNvPr id="13" name="Rectangle : coins arrondis 12">
+            <a:extLst>
+              <a:ext uri="{FF2B5EF4-FFF2-40B4-BE49-F238E27FC236}">
+                <a16:creationId xmlns:a16="http://schemas.microsoft.com/office/drawing/2014/main" id="{FCCAA927-3461-42BD-A79E-2E452AD40484}"/>
+              </a:ext>
+            </a:extLst>
+          </p:cNvPr>
+          <p:cNvSpPr/>
+          <p:nvPr/>
+        </p:nvSpPr>
+        <p:spPr>
+          <a:xfrm>
+            <a:off x="231027" y="1528189"/>
+            <a:ext cx="2422987" cy="857221"/>
+          </a:xfrm>
+          <a:prstGeom prst="roundRect">
+            <a:avLst/>
+          </a:prstGeom>
+          <a:ln w="57150"/>
+        </p:spPr>
+        <p:style>
+          <a:lnRef idx="2">
+            <a:schemeClr val="accent1"/>
+          </a:lnRef>
+          <a:fillRef idx="1">
+            <a:schemeClr val="lt1"/>
+          </a:fillRef>
+          <a:effectRef idx="0">
+            <a:schemeClr val="accent1"/>
+          </a:effectRef>
+          <a:fontRef idx="minor">
+            <a:schemeClr val="dk1"/>
+          </a:fontRef>
+        </p:style>
+        <p:txBody>
+          <a:bodyPr rtlCol="0" anchor="ctr"/>
+          <a:lstStyle/>
+          <a:p>
             <a:pPr algn="ctr"/>
             <a:r>
-              <a:rPr lang="en-GB" dirty="0"/>
-              <a:t>Sensor</a:t>
-            </a:r>
-          </a:p>
-        </p:txBody>
-      </p:sp>
-      <p:sp>
-        <p:nvSpPr>
-          <p:cNvPr id="7" name="Ellipse 6"/>
+              <a:rPr lang="en-GB" b="1" dirty="0">
+                <a:solidFill>
+                  <a:schemeClr val="accent1"/>
+                </a:solidFill>
+              </a:rPr>
+              <a:t>Peripheral</a:t>
+            </a:r>
+          </a:p>
+          <a:p>
+            <a:endParaRPr lang="en-GB" dirty="0"/>
+          </a:p>
+        </p:txBody>
+      </p:sp>
+      <p:sp>
+        <p:nvSpPr>
+          <p:cNvPr id="14" name="Rectangle : coins arrondis 13">
+            <a:extLst>
+              <a:ext uri="{FF2B5EF4-FFF2-40B4-BE49-F238E27FC236}">
+                <a16:creationId xmlns:a16="http://schemas.microsoft.com/office/drawing/2014/main" id="{09F09604-6E22-42CC-B43C-5CD06800EAB4}"/>
+              </a:ext>
+            </a:extLst>
+          </p:cNvPr>
           <p:cNvSpPr/>
           <p:nvPr/>
         </p:nvSpPr>
         <p:spPr>
           <a:xfrm>
-            <a:off x="1200536" y="1300066"/>
-            <a:ext cx="2506825" cy="746448"/>
-          </a:xfrm>
-          <a:prstGeom prst="ellipse">
-            <a:avLst/>
-          </a:prstGeom>
-        </p:spPr>
-        <p:style>
-          <a:lnRef idx="1">
-            <a:schemeClr val="accent5"/>
-          </a:lnRef>
-          <a:fillRef idx="2">
-            <a:schemeClr val="accent5"/>
-          </a:fillRef>
-          <a:effectRef idx="1">
-            <a:schemeClr val="accent5"/>
+            <a:off x="231026" y="2740132"/>
+            <a:ext cx="2422987" cy="857221"/>
+          </a:xfrm>
+          <a:prstGeom prst="roundRect">
+            <a:avLst/>
+          </a:prstGeom>
+          <a:ln w="57150"/>
+        </p:spPr>
+        <p:style>
+          <a:lnRef idx="2">
+            <a:schemeClr val="accent1"/>
+          </a:lnRef>
+          <a:fillRef idx="1">
+            <a:schemeClr val="lt1"/>
+          </a:fillRef>
+          <a:effectRef idx="0">
+            <a:schemeClr val="accent1"/>
           </a:effectRef>
           <a:fontRef idx="minor">
             <a:schemeClr val="dk1"/>
@@ -3717,273 +3983,95 @@
           <a:p>
             <a:pPr algn="ctr"/>
             <a:r>
-              <a:rPr lang="en-GB" dirty="0"/>
+              <a:rPr lang="en-GB" b="1" dirty="0">
+                <a:solidFill>
+                  <a:schemeClr val="accent1"/>
+                </a:solidFill>
+              </a:rPr>
               <a:t>Peripheral</a:t>
             </a:r>
           </a:p>
           <a:p>
+            <a:endParaRPr lang="en-GB" dirty="0"/>
+          </a:p>
+        </p:txBody>
+      </p:sp>
+      <p:sp>
+        <p:nvSpPr>
+          <p:cNvPr id="15" name="Rectangle : coins arrondis 14">
+            <a:extLst>
+              <a:ext uri="{FF2B5EF4-FFF2-40B4-BE49-F238E27FC236}">
+                <a16:creationId xmlns:a16="http://schemas.microsoft.com/office/drawing/2014/main" id="{958AC44E-DDAC-4367-89AD-894B582DAC6F}"/>
+              </a:ext>
+            </a:extLst>
+          </p:cNvPr>
+          <p:cNvSpPr/>
+          <p:nvPr/>
+        </p:nvSpPr>
+        <p:spPr>
+          <a:xfrm>
+            <a:off x="231026" y="3952075"/>
+            <a:ext cx="2422987" cy="857221"/>
+          </a:xfrm>
+          <a:prstGeom prst="roundRect">
+            <a:avLst/>
+          </a:prstGeom>
+          <a:ln w="57150"/>
+        </p:spPr>
+        <p:style>
+          <a:lnRef idx="2">
+            <a:schemeClr val="accent1"/>
+          </a:lnRef>
+          <a:fillRef idx="1">
+            <a:schemeClr val="lt1"/>
+          </a:fillRef>
+          <a:effectRef idx="0">
+            <a:schemeClr val="accent1"/>
+          </a:effectRef>
+          <a:fontRef idx="minor">
+            <a:schemeClr val="dk1"/>
+          </a:fontRef>
+        </p:style>
+        <p:txBody>
+          <a:bodyPr rtlCol="0" anchor="ctr"/>
+          <a:lstStyle/>
+          <a:p>
             <a:pPr algn="ctr"/>
             <a:r>
-              <a:rPr lang="en-GB" dirty="0"/>
-              <a:t>Sensor</a:t>
-            </a:r>
-          </a:p>
-        </p:txBody>
-      </p:sp>
-      <p:sp>
-        <p:nvSpPr>
-          <p:cNvPr id="8" name="Ellipse 7"/>
-          <p:cNvSpPr/>
-          <p:nvPr/>
-        </p:nvSpPr>
-        <p:spPr>
-          <a:xfrm>
-            <a:off x="1200536" y="2929813"/>
-            <a:ext cx="2506825" cy="746448"/>
-          </a:xfrm>
-          <a:prstGeom prst="ellipse">
-            <a:avLst/>
-          </a:prstGeom>
-        </p:spPr>
-        <p:style>
-          <a:lnRef idx="1">
-            <a:schemeClr val="accent5"/>
-          </a:lnRef>
-          <a:fillRef idx="2">
-            <a:schemeClr val="accent5"/>
-          </a:fillRef>
-          <a:effectRef idx="1">
-            <a:schemeClr val="accent5"/>
-          </a:effectRef>
-          <a:fontRef idx="minor">
-            <a:schemeClr val="dk1"/>
-          </a:fontRef>
-        </p:style>
-        <p:txBody>
-          <a:bodyPr rtlCol="0" anchor="ctr"/>
-          <a:lstStyle/>
-          <a:p>
-            <a:pPr algn="ctr"/>
-            <a:r>
-              <a:rPr lang="en-GB" dirty="0"/>
+              <a:rPr lang="en-GB" b="1" dirty="0">
+                <a:solidFill>
+                  <a:schemeClr val="accent1"/>
+                </a:solidFill>
+              </a:rPr>
               <a:t>Peripheral</a:t>
             </a:r>
           </a:p>
           <a:p>
-            <a:pPr algn="ctr"/>
-            <a:r>
-              <a:rPr lang="en-GB" dirty="0"/>
-              <a:t>Sensor</a:t>
-            </a:r>
-          </a:p>
-        </p:txBody>
-      </p:sp>
-      <p:sp>
-        <p:nvSpPr>
-          <p:cNvPr id="9" name="Ellipse 8"/>
-          <p:cNvSpPr/>
-          <p:nvPr/>
-        </p:nvSpPr>
-        <p:spPr>
-          <a:xfrm>
-            <a:off x="1200535" y="4559560"/>
-            <a:ext cx="2506825" cy="746448"/>
-          </a:xfrm>
-          <a:prstGeom prst="ellipse">
-            <a:avLst/>
-          </a:prstGeom>
-        </p:spPr>
-        <p:style>
-          <a:lnRef idx="1">
-            <a:schemeClr val="accent5"/>
-          </a:lnRef>
-          <a:fillRef idx="2">
-            <a:schemeClr val="accent5"/>
-          </a:fillRef>
-          <a:effectRef idx="1">
-            <a:schemeClr val="accent5"/>
-          </a:effectRef>
-          <a:fontRef idx="minor">
-            <a:schemeClr val="dk1"/>
-          </a:fontRef>
-        </p:style>
-        <p:txBody>
-          <a:bodyPr rtlCol="0" anchor="ctr"/>
-          <a:lstStyle/>
-          <a:p>
-            <a:pPr algn="ctr"/>
-            <a:r>
-              <a:rPr lang="en-GB" dirty="0"/>
-              <a:t>Peripheral</a:t>
-            </a:r>
-          </a:p>
-          <a:p>
-            <a:pPr algn="ctr"/>
-            <a:r>
-              <a:rPr lang="en-GB" dirty="0"/>
-              <a:t>Sensor</a:t>
-            </a:r>
-          </a:p>
-        </p:txBody>
-      </p:sp>
-      <p:sp>
-        <p:nvSpPr>
-          <p:cNvPr id="10" name="Ellipse 9"/>
-          <p:cNvSpPr/>
-          <p:nvPr/>
-        </p:nvSpPr>
-        <p:spPr>
-          <a:xfrm>
-            <a:off x="8204717" y="4559560"/>
-            <a:ext cx="2506825" cy="746448"/>
-          </a:xfrm>
-          <a:prstGeom prst="ellipse">
-            <a:avLst/>
-          </a:prstGeom>
-        </p:spPr>
-        <p:style>
-          <a:lnRef idx="1">
-            <a:schemeClr val="accent5"/>
-          </a:lnRef>
-          <a:fillRef idx="2">
-            <a:schemeClr val="accent5"/>
-          </a:fillRef>
-          <a:effectRef idx="1">
-            <a:schemeClr val="accent5"/>
-          </a:effectRef>
-          <a:fontRef idx="minor">
-            <a:schemeClr val="dk1"/>
-          </a:fontRef>
-        </p:style>
-        <p:txBody>
-          <a:bodyPr rtlCol="0" anchor="ctr"/>
-          <a:lstStyle/>
-          <a:p>
-            <a:pPr algn="ctr"/>
-            <a:r>
-              <a:rPr lang="en-GB" dirty="0"/>
-              <a:t>Peripheral</a:t>
-            </a:r>
-          </a:p>
-          <a:p>
-            <a:pPr algn="ctr"/>
-            <a:r>
-              <a:rPr lang="en-GB" dirty="0"/>
-              <a:t>Sensor</a:t>
-            </a:r>
-          </a:p>
-        </p:txBody>
-      </p:sp>
-      <p:sp>
-        <p:nvSpPr>
-          <p:cNvPr id="11" name="Ellipse 10"/>
-          <p:cNvSpPr/>
-          <p:nvPr/>
-        </p:nvSpPr>
-        <p:spPr>
-          <a:xfrm>
-            <a:off x="4702627" y="4559560"/>
-            <a:ext cx="2506825" cy="746448"/>
-          </a:xfrm>
-          <a:prstGeom prst="ellipse">
-            <a:avLst/>
-          </a:prstGeom>
-        </p:spPr>
-        <p:style>
-          <a:lnRef idx="1">
-            <a:schemeClr val="accent5"/>
-          </a:lnRef>
-          <a:fillRef idx="2">
-            <a:schemeClr val="accent5"/>
-          </a:fillRef>
-          <a:effectRef idx="1">
-            <a:schemeClr val="accent5"/>
-          </a:effectRef>
-          <a:fontRef idx="minor">
-            <a:schemeClr val="dk1"/>
-          </a:fontRef>
-        </p:style>
-        <p:txBody>
-          <a:bodyPr rtlCol="0" anchor="ctr"/>
-          <a:lstStyle/>
-          <a:p>
-            <a:pPr algn="ctr"/>
-            <a:r>
-              <a:rPr lang="en-GB" dirty="0"/>
-              <a:t>Peripheral</a:t>
-            </a:r>
-          </a:p>
-          <a:p>
-            <a:pPr algn="ctr"/>
-            <a:r>
-              <a:rPr lang="en-GB" dirty="0"/>
-              <a:t>Sensor</a:t>
-            </a:r>
-          </a:p>
-        </p:txBody>
-      </p:sp>
-      <p:sp>
-        <p:nvSpPr>
-          <p:cNvPr id="12" name="Ellipse 11"/>
-          <p:cNvSpPr/>
-          <p:nvPr/>
-        </p:nvSpPr>
-        <p:spPr>
-          <a:xfrm>
-            <a:off x="4702627" y="1300066"/>
-            <a:ext cx="2506825" cy="746448"/>
-          </a:xfrm>
-          <a:prstGeom prst="ellipse">
-            <a:avLst/>
-          </a:prstGeom>
-        </p:spPr>
-        <p:style>
-          <a:lnRef idx="1">
-            <a:schemeClr val="accent5"/>
-          </a:lnRef>
-          <a:fillRef idx="2">
-            <a:schemeClr val="accent5"/>
-          </a:fillRef>
-          <a:effectRef idx="1">
-            <a:schemeClr val="accent5"/>
-          </a:effectRef>
-          <a:fontRef idx="minor">
-            <a:schemeClr val="dk1"/>
-          </a:fontRef>
-        </p:style>
-        <p:txBody>
-          <a:bodyPr rtlCol="0" anchor="ctr"/>
-          <a:lstStyle/>
-          <a:p>
-            <a:pPr algn="ctr"/>
-            <a:r>
-              <a:rPr lang="en-GB" dirty="0"/>
-              <a:t>Peripheral</a:t>
-            </a:r>
-          </a:p>
-          <a:p>
-            <a:pPr algn="ctr"/>
-            <a:r>
-              <a:rPr lang="en-GB" dirty="0"/>
-              <a:t>Sensor</a:t>
-            </a:r>
+            <a:endParaRPr lang="en-GB" dirty="0"/>
           </a:p>
         </p:txBody>
       </p:sp>
       <p:cxnSp>
         <p:nvCxnSpPr>
-          <p:cNvPr id="14" name="Connecteur droit avec flèche 13"/>
+          <p:cNvPr id="70" name="Connecteur : en angle 69">
+            <a:extLst>
+              <a:ext uri="{FF2B5EF4-FFF2-40B4-BE49-F238E27FC236}">
+                <a16:creationId xmlns:a16="http://schemas.microsoft.com/office/drawing/2014/main" id="{9FD7B58A-6109-4D00-BD85-D79E18526E16}"/>
+              </a:ext>
+            </a:extLst>
+          </p:cNvPr>
           <p:cNvCxnSpPr>
-            <a:cxnSpLocks/>
+            <a:stCxn id="4" idx="1"/>
+            <a:endCxn id="15" idx="3"/>
           </p:cNvCxnSpPr>
           <p:nvPr/>
         </p:nvCxnSpPr>
         <p:spPr>
-          <a:xfrm flipV="1">
-            <a:off x="5956039" y="2046514"/>
-            <a:ext cx="0" cy="758890"/>
-          </a:xfrm>
-          <a:prstGeom prst="straightConnector1">
+          <a:xfrm rot="10800000" flipV="1">
+            <a:off x="2654013" y="2623792"/>
+            <a:ext cx="1612822" cy="1756894"/>
+          </a:xfrm>
+          <a:prstGeom prst="bentConnector3">
             <a:avLst/>
           </a:prstGeom>
           <a:ln w="28575">
@@ -4008,20 +4096,25 @@
       </p:cxnSp>
       <p:cxnSp>
         <p:nvCxnSpPr>
-          <p:cNvPr id="17" name="Connecteur droit avec flèche 16"/>
+          <p:cNvPr id="72" name="Connecteur : en angle 71">
+            <a:extLst>
+              <a:ext uri="{FF2B5EF4-FFF2-40B4-BE49-F238E27FC236}">
+                <a16:creationId xmlns:a16="http://schemas.microsoft.com/office/drawing/2014/main" id="{E7F8B891-1682-4327-A152-17E70CB08FF2}"/>
+              </a:ext>
+            </a:extLst>
+          </p:cNvPr>
           <p:cNvCxnSpPr>
-            <a:cxnSpLocks/>
-            <a:stCxn id="4" idx="3"/>
-            <a:endCxn id="5" idx="2"/>
+            <a:stCxn id="4" idx="1"/>
+            <a:endCxn id="14" idx="3"/>
           </p:cNvCxnSpPr>
           <p:nvPr/>
         </p:nvCxnSpPr>
         <p:spPr>
-          <a:xfrm>
-            <a:off x="6966856" y="3303037"/>
-            <a:ext cx="1237863" cy="0"/>
-          </a:xfrm>
-          <a:prstGeom prst="straightConnector1">
+          <a:xfrm rot="10800000" flipV="1">
+            <a:off x="2654013" y="2623791"/>
+            <a:ext cx="1612822" cy="544951"/>
+          </a:xfrm>
+          <a:prstGeom prst="bentConnector3">
             <a:avLst/>
           </a:prstGeom>
           <a:ln w="28575">
@@ -4046,20 +4139,25 @@
       </p:cxnSp>
       <p:cxnSp>
         <p:nvCxnSpPr>
-          <p:cNvPr id="20" name="Connecteur droit avec flèche 19"/>
+          <p:cNvPr id="74" name="Connecteur : en angle 73">
+            <a:extLst>
+              <a:ext uri="{FF2B5EF4-FFF2-40B4-BE49-F238E27FC236}">
+                <a16:creationId xmlns:a16="http://schemas.microsoft.com/office/drawing/2014/main" id="{C79443A3-AFF5-4304-8BD6-E4896E16AD08}"/>
+              </a:ext>
+            </a:extLst>
+          </p:cNvPr>
           <p:cNvCxnSpPr>
-            <a:cxnSpLocks/>
-            <a:stCxn id="4" idx="2"/>
-            <a:endCxn id="11" idx="0"/>
+            <a:stCxn id="4" idx="1"/>
+            <a:endCxn id="13" idx="3"/>
           </p:cNvCxnSpPr>
           <p:nvPr/>
         </p:nvCxnSpPr>
         <p:spPr>
-          <a:xfrm>
-            <a:off x="5956040" y="3800670"/>
-            <a:ext cx="0" cy="758890"/>
-          </a:xfrm>
-          <a:prstGeom prst="straightConnector1">
+          <a:xfrm rot="10800000">
+            <a:off x="2654015" y="1956800"/>
+            <a:ext cx="1612821" cy="666992"/>
+          </a:xfrm>
+          <a:prstGeom prst="bentConnector3">
             <a:avLst/>
           </a:prstGeom>
           <a:ln w="28575">
@@ -4084,20 +4182,25 @@
       </p:cxnSp>
       <p:cxnSp>
         <p:nvCxnSpPr>
-          <p:cNvPr id="23" name="Connecteur droit avec flèche 22"/>
+          <p:cNvPr id="76" name="Connecteur : en angle 75">
+            <a:extLst>
+              <a:ext uri="{FF2B5EF4-FFF2-40B4-BE49-F238E27FC236}">
+                <a16:creationId xmlns:a16="http://schemas.microsoft.com/office/drawing/2014/main" id="{BB8ED2B7-C0AE-4878-8A74-4A1F2C42193F}"/>
+              </a:ext>
+            </a:extLst>
+          </p:cNvPr>
           <p:cNvCxnSpPr>
-            <a:cxnSpLocks/>
-            <a:stCxn id="8" idx="6"/>
-            <a:endCxn id="4" idx="1"/>
+            <a:stCxn id="4" idx="1"/>
+            <a:endCxn id="12" idx="3"/>
           </p:cNvCxnSpPr>
           <p:nvPr/>
         </p:nvCxnSpPr>
         <p:spPr>
-          <a:xfrm>
-            <a:off x="3707361" y="3303037"/>
-            <a:ext cx="1237863" cy="0"/>
-          </a:xfrm>
-          <a:prstGeom prst="straightConnector1">
+          <a:xfrm rot="10800000">
+            <a:off x="2654015" y="744858"/>
+            <a:ext cx="1612821" cy="1878935"/>
+          </a:xfrm>
+          <a:prstGeom prst="bentConnector3">
             <a:avLst/>
           </a:prstGeom>
           <a:ln w="28575">
@@ -4122,19 +4225,25 @@
       </p:cxnSp>
       <p:cxnSp>
         <p:nvCxnSpPr>
-          <p:cNvPr id="26" name="Connecteur droit avec flèche 25"/>
+          <p:cNvPr id="80" name="Connecteur : en angle 79">
+            <a:extLst>
+              <a:ext uri="{FF2B5EF4-FFF2-40B4-BE49-F238E27FC236}">
+                <a16:creationId xmlns:a16="http://schemas.microsoft.com/office/drawing/2014/main" id="{3D5D5194-7CA8-48FB-BE2A-1D39D788DBD7}"/>
+              </a:ext>
+            </a:extLst>
+          </p:cNvPr>
           <p:cNvCxnSpPr>
-            <a:cxnSpLocks/>
-            <a:stCxn id="7" idx="5"/>
+            <a:stCxn id="4" idx="3"/>
+            <a:endCxn id="5" idx="1"/>
           </p:cNvCxnSpPr>
           <p:nvPr/>
         </p:nvCxnSpPr>
         <p:spPr>
-          <a:xfrm>
-            <a:off x="3340245" y="1937199"/>
-            <a:ext cx="1660380" cy="904823"/>
-          </a:xfrm>
-          <a:prstGeom prst="straightConnector1">
+          <a:xfrm flipV="1">
+            <a:off x="7335291" y="744857"/>
+            <a:ext cx="1665464" cy="1878935"/>
+          </a:xfrm>
+          <a:prstGeom prst="bentConnector3">
             <a:avLst/>
           </a:prstGeom>
           <a:ln w="28575">
@@ -4159,19 +4268,25 @@
       </p:cxnSp>
       <p:cxnSp>
         <p:nvCxnSpPr>
-          <p:cNvPr id="30" name="Connecteur droit avec flèche 29"/>
+          <p:cNvPr id="82" name="Connecteur : en angle 81">
+            <a:extLst>
+              <a:ext uri="{FF2B5EF4-FFF2-40B4-BE49-F238E27FC236}">
+                <a16:creationId xmlns:a16="http://schemas.microsoft.com/office/drawing/2014/main" id="{4D4BE8FE-1FBE-448D-9C92-5CD530AF43C9}"/>
+              </a:ext>
+            </a:extLst>
+          </p:cNvPr>
           <p:cNvCxnSpPr>
-            <a:cxnSpLocks/>
-            <a:endCxn id="10" idx="1"/>
+            <a:stCxn id="4" idx="3"/>
+            <a:endCxn id="9" idx="1"/>
           </p:cNvCxnSpPr>
           <p:nvPr/>
         </p:nvCxnSpPr>
         <p:spPr>
-          <a:xfrm>
-            <a:off x="6927004" y="3736084"/>
-            <a:ext cx="1644829" cy="932791"/>
-          </a:xfrm>
-          <a:prstGeom prst="straightConnector1">
+          <a:xfrm flipV="1">
+            <a:off x="7335291" y="1956800"/>
+            <a:ext cx="1665464" cy="666992"/>
+          </a:xfrm>
+          <a:prstGeom prst="bentConnector3">
             <a:avLst/>
           </a:prstGeom>
           <a:ln w="28575">
@@ -4196,19 +4311,25 @@
       </p:cxnSp>
       <p:cxnSp>
         <p:nvCxnSpPr>
-          <p:cNvPr id="31" name="Connecteur droit avec flèche 30"/>
+          <p:cNvPr id="84" name="Connecteur : en angle 83">
+            <a:extLst>
+              <a:ext uri="{FF2B5EF4-FFF2-40B4-BE49-F238E27FC236}">
+                <a16:creationId xmlns:a16="http://schemas.microsoft.com/office/drawing/2014/main" id="{5622AAF8-3D09-4F9C-BF45-2B87E3702383}"/>
+              </a:ext>
+            </a:extLst>
+          </p:cNvPr>
           <p:cNvCxnSpPr>
-            <a:cxnSpLocks/>
-            <a:stCxn id="6" idx="3"/>
+            <a:stCxn id="4" idx="3"/>
+            <a:endCxn id="10" idx="1"/>
           </p:cNvCxnSpPr>
           <p:nvPr/>
         </p:nvCxnSpPr>
         <p:spPr>
-          <a:xfrm flipH="1">
-            <a:off x="6927004" y="1937199"/>
-            <a:ext cx="1644830" cy="932791"/>
-          </a:xfrm>
-          <a:prstGeom prst="straightConnector1">
+          <a:xfrm>
+            <a:off x="7335291" y="2623792"/>
+            <a:ext cx="1665463" cy="544951"/>
+          </a:xfrm>
+          <a:prstGeom prst="bentConnector3">
             <a:avLst/>
           </a:prstGeom>
           <a:ln w="28575">
@@ -4233,19 +4354,25 @@
       </p:cxnSp>
       <p:cxnSp>
         <p:nvCxnSpPr>
-          <p:cNvPr id="39" name="Connecteur droit avec flèche 38"/>
+          <p:cNvPr id="86" name="Connecteur : en angle 85">
+            <a:extLst>
+              <a:ext uri="{FF2B5EF4-FFF2-40B4-BE49-F238E27FC236}">
+                <a16:creationId xmlns:a16="http://schemas.microsoft.com/office/drawing/2014/main" id="{12388A91-B0F2-4EF3-9613-FB64AE5117EA}"/>
+              </a:ext>
+            </a:extLst>
+          </p:cNvPr>
           <p:cNvCxnSpPr>
-            <a:cxnSpLocks/>
-            <a:endCxn id="9" idx="7"/>
+            <a:stCxn id="4" idx="3"/>
+            <a:endCxn id="11" idx="1"/>
           </p:cNvCxnSpPr>
           <p:nvPr/>
         </p:nvCxnSpPr>
         <p:spPr>
-          <a:xfrm flipH="1">
-            <a:off x="3340244" y="3764052"/>
-            <a:ext cx="1644833" cy="904823"/>
-          </a:xfrm>
-          <a:prstGeom prst="straightConnector1">
+          <a:xfrm>
+            <a:off x="7335291" y="2623792"/>
+            <a:ext cx="1665463" cy="1756894"/>
+          </a:xfrm>
+          <a:prstGeom prst="bentConnector3">
             <a:avLst/>
           </a:prstGeom>
           <a:ln w="28575">
@@ -4271,7 +4398,7 @@
     </p:spTree>
     <p:extLst>
       <p:ext uri="{BB962C8B-B14F-4D97-AF65-F5344CB8AC3E}">
-        <p14:creationId xmlns:p14="http://schemas.microsoft.com/office/powerpoint/2010/main" val="4059077200"/>
+        <p14:creationId xmlns:p14="http://schemas.microsoft.com/office/powerpoint/2010/main" val="1964989894"/>
       </p:ext>
     </p:extLst>
   </p:cSld>
@@ -4300,6 +4427,766 @@
       </p:grpSpPr>
       <p:sp>
         <p:nvSpPr>
+          <p:cNvPr id="4" name="Rectangle : coins arrondis 3"/>
+          <p:cNvSpPr/>
+          <p:nvPr/>
+        </p:nvSpPr>
+        <p:spPr>
+          <a:xfrm>
+            <a:off x="4945224" y="2805404"/>
+            <a:ext cx="2021632" cy="995266"/>
+          </a:xfrm>
+          <a:prstGeom prst="roundRect">
+            <a:avLst/>
+          </a:prstGeom>
+        </p:spPr>
+        <p:style>
+          <a:lnRef idx="1">
+            <a:schemeClr val="accent1"/>
+          </a:lnRef>
+          <a:fillRef idx="2">
+            <a:schemeClr val="accent1"/>
+          </a:fillRef>
+          <a:effectRef idx="1">
+            <a:schemeClr val="accent1"/>
+          </a:effectRef>
+          <a:fontRef idx="minor">
+            <a:schemeClr val="dk1"/>
+          </a:fontRef>
+        </p:style>
+        <p:txBody>
+          <a:bodyPr rtlCol="0" anchor="ctr"/>
+          <a:lstStyle/>
+          <a:p>
+            <a:pPr algn="ctr"/>
+            <a:r>
+              <a:rPr lang="en-GB" dirty="0"/>
+              <a:t>Central</a:t>
+            </a:r>
+          </a:p>
+          <a:p>
+            <a:pPr algn="ctr"/>
+            <a:r>
+              <a:rPr lang="en-GB" dirty="0"/>
+              <a:t>PC</a:t>
+            </a:r>
+          </a:p>
+        </p:txBody>
+      </p:sp>
+      <p:sp>
+        <p:nvSpPr>
+          <p:cNvPr id="5" name="Ellipse 4"/>
+          <p:cNvSpPr/>
+          <p:nvPr/>
+        </p:nvSpPr>
+        <p:spPr>
+          <a:xfrm>
+            <a:off x="8204719" y="2929813"/>
+            <a:ext cx="2506825" cy="746448"/>
+          </a:xfrm>
+          <a:prstGeom prst="ellipse">
+            <a:avLst/>
+          </a:prstGeom>
+        </p:spPr>
+        <p:style>
+          <a:lnRef idx="1">
+            <a:schemeClr val="accent5"/>
+          </a:lnRef>
+          <a:fillRef idx="2">
+            <a:schemeClr val="accent5"/>
+          </a:fillRef>
+          <a:effectRef idx="1">
+            <a:schemeClr val="accent5"/>
+          </a:effectRef>
+          <a:fontRef idx="minor">
+            <a:schemeClr val="dk1"/>
+          </a:fontRef>
+        </p:style>
+        <p:txBody>
+          <a:bodyPr rtlCol="0" anchor="ctr"/>
+          <a:lstStyle/>
+          <a:p>
+            <a:pPr algn="ctr"/>
+            <a:r>
+              <a:rPr lang="en-GB" dirty="0"/>
+              <a:t>Peripheral</a:t>
+            </a:r>
+          </a:p>
+          <a:p>
+            <a:pPr algn="ctr"/>
+            <a:r>
+              <a:rPr lang="en-GB" dirty="0"/>
+              <a:t>Sensor</a:t>
+            </a:r>
+          </a:p>
+        </p:txBody>
+      </p:sp>
+      <p:sp>
+        <p:nvSpPr>
+          <p:cNvPr id="6" name="Ellipse 5"/>
+          <p:cNvSpPr/>
+          <p:nvPr/>
+        </p:nvSpPr>
+        <p:spPr>
+          <a:xfrm>
+            <a:off x="8204718" y="1300066"/>
+            <a:ext cx="2506825" cy="746448"/>
+          </a:xfrm>
+          <a:prstGeom prst="ellipse">
+            <a:avLst/>
+          </a:prstGeom>
+        </p:spPr>
+        <p:style>
+          <a:lnRef idx="1">
+            <a:schemeClr val="accent5"/>
+          </a:lnRef>
+          <a:fillRef idx="2">
+            <a:schemeClr val="accent5"/>
+          </a:fillRef>
+          <a:effectRef idx="1">
+            <a:schemeClr val="accent5"/>
+          </a:effectRef>
+          <a:fontRef idx="minor">
+            <a:schemeClr val="dk1"/>
+          </a:fontRef>
+        </p:style>
+        <p:txBody>
+          <a:bodyPr rtlCol="0" anchor="ctr"/>
+          <a:lstStyle/>
+          <a:p>
+            <a:pPr algn="ctr"/>
+            <a:r>
+              <a:rPr lang="en-GB" dirty="0"/>
+              <a:t>Peripheral</a:t>
+            </a:r>
+          </a:p>
+          <a:p>
+            <a:pPr algn="ctr"/>
+            <a:r>
+              <a:rPr lang="en-GB" dirty="0"/>
+              <a:t>Sensor</a:t>
+            </a:r>
+          </a:p>
+        </p:txBody>
+      </p:sp>
+      <p:sp>
+        <p:nvSpPr>
+          <p:cNvPr id="7" name="Ellipse 6"/>
+          <p:cNvSpPr/>
+          <p:nvPr/>
+        </p:nvSpPr>
+        <p:spPr>
+          <a:xfrm>
+            <a:off x="1200536" y="1300066"/>
+            <a:ext cx="2506825" cy="746448"/>
+          </a:xfrm>
+          <a:prstGeom prst="ellipse">
+            <a:avLst/>
+          </a:prstGeom>
+        </p:spPr>
+        <p:style>
+          <a:lnRef idx="1">
+            <a:schemeClr val="accent5"/>
+          </a:lnRef>
+          <a:fillRef idx="2">
+            <a:schemeClr val="accent5"/>
+          </a:fillRef>
+          <a:effectRef idx="1">
+            <a:schemeClr val="accent5"/>
+          </a:effectRef>
+          <a:fontRef idx="minor">
+            <a:schemeClr val="dk1"/>
+          </a:fontRef>
+        </p:style>
+        <p:txBody>
+          <a:bodyPr rtlCol="0" anchor="ctr"/>
+          <a:lstStyle/>
+          <a:p>
+            <a:pPr algn="ctr"/>
+            <a:r>
+              <a:rPr lang="en-GB" dirty="0"/>
+              <a:t>Peripheral</a:t>
+            </a:r>
+          </a:p>
+          <a:p>
+            <a:pPr algn="ctr"/>
+            <a:r>
+              <a:rPr lang="en-GB" dirty="0"/>
+              <a:t>Sensor</a:t>
+            </a:r>
+          </a:p>
+        </p:txBody>
+      </p:sp>
+      <p:sp>
+        <p:nvSpPr>
+          <p:cNvPr id="8" name="Ellipse 7"/>
+          <p:cNvSpPr/>
+          <p:nvPr/>
+        </p:nvSpPr>
+        <p:spPr>
+          <a:xfrm>
+            <a:off x="1200536" y="2929813"/>
+            <a:ext cx="2506825" cy="746448"/>
+          </a:xfrm>
+          <a:prstGeom prst="ellipse">
+            <a:avLst/>
+          </a:prstGeom>
+        </p:spPr>
+        <p:style>
+          <a:lnRef idx="1">
+            <a:schemeClr val="accent5"/>
+          </a:lnRef>
+          <a:fillRef idx="2">
+            <a:schemeClr val="accent5"/>
+          </a:fillRef>
+          <a:effectRef idx="1">
+            <a:schemeClr val="accent5"/>
+          </a:effectRef>
+          <a:fontRef idx="minor">
+            <a:schemeClr val="dk1"/>
+          </a:fontRef>
+        </p:style>
+        <p:txBody>
+          <a:bodyPr rtlCol="0" anchor="ctr"/>
+          <a:lstStyle/>
+          <a:p>
+            <a:pPr algn="ctr"/>
+            <a:r>
+              <a:rPr lang="en-GB" dirty="0"/>
+              <a:t>Peripheral</a:t>
+            </a:r>
+          </a:p>
+          <a:p>
+            <a:pPr algn="ctr"/>
+            <a:r>
+              <a:rPr lang="en-GB" dirty="0"/>
+              <a:t>Sensor</a:t>
+            </a:r>
+          </a:p>
+        </p:txBody>
+      </p:sp>
+      <p:sp>
+        <p:nvSpPr>
+          <p:cNvPr id="9" name="Ellipse 8"/>
+          <p:cNvSpPr/>
+          <p:nvPr/>
+        </p:nvSpPr>
+        <p:spPr>
+          <a:xfrm>
+            <a:off x="1200535" y="4559560"/>
+            <a:ext cx="2506825" cy="746448"/>
+          </a:xfrm>
+          <a:prstGeom prst="ellipse">
+            <a:avLst/>
+          </a:prstGeom>
+        </p:spPr>
+        <p:style>
+          <a:lnRef idx="1">
+            <a:schemeClr val="accent5"/>
+          </a:lnRef>
+          <a:fillRef idx="2">
+            <a:schemeClr val="accent5"/>
+          </a:fillRef>
+          <a:effectRef idx="1">
+            <a:schemeClr val="accent5"/>
+          </a:effectRef>
+          <a:fontRef idx="minor">
+            <a:schemeClr val="dk1"/>
+          </a:fontRef>
+        </p:style>
+        <p:txBody>
+          <a:bodyPr rtlCol="0" anchor="ctr"/>
+          <a:lstStyle/>
+          <a:p>
+            <a:pPr algn="ctr"/>
+            <a:r>
+              <a:rPr lang="en-GB" dirty="0"/>
+              <a:t>Peripheral</a:t>
+            </a:r>
+          </a:p>
+          <a:p>
+            <a:pPr algn="ctr"/>
+            <a:r>
+              <a:rPr lang="en-GB" dirty="0"/>
+              <a:t>Sensor</a:t>
+            </a:r>
+          </a:p>
+        </p:txBody>
+      </p:sp>
+      <p:sp>
+        <p:nvSpPr>
+          <p:cNvPr id="10" name="Ellipse 9"/>
+          <p:cNvSpPr/>
+          <p:nvPr/>
+        </p:nvSpPr>
+        <p:spPr>
+          <a:xfrm>
+            <a:off x="8204717" y="4559560"/>
+            <a:ext cx="2506825" cy="746448"/>
+          </a:xfrm>
+          <a:prstGeom prst="ellipse">
+            <a:avLst/>
+          </a:prstGeom>
+        </p:spPr>
+        <p:style>
+          <a:lnRef idx="1">
+            <a:schemeClr val="accent5"/>
+          </a:lnRef>
+          <a:fillRef idx="2">
+            <a:schemeClr val="accent5"/>
+          </a:fillRef>
+          <a:effectRef idx="1">
+            <a:schemeClr val="accent5"/>
+          </a:effectRef>
+          <a:fontRef idx="minor">
+            <a:schemeClr val="dk1"/>
+          </a:fontRef>
+        </p:style>
+        <p:txBody>
+          <a:bodyPr rtlCol="0" anchor="ctr"/>
+          <a:lstStyle/>
+          <a:p>
+            <a:pPr algn="ctr"/>
+            <a:r>
+              <a:rPr lang="en-GB" dirty="0"/>
+              <a:t>Peripheral</a:t>
+            </a:r>
+          </a:p>
+          <a:p>
+            <a:pPr algn="ctr"/>
+            <a:r>
+              <a:rPr lang="en-GB" dirty="0"/>
+              <a:t>Sensor</a:t>
+            </a:r>
+          </a:p>
+        </p:txBody>
+      </p:sp>
+      <p:sp>
+        <p:nvSpPr>
+          <p:cNvPr id="11" name="Ellipse 10"/>
+          <p:cNvSpPr/>
+          <p:nvPr/>
+        </p:nvSpPr>
+        <p:spPr>
+          <a:xfrm>
+            <a:off x="4702627" y="4559560"/>
+            <a:ext cx="2506825" cy="746448"/>
+          </a:xfrm>
+          <a:prstGeom prst="ellipse">
+            <a:avLst/>
+          </a:prstGeom>
+        </p:spPr>
+        <p:style>
+          <a:lnRef idx="1">
+            <a:schemeClr val="accent5"/>
+          </a:lnRef>
+          <a:fillRef idx="2">
+            <a:schemeClr val="accent5"/>
+          </a:fillRef>
+          <a:effectRef idx="1">
+            <a:schemeClr val="accent5"/>
+          </a:effectRef>
+          <a:fontRef idx="minor">
+            <a:schemeClr val="dk1"/>
+          </a:fontRef>
+        </p:style>
+        <p:txBody>
+          <a:bodyPr rtlCol="0" anchor="ctr"/>
+          <a:lstStyle/>
+          <a:p>
+            <a:pPr algn="ctr"/>
+            <a:r>
+              <a:rPr lang="en-GB" dirty="0"/>
+              <a:t>Peripheral</a:t>
+            </a:r>
+          </a:p>
+          <a:p>
+            <a:pPr algn="ctr"/>
+            <a:r>
+              <a:rPr lang="en-GB" dirty="0"/>
+              <a:t>Sensor</a:t>
+            </a:r>
+          </a:p>
+        </p:txBody>
+      </p:sp>
+      <p:sp>
+        <p:nvSpPr>
+          <p:cNvPr id="12" name="Ellipse 11"/>
+          <p:cNvSpPr/>
+          <p:nvPr/>
+        </p:nvSpPr>
+        <p:spPr>
+          <a:xfrm>
+            <a:off x="4702627" y="1300066"/>
+            <a:ext cx="2506825" cy="746448"/>
+          </a:xfrm>
+          <a:prstGeom prst="ellipse">
+            <a:avLst/>
+          </a:prstGeom>
+        </p:spPr>
+        <p:style>
+          <a:lnRef idx="1">
+            <a:schemeClr val="accent5"/>
+          </a:lnRef>
+          <a:fillRef idx="2">
+            <a:schemeClr val="accent5"/>
+          </a:fillRef>
+          <a:effectRef idx="1">
+            <a:schemeClr val="accent5"/>
+          </a:effectRef>
+          <a:fontRef idx="minor">
+            <a:schemeClr val="dk1"/>
+          </a:fontRef>
+        </p:style>
+        <p:txBody>
+          <a:bodyPr rtlCol="0" anchor="ctr"/>
+          <a:lstStyle/>
+          <a:p>
+            <a:pPr algn="ctr"/>
+            <a:r>
+              <a:rPr lang="en-GB" dirty="0"/>
+              <a:t>Peripheral</a:t>
+            </a:r>
+          </a:p>
+          <a:p>
+            <a:pPr algn="ctr"/>
+            <a:r>
+              <a:rPr lang="en-GB" dirty="0"/>
+              <a:t>Sensor</a:t>
+            </a:r>
+          </a:p>
+        </p:txBody>
+      </p:sp>
+      <p:cxnSp>
+        <p:nvCxnSpPr>
+          <p:cNvPr id="14" name="Connecteur droit avec flèche 13"/>
+          <p:cNvCxnSpPr>
+            <a:cxnSpLocks/>
+          </p:cNvCxnSpPr>
+          <p:nvPr/>
+        </p:nvCxnSpPr>
+        <p:spPr>
+          <a:xfrm flipV="1">
+            <a:off x="5956039" y="2046514"/>
+            <a:ext cx="0" cy="758890"/>
+          </a:xfrm>
+          <a:prstGeom prst="straightConnector1">
+            <a:avLst/>
+          </a:prstGeom>
+          <a:ln w="28575">
+            <a:headEnd type="triangle"/>
+            <a:tailEnd type="triangle"/>
+          </a:ln>
+        </p:spPr>
+        <p:style>
+          <a:lnRef idx="1">
+            <a:schemeClr val="accent1"/>
+          </a:lnRef>
+          <a:fillRef idx="0">
+            <a:schemeClr val="accent1"/>
+          </a:fillRef>
+          <a:effectRef idx="0">
+            <a:schemeClr val="accent1"/>
+          </a:effectRef>
+          <a:fontRef idx="minor">
+            <a:schemeClr val="tx1"/>
+          </a:fontRef>
+        </p:style>
+      </p:cxnSp>
+      <p:cxnSp>
+        <p:nvCxnSpPr>
+          <p:cNvPr id="17" name="Connecteur droit avec flèche 16"/>
+          <p:cNvCxnSpPr>
+            <a:cxnSpLocks/>
+            <a:stCxn id="4" idx="3"/>
+            <a:endCxn id="5" idx="2"/>
+          </p:cNvCxnSpPr>
+          <p:nvPr/>
+        </p:nvCxnSpPr>
+        <p:spPr>
+          <a:xfrm>
+            <a:off x="6966856" y="3303037"/>
+            <a:ext cx="1237863" cy="0"/>
+          </a:xfrm>
+          <a:prstGeom prst="straightConnector1">
+            <a:avLst/>
+          </a:prstGeom>
+          <a:ln w="28575">
+            <a:headEnd type="triangle"/>
+            <a:tailEnd type="triangle"/>
+          </a:ln>
+        </p:spPr>
+        <p:style>
+          <a:lnRef idx="1">
+            <a:schemeClr val="accent1"/>
+          </a:lnRef>
+          <a:fillRef idx="0">
+            <a:schemeClr val="accent1"/>
+          </a:fillRef>
+          <a:effectRef idx="0">
+            <a:schemeClr val="accent1"/>
+          </a:effectRef>
+          <a:fontRef idx="minor">
+            <a:schemeClr val="tx1"/>
+          </a:fontRef>
+        </p:style>
+      </p:cxnSp>
+      <p:cxnSp>
+        <p:nvCxnSpPr>
+          <p:cNvPr id="20" name="Connecteur droit avec flèche 19"/>
+          <p:cNvCxnSpPr>
+            <a:cxnSpLocks/>
+            <a:stCxn id="4" idx="2"/>
+            <a:endCxn id="11" idx="0"/>
+          </p:cNvCxnSpPr>
+          <p:nvPr/>
+        </p:nvCxnSpPr>
+        <p:spPr>
+          <a:xfrm>
+            <a:off x="5956040" y="3800670"/>
+            <a:ext cx="0" cy="758890"/>
+          </a:xfrm>
+          <a:prstGeom prst="straightConnector1">
+            <a:avLst/>
+          </a:prstGeom>
+          <a:ln w="28575">
+            <a:headEnd type="triangle"/>
+            <a:tailEnd type="triangle"/>
+          </a:ln>
+        </p:spPr>
+        <p:style>
+          <a:lnRef idx="1">
+            <a:schemeClr val="accent1"/>
+          </a:lnRef>
+          <a:fillRef idx="0">
+            <a:schemeClr val="accent1"/>
+          </a:fillRef>
+          <a:effectRef idx="0">
+            <a:schemeClr val="accent1"/>
+          </a:effectRef>
+          <a:fontRef idx="minor">
+            <a:schemeClr val="tx1"/>
+          </a:fontRef>
+        </p:style>
+      </p:cxnSp>
+      <p:cxnSp>
+        <p:nvCxnSpPr>
+          <p:cNvPr id="23" name="Connecteur droit avec flèche 22"/>
+          <p:cNvCxnSpPr>
+            <a:cxnSpLocks/>
+            <a:stCxn id="8" idx="6"/>
+            <a:endCxn id="4" idx="1"/>
+          </p:cNvCxnSpPr>
+          <p:nvPr/>
+        </p:nvCxnSpPr>
+        <p:spPr>
+          <a:xfrm>
+            <a:off x="3707361" y="3303037"/>
+            <a:ext cx="1237863" cy="0"/>
+          </a:xfrm>
+          <a:prstGeom prst="straightConnector1">
+            <a:avLst/>
+          </a:prstGeom>
+          <a:ln w="28575">
+            <a:headEnd type="triangle"/>
+            <a:tailEnd type="triangle"/>
+          </a:ln>
+        </p:spPr>
+        <p:style>
+          <a:lnRef idx="1">
+            <a:schemeClr val="accent1"/>
+          </a:lnRef>
+          <a:fillRef idx="0">
+            <a:schemeClr val="accent1"/>
+          </a:fillRef>
+          <a:effectRef idx="0">
+            <a:schemeClr val="accent1"/>
+          </a:effectRef>
+          <a:fontRef idx="minor">
+            <a:schemeClr val="tx1"/>
+          </a:fontRef>
+        </p:style>
+      </p:cxnSp>
+      <p:cxnSp>
+        <p:nvCxnSpPr>
+          <p:cNvPr id="26" name="Connecteur droit avec flèche 25"/>
+          <p:cNvCxnSpPr>
+            <a:cxnSpLocks/>
+            <a:stCxn id="7" idx="5"/>
+          </p:cNvCxnSpPr>
+          <p:nvPr/>
+        </p:nvCxnSpPr>
+        <p:spPr>
+          <a:xfrm>
+            <a:off x="3340245" y="1937199"/>
+            <a:ext cx="1660380" cy="904823"/>
+          </a:xfrm>
+          <a:prstGeom prst="straightConnector1">
+            <a:avLst/>
+          </a:prstGeom>
+          <a:ln w="28575">
+            <a:headEnd type="triangle"/>
+            <a:tailEnd type="triangle"/>
+          </a:ln>
+        </p:spPr>
+        <p:style>
+          <a:lnRef idx="1">
+            <a:schemeClr val="accent1"/>
+          </a:lnRef>
+          <a:fillRef idx="0">
+            <a:schemeClr val="accent1"/>
+          </a:fillRef>
+          <a:effectRef idx="0">
+            <a:schemeClr val="accent1"/>
+          </a:effectRef>
+          <a:fontRef idx="minor">
+            <a:schemeClr val="tx1"/>
+          </a:fontRef>
+        </p:style>
+      </p:cxnSp>
+      <p:cxnSp>
+        <p:nvCxnSpPr>
+          <p:cNvPr id="30" name="Connecteur droit avec flèche 29"/>
+          <p:cNvCxnSpPr>
+            <a:cxnSpLocks/>
+            <a:endCxn id="10" idx="1"/>
+          </p:cNvCxnSpPr>
+          <p:nvPr/>
+        </p:nvCxnSpPr>
+        <p:spPr>
+          <a:xfrm>
+            <a:off x="6927004" y="3736084"/>
+            <a:ext cx="1644829" cy="932791"/>
+          </a:xfrm>
+          <a:prstGeom prst="straightConnector1">
+            <a:avLst/>
+          </a:prstGeom>
+          <a:ln w="28575">
+            <a:headEnd type="triangle"/>
+            <a:tailEnd type="triangle"/>
+          </a:ln>
+        </p:spPr>
+        <p:style>
+          <a:lnRef idx="1">
+            <a:schemeClr val="accent1"/>
+          </a:lnRef>
+          <a:fillRef idx="0">
+            <a:schemeClr val="accent1"/>
+          </a:fillRef>
+          <a:effectRef idx="0">
+            <a:schemeClr val="accent1"/>
+          </a:effectRef>
+          <a:fontRef idx="minor">
+            <a:schemeClr val="tx1"/>
+          </a:fontRef>
+        </p:style>
+      </p:cxnSp>
+      <p:cxnSp>
+        <p:nvCxnSpPr>
+          <p:cNvPr id="31" name="Connecteur droit avec flèche 30"/>
+          <p:cNvCxnSpPr>
+            <a:cxnSpLocks/>
+            <a:stCxn id="6" idx="3"/>
+          </p:cNvCxnSpPr>
+          <p:nvPr/>
+        </p:nvCxnSpPr>
+        <p:spPr>
+          <a:xfrm flipH="1">
+            <a:off x="6927004" y="1937199"/>
+            <a:ext cx="1644830" cy="932791"/>
+          </a:xfrm>
+          <a:prstGeom prst="straightConnector1">
+            <a:avLst/>
+          </a:prstGeom>
+          <a:ln w="28575">
+            <a:headEnd type="triangle"/>
+            <a:tailEnd type="triangle"/>
+          </a:ln>
+        </p:spPr>
+        <p:style>
+          <a:lnRef idx="1">
+            <a:schemeClr val="accent1"/>
+          </a:lnRef>
+          <a:fillRef idx="0">
+            <a:schemeClr val="accent1"/>
+          </a:fillRef>
+          <a:effectRef idx="0">
+            <a:schemeClr val="accent1"/>
+          </a:effectRef>
+          <a:fontRef idx="minor">
+            <a:schemeClr val="tx1"/>
+          </a:fontRef>
+        </p:style>
+      </p:cxnSp>
+      <p:cxnSp>
+        <p:nvCxnSpPr>
+          <p:cNvPr id="39" name="Connecteur droit avec flèche 38"/>
+          <p:cNvCxnSpPr>
+            <a:cxnSpLocks/>
+            <a:endCxn id="9" idx="7"/>
+          </p:cNvCxnSpPr>
+          <p:nvPr/>
+        </p:nvCxnSpPr>
+        <p:spPr>
+          <a:xfrm flipH="1">
+            <a:off x="3340244" y="3764052"/>
+            <a:ext cx="1644833" cy="904823"/>
+          </a:xfrm>
+          <a:prstGeom prst="straightConnector1">
+            <a:avLst/>
+          </a:prstGeom>
+          <a:ln w="28575">
+            <a:headEnd type="triangle"/>
+            <a:tailEnd type="triangle"/>
+          </a:ln>
+        </p:spPr>
+        <p:style>
+          <a:lnRef idx="1">
+            <a:schemeClr val="accent1"/>
+          </a:lnRef>
+          <a:fillRef idx="0">
+            <a:schemeClr val="accent1"/>
+          </a:fillRef>
+          <a:effectRef idx="0">
+            <a:schemeClr val="accent1"/>
+          </a:effectRef>
+          <a:fontRef idx="minor">
+            <a:schemeClr val="tx1"/>
+          </a:fontRef>
+        </p:style>
+      </p:cxnSp>
+    </p:spTree>
+    <p:extLst>
+      <p:ext uri="{BB962C8B-B14F-4D97-AF65-F5344CB8AC3E}">
+        <p14:creationId xmlns:p14="http://schemas.microsoft.com/office/powerpoint/2010/main" val="4059077200"/>
+      </p:ext>
+    </p:extLst>
+  </p:cSld>
+  <p:clrMapOvr>
+    <a:masterClrMapping/>
+  </p:clrMapOvr>
+</p:sld>
+</file>
+
+<file path=ppt/slides/slide4.xml><?xml version="1.0" encoding="utf-8"?>
+<p:sld xmlns:a="http://schemas.openxmlformats.org/drawingml/2006/main" xmlns:r="http://schemas.openxmlformats.org/officeDocument/2006/relationships" xmlns:p="http://schemas.openxmlformats.org/presentationml/2006/main">
+  <p:cSld>
+    <p:spTree>
+      <p:nvGrpSpPr>
+        <p:cNvPr id="1" name=""/>
+        <p:cNvGrpSpPr/>
+        <p:nvPr/>
+      </p:nvGrpSpPr>
+      <p:grpSpPr>
+        <a:xfrm>
+          <a:off x="0" y="0"/>
+          <a:ext cx="0" cy="0"/>
+          <a:chOff x="0" y="0"/>
+          <a:chExt cx="0" cy="0"/>
+        </a:xfrm>
+      </p:grpSpPr>
+      <p:sp>
+        <p:nvSpPr>
           <p:cNvPr id="5" name="Rectangle : coins arrondis 4"/>
           <p:cNvSpPr/>
           <p:nvPr/>
@@ -6379,7 +7266,7 @@
 </p:sld>
 </file>
 
-<file path=ppt/slides/slide4.xml><?xml version="1.0" encoding="utf-8"?>
+<file path=ppt/slides/slide5.xml><?xml version="1.0" encoding="utf-8"?>
 <p:sld xmlns:a="http://schemas.openxmlformats.org/drawingml/2006/main" xmlns:r="http://schemas.openxmlformats.org/officeDocument/2006/relationships" xmlns:p="http://schemas.openxmlformats.org/presentationml/2006/main">
   <p:cSld>
     <p:spTree>
@@ -8394,783 +9281,6 @@
 </p:sld>
 </file>
 
-<file path=ppt/slides/slide5.xml><?xml version="1.0" encoding="utf-8"?>
-<p:sld xmlns:a="http://schemas.openxmlformats.org/drawingml/2006/main" xmlns:r="http://schemas.openxmlformats.org/officeDocument/2006/relationships" xmlns:p="http://schemas.openxmlformats.org/presentationml/2006/main">
-  <p:cSld>
-    <p:spTree>
-      <p:nvGrpSpPr>
-        <p:cNvPr id="1" name=""/>
-        <p:cNvGrpSpPr/>
-        <p:nvPr/>
-      </p:nvGrpSpPr>
-      <p:grpSpPr>
-        <a:xfrm>
-          <a:off x="0" y="0"/>
-          <a:ext cx="0" cy="0"/>
-          <a:chOff x="0" y="0"/>
-          <a:chExt cx="0" cy="0"/>
-        </a:xfrm>
-      </p:grpSpPr>
-      <p:sp>
-        <p:nvSpPr>
-          <p:cNvPr id="42" name="Rectangle 41">
-            <a:extLst>
-              <a:ext uri="{FF2B5EF4-FFF2-40B4-BE49-F238E27FC236}">
-                <a16:creationId xmlns:a16="http://schemas.microsoft.com/office/drawing/2014/main" id="{F76BE44E-D1D0-4FD5-954F-15497990FD7E}"/>
-              </a:ext>
-            </a:extLst>
-          </p:cNvPr>
-          <p:cNvSpPr/>
-          <p:nvPr/>
-        </p:nvSpPr>
-        <p:spPr>
-          <a:xfrm>
-            <a:off x="223878" y="181826"/>
-            <a:ext cx="7812889" cy="3488418"/>
-          </a:xfrm>
-          <a:prstGeom prst="rect">
-            <a:avLst/>
-          </a:prstGeom>
-          <a:ln>
-            <a:headEnd type="none" w="med" len="med"/>
-            <a:tailEnd type="none" w="med" len="med"/>
-          </a:ln>
-        </p:spPr>
-        <p:style>
-          <a:lnRef idx="0">
-            <a:schemeClr val="accent1"/>
-          </a:lnRef>
-          <a:fillRef idx="3">
-            <a:schemeClr val="accent1"/>
-          </a:fillRef>
-          <a:effectRef idx="3">
-            <a:schemeClr val="accent1"/>
-          </a:effectRef>
-          <a:fontRef idx="minor">
-            <a:schemeClr val="lt1"/>
-          </a:fontRef>
-        </p:style>
-        <p:txBody>
-          <a:bodyPr rtlCol="0" anchor="t"/>
-          <a:lstStyle/>
-          <a:p>
-            <a:r>
-              <a:rPr lang="en-GB" b="1" dirty="0"/>
-              <a:t>A/D CONVERTER</a:t>
-            </a:r>
-          </a:p>
-        </p:txBody>
-      </p:sp>
-      <p:sp>
-        <p:nvSpPr>
-          <p:cNvPr id="43" name="Rectangle 42">
-            <a:extLst>
-              <a:ext uri="{FF2B5EF4-FFF2-40B4-BE49-F238E27FC236}">
-                <a16:creationId xmlns:a16="http://schemas.microsoft.com/office/drawing/2014/main" id="{BC0E1AEC-D7B4-48E4-B5DE-E550D87B4FB3}"/>
-              </a:ext>
-            </a:extLst>
-          </p:cNvPr>
-          <p:cNvSpPr/>
-          <p:nvPr/>
-        </p:nvSpPr>
-        <p:spPr>
-          <a:xfrm>
-            <a:off x="402318" y="593724"/>
-            <a:ext cx="7454058" cy="2934154"/>
-          </a:xfrm>
-          <a:prstGeom prst="rect">
-            <a:avLst/>
-          </a:prstGeom>
-          <a:solidFill>
-            <a:schemeClr val="accent1">
-              <a:lumMod val="60000"/>
-              <a:lumOff val="40000"/>
-            </a:schemeClr>
-          </a:solidFill>
-          <a:ln>
-            <a:noFill/>
-            <a:headEnd type="none" w="med" len="med"/>
-            <a:tailEnd type="none" w="med" len="med"/>
-          </a:ln>
-        </p:spPr>
-        <p:style>
-          <a:lnRef idx="2">
-            <a:schemeClr val="dk1"/>
-          </a:lnRef>
-          <a:fillRef idx="1">
-            <a:schemeClr val="lt1"/>
-          </a:fillRef>
-          <a:effectRef idx="0">
-            <a:schemeClr val="dk1"/>
-          </a:effectRef>
-          <a:fontRef idx="minor">
-            <a:schemeClr val="dk1"/>
-          </a:fontRef>
-        </p:style>
-        <p:txBody>
-          <a:bodyPr rtlCol="0" anchor="t"/>
-          <a:lstStyle/>
-          <a:p>
-            <a:r>
-              <a:rPr lang="en-GB" dirty="0"/>
-              <a:t>Service  </a:t>
-            </a:r>
-            <a:r>
-              <a:rPr lang="en-GB" b="1" dirty="0"/>
-              <a:t>ADC</a:t>
-            </a:r>
-          </a:p>
-        </p:txBody>
-      </p:sp>
-      <p:sp>
-        <p:nvSpPr>
-          <p:cNvPr id="44" name="Rectangle 43">
-            <a:extLst>
-              <a:ext uri="{FF2B5EF4-FFF2-40B4-BE49-F238E27FC236}">
-                <a16:creationId xmlns:a16="http://schemas.microsoft.com/office/drawing/2014/main" id="{12E4A3E9-CFDF-47A4-9E6C-0E8A86A3C266}"/>
-              </a:ext>
-            </a:extLst>
-          </p:cNvPr>
-          <p:cNvSpPr/>
-          <p:nvPr/>
-        </p:nvSpPr>
-        <p:spPr>
-          <a:xfrm>
-            <a:off x="547008" y="1387474"/>
-            <a:ext cx="3460750" cy="1952625"/>
-          </a:xfrm>
-          <a:prstGeom prst="rect">
-            <a:avLst/>
-          </a:prstGeom>
-          <a:solidFill>
-            <a:schemeClr val="accent1">
-              <a:lumMod val="20000"/>
-              <a:lumOff val="80000"/>
-            </a:schemeClr>
-          </a:solidFill>
-          <a:ln w="9525" cap="flat" cmpd="sng" algn="ctr">
-            <a:noFill/>
-            <a:prstDash val="solid"/>
-            <a:round/>
-            <a:headEnd type="none" w="med" len="med"/>
-            <a:tailEnd type="none" w="med" len="med"/>
-          </a:ln>
-        </p:spPr>
-        <p:style>
-          <a:lnRef idx="0">
-            <a:scrgbClr r="0" g="0" b="0"/>
-          </a:lnRef>
-          <a:fillRef idx="0">
-            <a:scrgbClr r="0" g="0" b="0"/>
-          </a:fillRef>
-          <a:effectRef idx="0">
-            <a:scrgbClr r="0" g="0" b="0"/>
-          </a:effectRef>
-          <a:fontRef idx="minor">
-            <a:schemeClr val="dk1"/>
-          </a:fontRef>
-        </p:style>
-        <p:txBody>
-          <a:bodyPr rtlCol="0" anchor="t"/>
-          <a:lstStyle/>
-          <a:p>
-            <a:r>
-              <a:rPr lang="en-GB" dirty="0"/>
-              <a:t>Characteristic </a:t>
-            </a:r>
-            <a:r>
-              <a:rPr lang="en-GB" b="1" dirty="0"/>
-              <a:t>VALUE</a:t>
-            </a:r>
-          </a:p>
-        </p:txBody>
-      </p:sp>
-      <p:sp>
-        <p:nvSpPr>
-          <p:cNvPr id="45" name="Rectangle 44">
-            <a:extLst>
-              <a:ext uri="{FF2B5EF4-FFF2-40B4-BE49-F238E27FC236}">
-                <a16:creationId xmlns:a16="http://schemas.microsoft.com/office/drawing/2014/main" id="{1AE7D02F-A009-4771-8716-377246F8CE57}"/>
-              </a:ext>
-            </a:extLst>
-          </p:cNvPr>
-          <p:cNvSpPr/>
-          <p:nvPr/>
-        </p:nvSpPr>
-        <p:spPr>
-          <a:xfrm>
-            <a:off x="547008" y="981074"/>
-            <a:ext cx="3460750" cy="288000"/>
-          </a:xfrm>
-          <a:prstGeom prst="rect">
-            <a:avLst/>
-          </a:prstGeom>
-          <a:solidFill>
-            <a:schemeClr val="accent1">
-              <a:lumMod val="20000"/>
-              <a:lumOff val="80000"/>
-            </a:schemeClr>
-          </a:solidFill>
-          <a:ln w="9525" cap="flat" cmpd="sng" algn="ctr">
-            <a:noFill/>
-            <a:prstDash val="solid"/>
-            <a:round/>
-            <a:headEnd type="none" w="med" len="med"/>
-            <a:tailEnd type="none" w="med" len="med"/>
-          </a:ln>
-        </p:spPr>
-        <p:style>
-          <a:lnRef idx="0">
-            <a:scrgbClr r="0" g="0" b="0"/>
-          </a:lnRef>
-          <a:fillRef idx="0">
-            <a:scrgbClr r="0" g="0" b="0"/>
-          </a:fillRef>
-          <a:effectRef idx="0">
-            <a:scrgbClr r="0" g="0" b="0"/>
-          </a:effectRef>
-          <a:fontRef idx="minor">
-            <a:schemeClr val="dk1"/>
-          </a:fontRef>
-        </p:style>
-        <p:txBody>
-          <a:bodyPr rtlCol="0" anchor="ctr"/>
-          <a:lstStyle/>
-          <a:p>
-            <a:r>
-              <a:rPr lang="en-GB" b="1" dirty="0"/>
-              <a:t>UUID</a:t>
-            </a:r>
-            <a:r>
-              <a:rPr lang="en-GB" dirty="0"/>
-              <a:t> 0x0ADC</a:t>
-            </a:r>
-          </a:p>
-        </p:txBody>
-      </p:sp>
-      <p:sp>
-        <p:nvSpPr>
-          <p:cNvPr id="46" name="Rectangle 45">
-            <a:extLst>
-              <a:ext uri="{FF2B5EF4-FFF2-40B4-BE49-F238E27FC236}">
-                <a16:creationId xmlns:a16="http://schemas.microsoft.com/office/drawing/2014/main" id="{1F3A179A-ECA9-48A4-9DA2-1A2305A22E5F}"/>
-              </a:ext>
-            </a:extLst>
-          </p:cNvPr>
-          <p:cNvSpPr/>
-          <p:nvPr/>
-        </p:nvSpPr>
-        <p:spPr>
-          <a:xfrm>
-            <a:off x="645433" y="1791624"/>
-            <a:ext cx="3251200" cy="288000"/>
-          </a:xfrm>
-          <a:prstGeom prst="rect">
-            <a:avLst/>
-          </a:prstGeom>
-          <a:ln>
-            <a:noFill/>
-            <a:headEnd type="none" w="med" len="med"/>
-            <a:tailEnd type="none" w="med" len="med"/>
-          </a:ln>
-        </p:spPr>
-        <p:style>
-          <a:lnRef idx="2">
-            <a:schemeClr val="dk1"/>
-          </a:lnRef>
-          <a:fillRef idx="1">
-            <a:schemeClr val="lt1"/>
-          </a:fillRef>
-          <a:effectRef idx="0">
-            <a:schemeClr val="dk1"/>
-          </a:effectRef>
-          <a:fontRef idx="minor">
-            <a:schemeClr val="dk1"/>
-          </a:fontRef>
-        </p:style>
-        <p:txBody>
-          <a:bodyPr rtlCol="0" anchor="ctr"/>
-          <a:lstStyle/>
-          <a:p>
-            <a:r>
-              <a:rPr lang="en-GB" b="1" dirty="0"/>
-              <a:t>UUID</a:t>
-            </a:r>
-            <a:r>
-              <a:rPr lang="en-GB" dirty="0"/>
-              <a:t> 0x1ADC</a:t>
-            </a:r>
-          </a:p>
-        </p:txBody>
-      </p:sp>
-      <p:sp>
-        <p:nvSpPr>
-          <p:cNvPr id="47" name="Rectangle 46">
-            <a:extLst>
-              <a:ext uri="{FF2B5EF4-FFF2-40B4-BE49-F238E27FC236}">
-                <a16:creationId xmlns:a16="http://schemas.microsoft.com/office/drawing/2014/main" id="{95982184-F1BC-48EE-ACB7-196E458ACA41}"/>
-              </a:ext>
-            </a:extLst>
-          </p:cNvPr>
-          <p:cNvSpPr/>
-          <p:nvPr/>
-        </p:nvSpPr>
-        <p:spPr>
-          <a:xfrm>
-            <a:off x="651783" y="2178974"/>
-            <a:ext cx="3251200" cy="288000"/>
-          </a:xfrm>
-          <a:prstGeom prst="rect">
-            <a:avLst/>
-          </a:prstGeom>
-          <a:ln>
-            <a:noFill/>
-            <a:headEnd type="none" w="med" len="med"/>
-            <a:tailEnd type="none" w="med" len="med"/>
-          </a:ln>
-        </p:spPr>
-        <p:style>
-          <a:lnRef idx="2">
-            <a:schemeClr val="dk1"/>
-          </a:lnRef>
-          <a:fillRef idx="1">
-            <a:schemeClr val="lt1"/>
-          </a:fillRef>
-          <a:effectRef idx="0">
-            <a:schemeClr val="dk1"/>
-          </a:effectRef>
-          <a:fontRef idx="minor">
-            <a:schemeClr val="dk1"/>
-          </a:fontRef>
-        </p:style>
-        <p:txBody>
-          <a:bodyPr rtlCol="0" anchor="ctr"/>
-          <a:lstStyle/>
-          <a:p>
-            <a:r>
-              <a:rPr lang="en-GB" b="1" dirty="0"/>
-              <a:t>Value </a:t>
-            </a:r>
-            <a:r>
-              <a:rPr lang="en-GB" dirty="0"/>
-              <a:t>A/D output</a:t>
-            </a:r>
-            <a:r>
-              <a:rPr lang="en-GB" b="1" dirty="0"/>
-              <a:t> </a:t>
-            </a:r>
-            <a:endParaRPr lang="en-GB" dirty="0"/>
-          </a:p>
-        </p:txBody>
-      </p:sp>
-      <p:sp>
-        <p:nvSpPr>
-          <p:cNvPr id="48" name="Rectangle 47">
-            <a:extLst>
-              <a:ext uri="{FF2B5EF4-FFF2-40B4-BE49-F238E27FC236}">
-                <a16:creationId xmlns:a16="http://schemas.microsoft.com/office/drawing/2014/main" id="{20736580-055E-441C-A269-2E52BDF6B606}"/>
-              </a:ext>
-            </a:extLst>
-          </p:cNvPr>
-          <p:cNvSpPr/>
-          <p:nvPr/>
-        </p:nvSpPr>
-        <p:spPr>
-          <a:xfrm>
-            <a:off x="651783" y="2566324"/>
-            <a:ext cx="3251200" cy="288000"/>
-          </a:xfrm>
-          <a:prstGeom prst="rect">
-            <a:avLst/>
-          </a:prstGeom>
-          <a:ln>
-            <a:noFill/>
-            <a:headEnd type="none" w="med" len="med"/>
-            <a:tailEnd type="none" w="med" len="med"/>
-          </a:ln>
-        </p:spPr>
-        <p:style>
-          <a:lnRef idx="2">
-            <a:schemeClr val="dk1"/>
-          </a:lnRef>
-          <a:fillRef idx="1">
-            <a:schemeClr val="lt1"/>
-          </a:fillRef>
-          <a:effectRef idx="0">
-            <a:schemeClr val="dk1"/>
-          </a:effectRef>
-          <a:fontRef idx="minor">
-            <a:schemeClr val="dk1"/>
-          </a:fontRef>
-        </p:style>
-        <p:txBody>
-          <a:bodyPr rtlCol="0" anchor="ctr"/>
-          <a:lstStyle/>
-          <a:p>
-            <a:r>
-              <a:rPr lang="en-GB" b="1" dirty="0"/>
-              <a:t>Value type </a:t>
-            </a:r>
-            <a:r>
-              <a:rPr lang="en-GB" dirty="0"/>
-              <a:t>Integer</a:t>
-            </a:r>
-            <a:endParaRPr lang="en-GB" b="1" dirty="0"/>
-          </a:p>
-        </p:txBody>
-      </p:sp>
-      <p:sp>
-        <p:nvSpPr>
-          <p:cNvPr id="49" name="Rectangle 48">
-            <a:extLst>
-              <a:ext uri="{FF2B5EF4-FFF2-40B4-BE49-F238E27FC236}">
-                <a16:creationId xmlns:a16="http://schemas.microsoft.com/office/drawing/2014/main" id="{F5F80629-605E-4AE7-9D79-5E1678C68F2C}"/>
-              </a:ext>
-            </a:extLst>
-          </p:cNvPr>
-          <p:cNvSpPr/>
-          <p:nvPr/>
-        </p:nvSpPr>
-        <p:spPr>
-          <a:xfrm>
-            <a:off x="651783" y="2953674"/>
-            <a:ext cx="3251200" cy="288000"/>
-          </a:xfrm>
-          <a:prstGeom prst="rect">
-            <a:avLst/>
-          </a:prstGeom>
-          <a:ln>
-            <a:noFill/>
-            <a:headEnd type="none" w="med" len="med"/>
-            <a:tailEnd type="none" w="med" len="med"/>
-          </a:ln>
-        </p:spPr>
-        <p:style>
-          <a:lnRef idx="2">
-            <a:schemeClr val="dk1"/>
-          </a:lnRef>
-          <a:fillRef idx="1">
-            <a:schemeClr val="lt1"/>
-          </a:fillRef>
-          <a:effectRef idx="0">
-            <a:schemeClr val="dk1"/>
-          </a:effectRef>
-          <a:fontRef idx="minor">
-            <a:schemeClr val="dk1"/>
-          </a:fontRef>
-        </p:style>
-        <p:txBody>
-          <a:bodyPr rtlCol="0" anchor="ctr"/>
-          <a:lstStyle/>
-          <a:p>
-            <a:r>
-              <a:rPr lang="en-GB" b="1" dirty="0"/>
-              <a:t>Properties </a:t>
-            </a:r>
-            <a:r>
-              <a:rPr lang="en-GB" dirty="0"/>
-              <a:t>R | NOTIFY</a:t>
-            </a:r>
-          </a:p>
-        </p:txBody>
-      </p:sp>
-      <p:sp>
-        <p:nvSpPr>
-          <p:cNvPr id="10" name="Rectangle 9">
-            <a:extLst>
-              <a:ext uri="{FF2B5EF4-FFF2-40B4-BE49-F238E27FC236}">
-                <a16:creationId xmlns:a16="http://schemas.microsoft.com/office/drawing/2014/main" id="{E2E269DD-A6B0-4031-82F6-E495118BB017}"/>
-              </a:ext>
-            </a:extLst>
-          </p:cNvPr>
-          <p:cNvSpPr/>
-          <p:nvPr/>
-        </p:nvSpPr>
-        <p:spPr>
-          <a:xfrm>
-            <a:off x="4233894" y="1387474"/>
-            <a:ext cx="3460750" cy="1952625"/>
-          </a:xfrm>
-          <a:prstGeom prst="rect">
-            <a:avLst/>
-          </a:prstGeom>
-          <a:solidFill>
-            <a:schemeClr val="accent1">
-              <a:lumMod val="20000"/>
-              <a:lumOff val="80000"/>
-            </a:schemeClr>
-          </a:solidFill>
-          <a:ln w="9525" cap="flat" cmpd="sng" algn="ctr">
-            <a:noFill/>
-            <a:prstDash val="solid"/>
-            <a:round/>
-            <a:headEnd type="none" w="med" len="med"/>
-            <a:tailEnd type="none" w="med" len="med"/>
-          </a:ln>
-        </p:spPr>
-        <p:style>
-          <a:lnRef idx="0">
-            <a:scrgbClr r="0" g="0" b="0"/>
-          </a:lnRef>
-          <a:fillRef idx="0">
-            <a:scrgbClr r="0" g="0" b="0"/>
-          </a:fillRef>
-          <a:effectRef idx="0">
-            <a:scrgbClr r="0" g="0" b="0"/>
-          </a:effectRef>
-          <a:fontRef idx="minor">
-            <a:schemeClr val="dk1"/>
-          </a:fontRef>
-        </p:style>
-        <p:txBody>
-          <a:bodyPr rtlCol="0" anchor="t"/>
-          <a:lstStyle/>
-          <a:p>
-            <a:r>
-              <a:rPr lang="en-GB" dirty="0"/>
-              <a:t>Characteristic </a:t>
-            </a:r>
-            <a:r>
-              <a:rPr lang="en-GB" b="1" dirty="0"/>
-              <a:t>SLEEP</a:t>
-            </a:r>
-          </a:p>
-        </p:txBody>
-      </p:sp>
-      <p:sp>
-        <p:nvSpPr>
-          <p:cNvPr id="11" name="Rectangle 10">
-            <a:extLst>
-              <a:ext uri="{FF2B5EF4-FFF2-40B4-BE49-F238E27FC236}">
-                <a16:creationId xmlns:a16="http://schemas.microsoft.com/office/drawing/2014/main" id="{1EE8F6D3-E9CC-4DEA-B8BF-839ECECE702E}"/>
-              </a:ext>
-            </a:extLst>
-          </p:cNvPr>
-          <p:cNvSpPr/>
-          <p:nvPr/>
-        </p:nvSpPr>
-        <p:spPr>
-          <a:xfrm>
-            <a:off x="4332319" y="1791624"/>
-            <a:ext cx="3251200" cy="288000"/>
-          </a:xfrm>
-          <a:prstGeom prst="rect">
-            <a:avLst/>
-          </a:prstGeom>
-          <a:ln>
-            <a:noFill/>
-            <a:headEnd type="none" w="med" len="med"/>
-            <a:tailEnd type="none" w="med" len="med"/>
-          </a:ln>
-        </p:spPr>
-        <p:style>
-          <a:lnRef idx="2">
-            <a:schemeClr val="dk1"/>
-          </a:lnRef>
-          <a:fillRef idx="1">
-            <a:schemeClr val="lt1"/>
-          </a:fillRef>
-          <a:effectRef idx="0">
-            <a:schemeClr val="dk1"/>
-          </a:effectRef>
-          <a:fontRef idx="minor">
-            <a:schemeClr val="dk1"/>
-          </a:fontRef>
-        </p:style>
-        <p:txBody>
-          <a:bodyPr rtlCol="0" anchor="ctr"/>
-          <a:lstStyle/>
-          <a:p>
-            <a:r>
-              <a:rPr lang="en-GB" b="1" dirty="0"/>
-              <a:t>UUID</a:t>
-            </a:r>
-            <a:r>
-              <a:rPr lang="en-GB" dirty="0"/>
-              <a:t> 0x2ADC</a:t>
-            </a:r>
-          </a:p>
-        </p:txBody>
-      </p:sp>
-      <p:sp>
-        <p:nvSpPr>
-          <p:cNvPr id="12" name="Rectangle 11">
-            <a:extLst>
-              <a:ext uri="{FF2B5EF4-FFF2-40B4-BE49-F238E27FC236}">
-                <a16:creationId xmlns:a16="http://schemas.microsoft.com/office/drawing/2014/main" id="{747D75B2-CEFD-48D8-8BD4-A020E29DF0B9}"/>
-              </a:ext>
-            </a:extLst>
-          </p:cNvPr>
-          <p:cNvSpPr/>
-          <p:nvPr/>
-        </p:nvSpPr>
-        <p:spPr>
-          <a:xfrm>
-            <a:off x="4338669" y="2178974"/>
-            <a:ext cx="3251200" cy="288000"/>
-          </a:xfrm>
-          <a:prstGeom prst="rect">
-            <a:avLst/>
-          </a:prstGeom>
-          <a:ln>
-            <a:noFill/>
-            <a:headEnd type="none" w="med" len="med"/>
-            <a:tailEnd type="none" w="med" len="med"/>
-          </a:ln>
-        </p:spPr>
-        <p:style>
-          <a:lnRef idx="2">
-            <a:schemeClr val="dk1"/>
-          </a:lnRef>
-          <a:fillRef idx="1">
-            <a:schemeClr val="lt1"/>
-          </a:fillRef>
-          <a:effectRef idx="0">
-            <a:schemeClr val="dk1"/>
-          </a:effectRef>
-          <a:fontRef idx="minor">
-            <a:schemeClr val="dk1"/>
-          </a:fontRef>
-        </p:style>
-        <p:txBody>
-          <a:bodyPr rtlCol="0" anchor="ctr"/>
-          <a:lstStyle/>
-          <a:p>
-            <a:r>
-              <a:rPr lang="en-GB" b="1" dirty="0"/>
-              <a:t>Value </a:t>
-            </a:r>
-            <a:r>
-              <a:rPr lang="en-GB" dirty="0"/>
-              <a:t>Sleep</a:t>
-            </a:r>
-          </a:p>
-        </p:txBody>
-      </p:sp>
-      <p:sp>
-        <p:nvSpPr>
-          <p:cNvPr id="13" name="Rectangle 12">
-            <a:extLst>
-              <a:ext uri="{FF2B5EF4-FFF2-40B4-BE49-F238E27FC236}">
-                <a16:creationId xmlns:a16="http://schemas.microsoft.com/office/drawing/2014/main" id="{3BCA9220-7C5A-42C1-AD93-082B73BD4353}"/>
-              </a:ext>
-            </a:extLst>
-          </p:cNvPr>
-          <p:cNvSpPr/>
-          <p:nvPr/>
-        </p:nvSpPr>
-        <p:spPr>
-          <a:xfrm>
-            <a:off x="4338669" y="2566324"/>
-            <a:ext cx="3251200" cy="288000"/>
-          </a:xfrm>
-          <a:prstGeom prst="rect">
-            <a:avLst/>
-          </a:prstGeom>
-          <a:ln>
-            <a:noFill/>
-            <a:headEnd type="none" w="med" len="med"/>
-            <a:tailEnd type="none" w="med" len="med"/>
-          </a:ln>
-        </p:spPr>
-        <p:style>
-          <a:lnRef idx="2">
-            <a:schemeClr val="dk1"/>
-          </a:lnRef>
-          <a:fillRef idx="1">
-            <a:schemeClr val="lt1"/>
-          </a:fillRef>
-          <a:effectRef idx="0">
-            <a:schemeClr val="dk1"/>
-          </a:effectRef>
-          <a:fontRef idx="minor">
-            <a:schemeClr val="dk1"/>
-          </a:fontRef>
-        </p:style>
-        <p:txBody>
-          <a:bodyPr rtlCol="0" anchor="ctr"/>
-          <a:lstStyle/>
-          <a:p>
-            <a:r>
-              <a:rPr lang="en-GB" b="1" dirty="0"/>
-              <a:t>Value type </a:t>
-            </a:r>
-            <a:r>
-              <a:rPr lang="en-GB" dirty="0"/>
-              <a:t>Boolean</a:t>
-            </a:r>
-            <a:endParaRPr lang="en-GB" b="1" dirty="0"/>
-          </a:p>
-        </p:txBody>
-      </p:sp>
-      <p:sp>
-        <p:nvSpPr>
-          <p:cNvPr id="14" name="Rectangle 13">
-            <a:extLst>
-              <a:ext uri="{FF2B5EF4-FFF2-40B4-BE49-F238E27FC236}">
-                <a16:creationId xmlns:a16="http://schemas.microsoft.com/office/drawing/2014/main" id="{A9715A47-A181-4DC7-A4CF-EC1C3170C2B4}"/>
-              </a:ext>
-            </a:extLst>
-          </p:cNvPr>
-          <p:cNvSpPr/>
-          <p:nvPr/>
-        </p:nvSpPr>
-        <p:spPr>
-          <a:xfrm>
-            <a:off x="4338669" y="2953674"/>
-            <a:ext cx="3251200" cy="288000"/>
-          </a:xfrm>
-          <a:prstGeom prst="rect">
-            <a:avLst/>
-          </a:prstGeom>
-          <a:ln>
-            <a:noFill/>
-            <a:headEnd type="none" w="med" len="med"/>
-            <a:tailEnd type="none" w="med" len="med"/>
-          </a:ln>
-        </p:spPr>
-        <p:style>
-          <a:lnRef idx="2">
-            <a:schemeClr val="dk1"/>
-          </a:lnRef>
-          <a:fillRef idx="1">
-            <a:schemeClr val="lt1"/>
-          </a:fillRef>
-          <a:effectRef idx="0">
-            <a:schemeClr val="dk1"/>
-          </a:effectRef>
-          <a:fontRef idx="minor">
-            <a:schemeClr val="dk1"/>
-          </a:fontRef>
-        </p:style>
-        <p:txBody>
-          <a:bodyPr rtlCol="0" anchor="ctr"/>
-          <a:lstStyle/>
-          <a:p>
-            <a:r>
-              <a:rPr lang="en-GB" b="1" dirty="0"/>
-              <a:t>Properties </a:t>
-            </a:r>
-            <a:r>
-              <a:rPr lang="en-GB" dirty="0"/>
-              <a:t>R | NOTIFY</a:t>
-            </a:r>
-          </a:p>
-        </p:txBody>
-      </p:sp>
-    </p:spTree>
-    <p:extLst>
-      <p:ext uri="{BB962C8B-B14F-4D97-AF65-F5344CB8AC3E}">
-        <p14:creationId xmlns:p14="http://schemas.microsoft.com/office/powerpoint/2010/main" val="482507622"/>
-      </p:ext>
-    </p:extLst>
-  </p:cSld>
-  <p:clrMapOvr>
-    <a:masterClrMapping/>
-  </p:clrMapOvr>
-</p:sld>
-</file>
-
 <file path=ppt/slides/slide6.xml><?xml version="1.0" encoding="utf-8"?>
 <p:sld xmlns:a="http://schemas.openxmlformats.org/drawingml/2006/main" xmlns:r="http://schemas.openxmlformats.org/officeDocument/2006/relationships" xmlns:p="http://schemas.openxmlformats.org/presentationml/2006/main">
   <p:cSld>
@@ -9190,10 +9300,10 @@
       </p:grpSpPr>
       <p:sp>
         <p:nvSpPr>
-          <p:cNvPr id="4" name="Rectangle 3">
+          <p:cNvPr id="42" name="Rectangle 41">
             <a:extLst>
               <a:ext uri="{FF2B5EF4-FFF2-40B4-BE49-F238E27FC236}">
-                <a16:creationId xmlns:a16="http://schemas.microsoft.com/office/drawing/2014/main" id="{E7952A56-BBF3-442D-9F55-8199822357F1}"/>
+                <a16:creationId xmlns:a16="http://schemas.microsoft.com/office/drawing/2014/main" id="{F76BE44E-D1D0-4FD5-954F-15497990FD7E}"/>
               </a:ext>
             </a:extLst>
           </p:cNvPr>
@@ -9202,8 +9312,8 @@
         </p:nvSpPr>
         <p:spPr>
           <a:xfrm>
-            <a:off x="203652" y="140153"/>
-            <a:ext cx="11509377" cy="5571218"/>
+            <a:off x="223879" y="181826"/>
+            <a:ext cx="4208422" cy="3488418"/>
           </a:xfrm>
           <a:prstGeom prst="rect">
             <a:avLst/>
@@ -9233,17 +9343,17 @@
           <a:p>
             <a:r>
               <a:rPr lang="en-GB" b="1" dirty="0"/>
-              <a:t>ACCELEROMETER</a:t>
-            </a:r>
-          </a:p>
-        </p:txBody>
-      </p:sp>
-      <p:sp>
-        <p:nvSpPr>
-          <p:cNvPr id="5" name="Rectangle 4">
+              <a:t>A/D CONVERTER</a:t>
+            </a:r>
+          </a:p>
+        </p:txBody>
+      </p:sp>
+      <p:sp>
+        <p:nvSpPr>
+          <p:cNvPr id="43" name="Rectangle 42">
             <a:extLst>
               <a:ext uri="{FF2B5EF4-FFF2-40B4-BE49-F238E27FC236}">
-                <a16:creationId xmlns:a16="http://schemas.microsoft.com/office/drawing/2014/main" id="{2BE87F0C-A5CB-4017-8A8E-EB0F6534576A}"/>
+                <a16:creationId xmlns:a16="http://schemas.microsoft.com/office/drawing/2014/main" id="{BC0E1AEC-D7B4-48E4-B5DE-E550D87B4FB3}"/>
               </a:ext>
             </a:extLst>
           </p:cNvPr>
@@ -9252,8 +9362,8 @@
         </p:nvSpPr>
         <p:spPr>
           <a:xfrm>
-            <a:off x="400502" y="527503"/>
-            <a:ext cx="11138355" cy="4995183"/>
+            <a:off x="402318" y="593724"/>
+            <a:ext cx="3807732" cy="2934154"/>
           </a:xfrm>
           <a:prstGeom prst="rect">
             <a:avLst/>
@@ -9294,17 +9404,17 @@
             </a:r>
             <a:r>
               <a:rPr lang="en-GB" b="1" dirty="0"/>
-              <a:t>ACC</a:t>
-            </a:r>
-          </a:p>
-        </p:txBody>
-      </p:sp>
-      <p:sp>
-        <p:nvSpPr>
-          <p:cNvPr id="6" name="Rectangle 5">
+              <a:t>ADC</a:t>
+            </a:r>
+          </a:p>
+        </p:txBody>
+      </p:sp>
+      <p:sp>
+        <p:nvSpPr>
+          <p:cNvPr id="44" name="Rectangle 43">
             <a:extLst>
               <a:ext uri="{FF2B5EF4-FFF2-40B4-BE49-F238E27FC236}">
-                <a16:creationId xmlns:a16="http://schemas.microsoft.com/office/drawing/2014/main" id="{12940A19-02E4-44F9-A22D-785FC7E9FA39}"/>
+                <a16:creationId xmlns:a16="http://schemas.microsoft.com/office/drawing/2014/main" id="{12E4A3E9-CFDF-47A4-9E6C-0E8A86A3C266}"/>
               </a:ext>
             </a:extLst>
           </p:cNvPr>
@@ -9313,7 +9423,7 @@
         </p:nvSpPr>
         <p:spPr>
           <a:xfrm>
-            <a:off x="585560" y="1321253"/>
+            <a:off x="547008" y="1387474"/>
             <a:ext cx="3460750" cy="1952625"/>
           </a:xfrm>
           <a:prstGeom prst="rect">
@@ -9357,17 +9467,17 @@
             </a:r>
             <a:r>
               <a:rPr lang="en-GB" b="1" dirty="0"/>
-              <a:t>AXIS X</a:t>
-            </a:r>
-          </a:p>
-        </p:txBody>
-      </p:sp>
-      <p:sp>
-        <p:nvSpPr>
-          <p:cNvPr id="7" name="Rectangle 6">
+              <a:t>VALUE</a:t>
+            </a:r>
+          </a:p>
+        </p:txBody>
+      </p:sp>
+      <p:sp>
+        <p:nvSpPr>
+          <p:cNvPr id="45" name="Rectangle 44">
             <a:extLst>
               <a:ext uri="{FF2B5EF4-FFF2-40B4-BE49-F238E27FC236}">
-                <a16:creationId xmlns:a16="http://schemas.microsoft.com/office/drawing/2014/main" id="{1CAD6519-48F5-4C0F-844A-FC274B468F4C}"/>
+                <a16:creationId xmlns:a16="http://schemas.microsoft.com/office/drawing/2014/main" id="{1AE7D02F-A009-4771-8716-377246F8CE57}"/>
               </a:ext>
             </a:extLst>
           </p:cNvPr>
@@ -9376,7 +9486,7 @@
         </p:nvSpPr>
         <p:spPr>
           <a:xfrm>
-            <a:off x="585560" y="914853"/>
+            <a:off x="547008" y="981074"/>
             <a:ext cx="3460750" cy="288000"/>
           </a:xfrm>
           <a:prstGeom prst="rect">
@@ -9420,17 +9530,17 @@
             </a:r>
             <a:r>
               <a:rPr lang="en-GB" dirty="0"/>
-              <a:t> 0x0ACC</a:t>
-            </a:r>
-          </a:p>
-        </p:txBody>
-      </p:sp>
-      <p:sp>
-        <p:nvSpPr>
-          <p:cNvPr id="8" name="Rectangle 7">
+              <a:t> 0x0ADC</a:t>
+            </a:r>
+          </a:p>
+        </p:txBody>
+      </p:sp>
+      <p:sp>
+        <p:nvSpPr>
+          <p:cNvPr id="46" name="Rectangle 45">
             <a:extLst>
               <a:ext uri="{FF2B5EF4-FFF2-40B4-BE49-F238E27FC236}">
-                <a16:creationId xmlns:a16="http://schemas.microsoft.com/office/drawing/2014/main" id="{31CA1297-75F5-4E9D-A7A6-E9A227907AC7}"/>
+                <a16:creationId xmlns:a16="http://schemas.microsoft.com/office/drawing/2014/main" id="{1F3A179A-ECA9-48A4-9DA2-1A2305A22E5F}"/>
               </a:ext>
             </a:extLst>
           </p:cNvPr>
@@ -9439,7 +9549,7 @@
         </p:nvSpPr>
         <p:spPr>
           <a:xfrm>
-            <a:off x="683985" y="1725403"/>
+            <a:off x="645433" y="1791624"/>
             <a:ext cx="3251200" cy="288000"/>
           </a:xfrm>
           <a:prstGeom prst="rect">
@@ -9475,17 +9585,17 @@
             </a:r>
             <a:r>
               <a:rPr lang="en-GB" dirty="0"/>
-              <a:t> 0x1ACC</a:t>
-            </a:r>
-          </a:p>
-        </p:txBody>
-      </p:sp>
-      <p:sp>
-        <p:nvSpPr>
-          <p:cNvPr id="9" name="Rectangle 8">
+              <a:t> 0x1ADC</a:t>
+            </a:r>
+          </a:p>
+        </p:txBody>
+      </p:sp>
+      <p:sp>
+        <p:nvSpPr>
+          <p:cNvPr id="47" name="Rectangle 46">
             <a:extLst>
               <a:ext uri="{FF2B5EF4-FFF2-40B4-BE49-F238E27FC236}">
-                <a16:creationId xmlns:a16="http://schemas.microsoft.com/office/drawing/2014/main" id="{AC6853EB-97DA-40F5-8F4D-B41EBBD50E2D}"/>
+                <a16:creationId xmlns:a16="http://schemas.microsoft.com/office/drawing/2014/main" id="{95982184-F1BC-48EE-ACB7-196E458ACA41}"/>
               </a:ext>
             </a:extLst>
           </p:cNvPr>
@@ -9494,7 +9604,7 @@
         </p:nvSpPr>
         <p:spPr>
           <a:xfrm>
-            <a:off x="690335" y="2112753"/>
+            <a:off x="651783" y="2178974"/>
             <a:ext cx="3251200" cy="288000"/>
           </a:xfrm>
           <a:prstGeom prst="rect">
@@ -9530,7 +9640,7 @@
             </a:r>
             <a:r>
               <a:rPr lang="en-GB" dirty="0"/>
-              <a:t>Axis X</a:t>
+              <a:t>A/D output</a:t>
             </a:r>
             <a:r>
               <a:rPr lang="en-GB" b="1" dirty="0"/>
@@ -9542,10 +9652,10 @@
       </p:sp>
       <p:sp>
         <p:nvSpPr>
-          <p:cNvPr id="10" name="Rectangle 9">
+          <p:cNvPr id="48" name="Rectangle 47">
             <a:extLst>
               <a:ext uri="{FF2B5EF4-FFF2-40B4-BE49-F238E27FC236}">
-                <a16:creationId xmlns:a16="http://schemas.microsoft.com/office/drawing/2014/main" id="{B1E5C8FD-C826-4D74-9C8D-C668B2313FE4}"/>
+                <a16:creationId xmlns:a16="http://schemas.microsoft.com/office/drawing/2014/main" id="{20736580-055E-441C-A269-2E52BDF6B606}"/>
               </a:ext>
             </a:extLst>
           </p:cNvPr>
@@ -9554,7 +9664,7 @@
         </p:nvSpPr>
         <p:spPr>
           <a:xfrm>
-            <a:off x="690335" y="2500103"/>
+            <a:off x="651783" y="2566324"/>
             <a:ext cx="3251200" cy="288000"/>
           </a:xfrm>
           <a:prstGeom prst="rect">
@@ -9598,10 +9708,10 @@
       </p:sp>
       <p:sp>
         <p:nvSpPr>
-          <p:cNvPr id="11" name="Rectangle 10">
+          <p:cNvPr id="49" name="Rectangle 48">
             <a:extLst>
               <a:ext uri="{FF2B5EF4-FFF2-40B4-BE49-F238E27FC236}">
-                <a16:creationId xmlns:a16="http://schemas.microsoft.com/office/drawing/2014/main" id="{A84CFFC6-C59C-48FD-989B-281539EC4B81}"/>
+                <a16:creationId xmlns:a16="http://schemas.microsoft.com/office/drawing/2014/main" id="{F5F80629-605E-4AE7-9D79-5E1678C68F2C}"/>
               </a:ext>
             </a:extLst>
           </p:cNvPr>
@@ -9610,7 +9720,7 @@
         </p:nvSpPr>
         <p:spPr>
           <a:xfrm>
-            <a:off x="690335" y="2887453"/>
+            <a:off x="651783" y="2953674"/>
             <a:ext cx="3251200" cy="288000"/>
           </a:xfrm>
           <a:prstGeom prst="rect">
@@ -9651,12 +9761,42 @@
           </a:p>
         </p:txBody>
       </p:sp>
-      <p:sp>
-        <p:nvSpPr>
-          <p:cNvPr id="28" name="Rectangle 27">
+    </p:spTree>
+    <p:extLst>
+      <p:ext uri="{BB962C8B-B14F-4D97-AF65-F5344CB8AC3E}">
+        <p14:creationId xmlns:p14="http://schemas.microsoft.com/office/powerpoint/2010/main" val="482507622"/>
+      </p:ext>
+    </p:extLst>
+  </p:cSld>
+  <p:clrMapOvr>
+    <a:masterClrMapping/>
+  </p:clrMapOvr>
+</p:sld>
+</file>
+
+<file path=ppt/slides/slide7.xml><?xml version="1.0" encoding="utf-8"?>
+<p:sld xmlns:a="http://schemas.openxmlformats.org/drawingml/2006/main" xmlns:r="http://schemas.openxmlformats.org/officeDocument/2006/relationships" xmlns:p="http://schemas.openxmlformats.org/presentationml/2006/main">
+  <p:cSld>
+    <p:spTree>
+      <p:nvGrpSpPr>
+        <p:cNvPr id="1" name=""/>
+        <p:cNvGrpSpPr/>
+        <p:nvPr/>
+      </p:nvGrpSpPr>
+      <p:grpSpPr>
+        <a:xfrm>
+          <a:off x="0" y="0"/>
+          <a:ext cx="0" cy="0"/>
+          <a:chOff x="0" y="0"/>
+          <a:chExt cx="0" cy="0"/>
+        </a:xfrm>
+      </p:grpSpPr>
+      <p:sp>
+        <p:nvSpPr>
+          <p:cNvPr id="4" name="Rectangle 3">
             <a:extLst>
               <a:ext uri="{FF2B5EF4-FFF2-40B4-BE49-F238E27FC236}">
-                <a16:creationId xmlns:a16="http://schemas.microsoft.com/office/drawing/2014/main" id="{7BB68C9E-C570-4128-A7D2-27F129D7581D}"/>
+                <a16:creationId xmlns:a16="http://schemas.microsoft.com/office/drawing/2014/main" id="{E7952A56-BBF3-442D-9F55-8199822357F1}"/>
               </a:ext>
             </a:extLst>
           </p:cNvPr>
@@ -9665,7 +9805,118 @@
         </p:nvSpPr>
         <p:spPr>
           <a:xfrm>
-            <a:off x="4231367" y="3392278"/>
+            <a:off x="203653" y="140153"/>
+            <a:ext cx="4323897" cy="5571218"/>
+          </a:xfrm>
+          <a:prstGeom prst="rect">
+            <a:avLst/>
+          </a:prstGeom>
+          <a:ln>
+            <a:headEnd type="none" w="med" len="med"/>
+            <a:tailEnd type="none" w="med" len="med"/>
+          </a:ln>
+        </p:spPr>
+        <p:style>
+          <a:lnRef idx="0">
+            <a:schemeClr val="accent1"/>
+          </a:lnRef>
+          <a:fillRef idx="3">
+            <a:schemeClr val="accent1"/>
+          </a:fillRef>
+          <a:effectRef idx="3">
+            <a:schemeClr val="accent1"/>
+          </a:effectRef>
+          <a:fontRef idx="minor">
+            <a:schemeClr val="lt1"/>
+          </a:fontRef>
+        </p:style>
+        <p:txBody>
+          <a:bodyPr rtlCol="0" anchor="t"/>
+          <a:lstStyle/>
+          <a:p>
+            <a:r>
+              <a:rPr lang="en-GB" b="1" dirty="0"/>
+              <a:t>ACCELEROMETER</a:t>
+            </a:r>
+          </a:p>
+        </p:txBody>
+      </p:sp>
+      <p:sp>
+        <p:nvSpPr>
+          <p:cNvPr id="5" name="Rectangle 4">
+            <a:extLst>
+              <a:ext uri="{FF2B5EF4-FFF2-40B4-BE49-F238E27FC236}">
+                <a16:creationId xmlns:a16="http://schemas.microsoft.com/office/drawing/2014/main" id="{2BE87F0C-A5CB-4017-8A8E-EB0F6534576A}"/>
+              </a:ext>
+            </a:extLst>
+          </p:cNvPr>
+          <p:cNvSpPr/>
+          <p:nvPr/>
+        </p:nvSpPr>
+        <p:spPr>
+          <a:xfrm>
+            <a:off x="400503" y="527503"/>
+            <a:ext cx="3879397" cy="4995183"/>
+          </a:xfrm>
+          <a:prstGeom prst="rect">
+            <a:avLst/>
+          </a:prstGeom>
+          <a:solidFill>
+            <a:schemeClr val="accent1">
+              <a:lumMod val="60000"/>
+              <a:lumOff val="40000"/>
+            </a:schemeClr>
+          </a:solidFill>
+          <a:ln>
+            <a:noFill/>
+            <a:headEnd type="none" w="med" len="med"/>
+            <a:tailEnd type="none" w="med" len="med"/>
+          </a:ln>
+        </p:spPr>
+        <p:style>
+          <a:lnRef idx="2">
+            <a:schemeClr val="dk1"/>
+          </a:lnRef>
+          <a:fillRef idx="1">
+            <a:schemeClr val="lt1"/>
+          </a:fillRef>
+          <a:effectRef idx="0">
+            <a:schemeClr val="dk1"/>
+          </a:effectRef>
+          <a:fontRef idx="minor">
+            <a:schemeClr val="dk1"/>
+          </a:fontRef>
+        </p:style>
+        <p:txBody>
+          <a:bodyPr rtlCol="0" anchor="t"/>
+          <a:lstStyle/>
+          <a:p>
+            <a:r>
+              <a:rPr lang="en-GB" dirty="0"/>
+              <a:t>Service  </a:t>
+            </a:r>
+            <a:r>
+              <a:rPr lang="en-GB" b="1" dirty="0"/>
+              <a:t>ACC</a:t>
+            </a:r>
+          </a:p>
+        </p:txBody>
+      </p:sp>
+      <p:sp>
+        <p:nvSpPr>
+          <p:cNvPr id="6" name="Rectangle 5">
+            <a:extLst>
+              <a:ext uri="{FF2B5EF4-FFF2-40B4-BE49-F238E27FC236}">
+                <a16:creationId xmlns:a16="http://schemas.microsoft.com/office/drawing/2014/main" id="{12940A19-02E4-44F9-A22D-785FC7E9FA39}"/>
+              </a:ext>
+            </a:extLst>
+          </p:cNvPr>
+          <p:cNvSpPr/>
+          <p:nvPr/>
+        </p:nvSpPr>
+        <p:spPr>
+          <a:xfrm>
+            <a:off x="585560" y="1321253"/>
             <a:ext cx="3460750" cy="1952625"/>
           </a:xfrm>
           <a:prstGeom prst="rect">
@@ -9709,17 +9960,17 @@
             </a:r>
             <a:r>
               <a:rPr lang="en-GB" b="1" dirty="0"/>
-              <a:t>CLICK</a:t>
-            </a:r>
-          </a:p>
-        </p:txBody>
-      </p:sp>
-      <p:sp>
-        <p:nvSpPr>
-          <p:cNvPr id="29" name="Rectangle 28">
+              <a:t>AXIS XYZ</a:t>
+            </a:r>
+          </a:p>
+        </p:txBody>
+      </p:sp>
+      <p:sp>
+        <p:nvSpPr>
+          <p:cNvPr id="7" name="Rectangle 6">
             <a:extLst>
               <a:ext uri="{FF2B5EF4-FFF2-40B4-BE49-F238E27FC236}">
-                <a16:creationId xmlns:a16="http://schemas.microsoft.com/office/drawing/2014/main" id="{F32D6F95-F257-487F-ABE3-10208EAEA234}"/>
+                <a16:creationId xmlns:a16="http://schemas.microsoft.com/office/drawing/2014/main" id="{1CAD6519-48F5-4C0F-844A-FC274B468F4C}"/>
               </a:ext>
             </a:extLst>
           </p:cNvPr>
@@ -9728,229 +9979,8 @@
         </p:nvSpPr>
         <p:spPr>
           <a:xfrm>
-            <a:off x="4329792" y="3796428"/>
-            <a:ext cx="3251200" cy="288000"/>
-          </a:xfrm>
-          <a:prstGeom prst="rect">
-            <a:avLst/>
-          </a:prstGeom>
-          <a:ln>
-            <a:noFill/>
-            <a:headEnd type="none" w="med" len="med"/>
-            <a:tailEnd type="none" w="med" len="med"/>
-          </a:ln>
-        </p:spPr>
-        <p:style>
-          <a:lnRef idx="2">
-            <a:schemeClr val="dk1"/>
-          </a:lnRef>
-          <a:fillRef idx="1">
-            <a:schemeClr val="lt1"/>
-          </a:fillRef>
-          <a:effectRef idx="0">
-            <a:schemeClr val="dk1"/>
-          </a:effectRef>
-          <a:fontRef idx="minor">
-            <a:schemeClr val="dk1"/>
-          </a:fontRef>
-        </p:style>
-        <p:txBody>
-          <a:bodyPr rtlCol="0" anchor="ctr"/>
-          <a:lstStyle/>
-          <a:p>
-            <a:r>
-              <a:rPr lang="en-GB" b="1" dirty="0"/>
-              <a:t>UUID</a:t>
-            </a:r>
-            <a:r>
-              <a:rPr lang="en-GB" dirty="0"/>
-              <a:t> 0x4ACC</a:t>
-            </a:r>
-          </a:p>
-        </p:txBody>
-      </p:sp>
-      <p:sp>
-        <p:nvSpPr>
-          <p:cNvPr id="30" name="Rectangle 29">
-            <a:extLst>
-              <a:ext uri="{FF2B5EF4-FFF2-40B4-BE49-F238E27FC236}">
-                <a16:creationId xmlns:a16="http://schemas.microsoft.com/office/drawing/2014/main" id="{0B85AD87-CD80-411A-8F99-2AA7CED2F749}"/>
-              </a:ext>
-            </a:extLst>
-          </p:cNvPr>
-          <p:cNvSpPr/>
-          <p:nvPr/>
-        </p:nvSpPr>
-        <p:spPr>
-          <a:xfrm>
-            <a:off x="4336142" y="4183778"/>
-            <a:ext cx="3251200" cy="288000"/>
-          </a:xfrm>
-          <a:prstGeom prst="rect">
-            <a:avLst/>
-          </a:prstGeom>
-          <a:ln>
-            <a:noFill/>
-            <a:headEnd type="none" w="med" len="med"/>
-            <a:tailEnd type="none" w="med" len="med"/>
-          </a:ln>
-        </p:spPr>
-        <p:style>
-          <a:lnRef idx="2">
-            <a:schemeClr val="dk1"/>
-          </a:lnRef>
-          <a:fillRef idx="1">
-            <a:schemeClr val="lt1"/>
-          </a:fillRef>
-          <a:effectRef idx="0">
-            <a:schemeClr val="dk1"/>
-          </a:effectRef>
-          <a:fontRef idx="minor">
-            <a:schemeClr val="dk1"/>
-          </a:fontRef>
-        </p:style>
-        <p:txBody>
-          <a:bodyPr rtlCol="0" anchor="ctr"/>
-          <a:lstStyle/>
-          <a:p>
-            <a:r>
-              <a:rPr lang="en-GB" b="1" dirty="0"/>
-              <a:t>Value </a:t>
-            </a:r>
-            <a:r>
-              <a:rPr lang="en-GB" dirty="0"/>
-              <a:t>Click</a:t>
-            </a:r>
-          </a:p>
-        </p:txBody>
-      </p:sp>
-      <p:sp>
-        <p:nvSpPr>
-          <p:cNvPr id="31" name="Rectangle 30">
-            <a:extLst>
-              <a:ext uri="{FF2B5EF4-FFF2-40B4-BE49-F238E27FC236}">
-                <a16:creationId xmlns:a16="http://schemas.microsoft.com/office/drawing/2014/main" id="{EFFBF358-8A66-4F16-86D9-0C6E7EEAEBF3}"/>
-              </a:ext>
-            </a:extLst>
-          </p:cNvPr>
-          <p:cNvSpPr/>
-          <p:nvPr/>
-        </p:nvSpPr>
-        <p:spPr>
-          <a:xfrm>
-            <a:off x="4336142" y="4571128"/>
-            <a:ext cx="3251200" cy="288000"/>
-          </a:xfrm>
-          <a:prstGeom prst="rect">
-            <a:avLst/>
-          </a:prstGeom>
-          <a:ln>
-            <a:noFill/>
-            <a:headEnd type="none" w="med" len="med"/>
-            <a:tailEnd type="none" w="med" len="med"/>
-          </a:ln>
-        </p:spPr>
-        <p:style>
-          <a:lnRef idx="2">
-            <a:schemeClr val="dk1"/>
-          </a:lnRef>
-          <a:fillRef idx="1">
-            <a:schemeClr val="lt1"/>
-          </a:fillRef>
-          <a:effectRef idx="0">
-            <a:schemeClr val="dk1"/>
-          </a:effectRef>
-          <a:fontRef idx="minor">
-            <a:schemeClr val="dk1"/>
-          </a:fontRef>
-        </p:style>
-        <p:txBody>
-          <a:bodyPr rtlCol="0" anchor="ctr"/>
-          <a:lstStyle/>
-          <a:p>
-            <a:r>
-              <a:rPr lang="en-GB" b="1" dirty="0"/>
-              <a:t>Value type </a:t>
-            </a:r>
-            <a:r>
-              <a:rPr lang="en-GB" dirty="0"/>
-              <a:t>Boolean</a:t>
-            </a:r>
-            <a:endParaRPr lang="en-GB" b="1" dirty="0"/>
-          </a:p>
-        </p:txBody>
-      </p:sp>
-      <p:sp>
-        <p:nvSpPr>
-          <p:cNvPr id="32" name="Rectangle 31">
-            <a:extLst>
-              <a:ext uri="{FF2B5EF4-FFF2-40B4-BE49-F238E27FC236}">
-                <a16:creationId xmlns:a16="http://schemas.microsoft.com/office/drawing/2014/main" id="{05DB0F7F-8D8C-44CB-9FAF-DA0E2B9FBAFC}"/>
-              </a:ext>
-            </a:extLst>
-          </p:cNvPr>
-          <p:cNvSpPr/>
-          <p:nvPr/>
-        </p:nvSpPr>
-        <p:spPr>
-          <a:xfrm>
-            <a:off x="4336142" y="4958478"/>
-            <a:ext cx="3251200" cy="288000"/>
-          </a:xfrm>
-          <a:prstGeom prst="rect">
-            <a:avLst/>
-          </a:prstGeom>
-          <a:ln>
-            <a:noFill/>
-            <a:headEnd type="none" w="med" len="med"/>
-            <a:tailEnd type="none" w="med" len="med"/>
-          </a:ln>
-        </p:spPr>
-        <p:style>
-          <a:lnRef idx="2">
-            <a:schemeClr val="dk1"/>
-          </a:lnRef>
-          <a:fillRef idx="1">
-            <a:schemeClr val="lt1"/>
-          </a:fillRef>
-          <a:effectRef idx="0">
-            <a:schemeClr val="dk1"/>
-          </a:effectRef>
-          <a:fontRef idx="minor">
-            <a:schemeClr val="dk1"/>
-          </a:fontRef>
-        </p:style>
-        <p:txBody>
-          <a:bodyPr rtlCol="0" anchor="ctr"/>
-          <a:lstStyle/>
-          <a:p>
-            <a:r>
-              <a:rPr lang="en-GB" b="1" dirty="0"/>
-              <a:t>Properties </a:t>
-            </a:r>
-            <a:r>
-              <a:rPr lang="en-GB" dirty="0"/>
-              <a:t> NOTIFY</a:t>
-            </a:r>
-          </a:p>
-        </p:txBody>
-      </p:sp>
-      <p:sp>
-        <p:nvSpPr>
-          <p:cNvPr id="39" name="Rectangle 38">
-            <a:extLst>
-              <a:ext uri="{FF2B5EF4-FFF2-40B4-BE49-F238E27FC236}">
-                <a16:creationId xmlns:a16="http://schemas.microsoft.com/office/drawing/2014/main" id="{782CB210-14D4-4703-901A-03C5117366DA}"/>
-              </a:ext>
-            </a:extLst>
-          </p:cNvPr>
-          <p:cNvSpPr/>
-          <p:nvPr/>
-        </p:nvSpPr>
-        <p:spPr>
-          <a:xfrm>
-            <a:off x="4243161" y="1321253"/>
-            <a:ext cx="3460750" cy="1952625"/>
+            <a:off x="585560" y="914853"/>
+            <a:ext cx="3460750" cy="288000"/>
           </a:xfrm>
           <a:prstGeom prst="rect">
             <a:avLst/>
@@ -9984,26 +10014,26 @@
           </a:fontRef>
         </p:style>
         <p:txBody>
-          <a:bodyPr rtlCol="0" anchor="t"/>
-          <a:lstStyle/>
-          <a:p>
+          <a:bodyPr rtlCol="0" anchor="ctr"/>
+          <a:lstStyle/>
+          <a:p>
+            <a:r>
+              <a:rPr lang="en-GB" b="1" dirty="0"/>
+              <a:t>UUID</a:t>
+            </a:r>
             <a:r>
               <a:rPr lang="en-GB" dirty="0"/>
-              <a:t>Characteristic </a:t>
-            </a:r>
-            <a:r>
-              <a:rPr lang="en-GB" b="1" dirty="0"/>
-              <a:t>AXIS Y</a:t>
-            </a:r>
-          </a:p>
-        </p:txBody>
-      </p:sp>
-      <p:sp>
-        <p:nvSpPr>
-          <p:cNvPr id="40" name="Rectangle 39">
+              <a:t> 0x0ACC</a:t>
+            </a:r>
+          </a:p>
+        </p:txBody>
+      </p:sp>
+      <p:sp>
+        <p:nvSpPr>
+          <p:cNvPr id="8" name="Rectangle 7">
             <a:extLst>
               <a:ext uri="{FF2B5EF4-FFF2-40B4-BE49-F238E27FC236}">
-                <a16:creationId xmlns:a16="http://schemas.microsoft.com/office/drawing/2014/main" id="{B365D758-4BE7-4726-98DA-1A53CD3FB02F}"/>
+                <a16:creationId xmlns:a16="http://schemas.microsoft.com/office/drawing/2014/main" id="{31CA1297-75F5-4E9D-A7A6-E9A227907AC7}"/>
               </a:ext>
             </a:extLst>
           </p:cNvPr>
@@ -10012,7 +10042,7 @@
         </p:nvSpPr>
         <p:spPr>
           <a:xfrm>
-            <a:off x="4341586" y="1725403"/>
+            <a:off x="683985" y="1725403"/>
             <a:ext cx="3251200" cy="288000"/>
           </a:xfrm>
           <a:prstGeom prst="rect">
@@ -10048,17 +10078,17 @@
             </a:r>
             <a:r>
               <a:rPr lang="en-GB" dirty="0"/>
-              <a:t> 0x2ACC</a:t>
-            </a:r>
-          </a:p>
-        </p:txBody>
-      </p:sp>
-      <p:sp>
-        <p:nvSpPr>
-          <p:cNvPr id="41" name="Rectangle 40">
+              <a:t> 0x1ACC</a:t>
+            </a:r>
+          </a:p>
+        </p:txBody>
+      </p:sp>
+      <p:sp>
+        <p:nvSpPr>
+          <p:cNvPr id="9" name="Rectangle 8">
             <a:extLst>
               <a:ext uri="{FF2B5EF4-FFF2-40B4-BE49-F238E27FC236}">
-                <a16:creationId xmlns:a16="http://schemas.microsoft.com/office/drawing/2014/main" id="{7CF456EF-3ACD-45D9-8B8A-FB41B60A3F82}"/>
+                <a16:creationId xmlns:a16="http://schemas.microsoft.com/office/drawing/2014/main" id="{AC6853EB-97DA-40F5-8F4D-B41EBBD50E2D}"/>
               </a:ext>
             </a:extLst>
           </p:cNvPr>
@@ -10067,7 +10097,7 @@
         </p:nvSpPr>
         <p:spPr>
           <a:xfrm>
-            <a:off x="4347936" y="2112753"/>
+            <a:off x="690335" y="2112753"/>
             <a:ext cx="3251200" cy="288000"/>
           </a:xfrm>
           <a:prstGeom prst="rect">
@@ -10103,22 +10133,17 @@
             </a:r>
             <a:r>
               <a:rPr lang="en-GB" dirty="0"/>
-              <a:t>Axis Y</a:t>
-            </a:r>
-            <a:r>
-              <a:rPr lang="en-GB" b="1" dirty="0"/>
-              <a:t> </a:t>
-            </a:r>
-            <a:endParaRPr lang="en-GB" dirty="0"/>
-          </a:p>
-        </p:txBody>
-      </p:sp>
-      <p:sp>
-        <p:nvSpPr>
-          <p:cNvPr id="42" name="Rectangle 41">
+              <a:t>Axis XYZ</a:t>
+            </a:r>
+          </a:p>
+        </p:txBody>
+      </p:sp>
+      <p:sp>
+        <p:nvSpPr>
+          <p:cNvPr id="10" name="Rectangle 9">
             <a:extLst>
               <a:ext uri="{FF2B5EF4-FFF2-40B4-BE49-F238E27FC236}">
-                <a16:creationId xmlns:a16="http://schemas.microsoft.com/office/drawing/2014/main" id="{4B7904F3-99DA-4B56-8D02-2A4FA8D31DF7}"/>
+                <a16:creationId xmlns:a16="http://schemas.microsoft.com/office/drawing/2014/main" id="{B1E5C8FD-C826-4D74-9C8D-C668B2313FE4}"/>
               </a:ext>
             </a:extLst>
           </p:cNvPr>
@@ -10127,7 +10152,7 @@
         </p:nvSpPr>
         <p:spPr>
           <a:xfrm>
-            <a:off x="4347936" y="2500103"/>
+            <a:off x="690335" y="2500103"/>
             <a:ext cx="3251200" cy="288000"/>
           </a:xfrm>
           <a:prstGeom prst="rect">
@@ -10163,7 +10188,7 @@
             </a:r>
             <a:r>
               <a:rPr lang="en-GB" dirty="0"/>
-              <a:t>Integer</a:t>
+              <a:t>Integer Array [3] </a:t>
             </a:r>
             <a:endParaRPr lang="en-GB" b="1" dirty="0"/>
           </a:p>
@@ -10171,10 +10196,10 @@
       </p:sp>
       <p:sp>
         <p:nvSpPr>
-          <p:cNvPr id="43" name="Rectangle 42">
+          <p:cNvPr id="11" name="Rectangle 10">
             <a:extLst>
               <a:ext uri="{FF2B5EF4-FFF2-40B4-BE49-F238E27FC236}">
-                <a16:creationId xmlns:a16="http://schemas.microsoft.com/office/drawing/2014/main" id="{F048DEB2-245D-4D2F-A751-05C84AAE77FA}"/>
+                <a16:creationId xmlns:a16="http://schemas.microsoft.com/office/drawing/2014/main" id="{A84CFFC6-C59C-48FD-989B-281539EC4B81}"/>
               </a:ext>
             </a:extLst>
           </p:cNvPr>
@@ -10183,7 +10208,7 @@
         </p:nvSpPr>
         <p:spPr>
           <a:xfrm>
-            <a:off x="4347936" y="2887453"/>
+            <a:off x="690335" y="2887453"/>
             <a:ext cx="3251200" cy="288000"/>
           </a:xfrm>
           <a:prstGeom prst="rect">
@@ -10226,10 +10251,10 @@
       </p:sp>
       <p:sp>
         <p:nvSpPr>
-          <p:cNvPr id="44" name="Rectangle 43">
+          <p:cNvPr id="28" name="Rectangle 27">
             <a:extLst>
               <a:ext uri="{FF2B5EF4-FFF2-40B4-BE49-F238E27FC236}">
-                <a16:creationId xmlns:a16="http://schemas.microsoft.com/office/drawing/2014/main" id="{53576D57-4038-4944-837F-5CC54570C425}"/>
+                <a16:creationId xmlns:a16="http://schemas.microsoft.com/office/drawing/2014/main" id="{7BB68C9E-C570-4128-A7D2-27F129D7581D}"/>
               </a:ext>
             </a:extLst>
           </p:cNvPr>
@@ -10238,7 +10263,7 @@
         </p:nvSpPr>
         <p:spPr>
           <a:xfrm>
-            <a:off x="585560" y="3423786"/>
+            <a:off x="585560" y="3412671"/>
             <a:ext cx="3460750" cy="1952625"/>
           </a:xfrm>
           <a:prstGeom prst="rect">
@@ -10282,17 +10307,17 @@
             </a:r>
             <a:r>
               <a:rPr lang="en-GB" b="1" dirty="0"/>
-              <a:t>AXIS Z</a:t>
-            </a:r>
-          </a:p>
-        </p:txBody>
-      </p:sp>
-      <p:sp>
-        <p:nvSpPr>
-          <p:cNvPr id="45" name="Rectangle 44">
+              <a:t>CLICK</a:t>
+            </a:r>
+          </a:p>
+        </p:txBody>
+      </p:sp>
+      <p:sp>
+        <p:nvSpPr>
+          <p:cNvPr id="29" name="Rectangle 28">
             <a:extLst>
               <a:ext uri="{FF2B5EF4-FFF2-40B4-BE49-F238E27FC236}">
-                <a16:creationId xmlns:a16="http://schemas.microsoft.com/office/drawing/2014/main" id="{77F8FD08-57D5-402B-879C-F710992E57C5}"/>
+                <a16:creationId xmlns:a16="http://schemas.microsoft.com/office/drawing/2014/main" id="{F32D6F95-F257-487F-ABE3-10208EAEA234}"/>
               </a:ext>
             </a:extLst>
           </p:cNvPr>
@@ -10301,7 +10326,7 @@
         </p:nvSpPr>
         <p:spPr>
           <a:xfrm>
-            <a:off x="683985" y="3827936"/>
+            <a:off x="683985" y="3816821"/>
             <a:ext cx="3251200" cy="288000"/>
           </a:xfrm>
           <a:prstGeom prst="rect">
@@ -10337,17 +10362,17 @@
             </a:r>
             <a:r>
               <a:rPr lang="en-GB" dirty="0"/>
-              <a:t> 0x3ACC</a:t>
-            </a:r>
-          </a:p>
-        </p:txBody>
-      </p:sp>
-      <p:sp>
-        <p:nvSpPr>
-          <p:cNvPr id="46" name="Rectangle 45">
+              <a:t> 0x2ACC</a:t>
+            </a:r>
+          </a:p>
+        </p:txBody>
+      </p:sp>
+      <p:sp>
+        <p:nvSpPr>
+          <p:cNvPr id="30" name="Rectangle 29">
             <a:extLst>
               <a:ext uri="{FF2B5EF4-FFF2-40B4-BE49-F238E27FC236}">
-                <a16:creationId xmlns:a16="http://schemas.microsoft.com/office/drawing/2014/main" id="{A183D08B-25AA-4FA5-8220-9E377CB8C57B}"/>
+                <a16:creationId xmlns:a16="http://schemas.microsoft.com/office/drawing/2014/main" id="{0B85AD87-CD80-411A-8F99-2AA7CED2F749}"/>
               </a:ext>
             </a:extLst>
           </p:cNvPr>
@@ -10356,7 +10381,7 @@
         </p:nvSpPr>
         <p:spPr>
           <a:xfrm>
-            <a:off x="690335" y="4215286"/>
+            <a:off x="690335" y="4204171"/>
             <a:ext cx="3251200" cy="288000"/>
           </a:xfrm>
           <a:prstGeom prst="rect">
@@ -10392,22 +10417,17 @@
             </a:r>
             <a:r>
               <a:rPr lang="en-GB" dirty="0"/>
-              <a:t>Axis Z</a:t>
-            </a:r>
-            <a:r>
-              <a:rPr lang="en-GB" b="1" dirty="0"/>
-              <a:t> </a:t>
-            </a:r>
-            <a:endParaRPr lang="en-GB" dirty="0"/>
-          </a:p>
-        </p:txBody>
-      </p:sp>
-      <p:sp>
-        <p:nvSpPr>
-          <p:cNvPr id="47" name="Rectangle 46">
+              <a:t>Click</a:t>
+            </a:r>
+          </a:p>
+        </p:txBody>
+      </p:sp>
+      <p:sp>
+        <p:nvSpPr>
+          <p:cNvPr id="31" name="Rectangle 30">
             <a:extLst>
               <a:ext uri="{FF2B5EF4-FFF2-40B4-BE49-F238E27FC236}">
-                <a16:creationId xmlns:a16="http://schemas.microsoft.com/office/drawing/2014/main" id="{3F5E29FF-0535-4880-ABE7-C023A2000899}"/>
+                <a16:creationId xmlns:a16="http://schemas.microsoft.com/office/drawing/2014/main" id="{EFFBF358-8A66-4F16-86D9-0C6E7EEAEBF3}"/>
               </a:ext>
             </a:extLst>
           </p:cNvPr>
@@ -10416,7 +10436,7 @@
         </p:nvSpPr>
         <p:spPr>
           <a:xfrm>
-            <a:off x="690335" y="4602636"/>
+            <a:off x="690335" y="4591521"/>
             <a:ext cx="3251200" cy="288000"/>
           </a:xfrm>
           <a:prstGeom prst="rect">
@@ -10452,7 +10472,7 @@
             </a:r>
             <a:r>
               <a:rPr lang="en-GB" dirty="0"/>
-              <a:t>Integer</a:t>
+              <a:t>Boolean</a:t>
             </a:r>
             <a:endParaRPr lang="en-GB" b="1" dirty="0"/>
           </a:p>
@@ -10460,10 +10480,10 @@
       </p:sp>
       <p:sp>
         <p:nvSpPr>
-          <p:cNvPr id="48" name="Rectangle 47">
+          <p:cNvPr id="32" name="Rectangle 31">
             <a:extLst>
               <a:ext uri="{FF2B5EF4-FFF2-40B4-BE49-F238E27FC236}">
-                <a16:creationId xmlns:a16="http://schemas.microsoft.com/office/drawing/2014/main" id="{8EA74CFA-407E-4DD2-A3FD-1FE62D71D2CF}"/>
+                <a16:creationId xmlns:a16="http://schemas.microsoft.com/office/drawing/2014/main" id="{05DB0F7F-8D8C-44CB-9FAF-DA0E2B9FBAFC}"/>
               </a:ext>
             </a:extLst>
           </p:cNvPr>
@@ -10472,7 +10492,7 @@
         </p:nvSpPr>
         <p:spPr>
           <a:xfrm>
-            <a:off x="690335" y="4989986"/>
+            <a:off x="690335" y="4978871"/>
             <a:ext cx="3251200" cy="288000"/>
           </a:xfrm>
           <a:prstGeom prst="rect">
@@ -10508,291 +10528,7 @@
             </a:r>
             <a:r>
               <a:rPr lang="en-GB" dirty="0"/>
-              <a:t>R | NOTIFY</a:t>
-            </a:r>
-          </a:p>
-        </p:txBody>
-      </p:sp>
-      <p:sp>
-        <p:nvSpPr>
-          <p:cNvPr id="25" name="Rectangle 24">
-            <a:extLst>
-              <a:ext uri="{FF2B5EF4-FFF2-40B4-BE49-F238E27FC236}">
-                <a16:creationId xmlns:a16="http://schemas.microsoft.com/office/drawing/2014/main" id="{631A6D4F-BDB9-416B-9B91-B6DCBF1BE09A}"/>
-              </a:ext>
-            </a:extLst>
-          </p:cNvPr>
-          <p:cNvSpPr/>
-          <p:nvPr/>
-        </p:nvSpPr>
-        <p:spPr>
-          <a:xfrm>
-            <a:off x="7900762" y="1321253"/>
-            <a:ext cx="3460750" cy="1952625"/>
-          </a:xfrm>
-          <a:prstGeom prst="rect">
-            <a:avLst/>
-          </a:prstGeom>
-          <a:solidFill>
-            <a:schemeClr val="accent1">
-              <a:lumMod val="20000"/>
-              <a:lumOff val="80000"/>
-            </a:schemeClr>
-          </a:solidFill>
-          <a:ln w="9525" cap="flat" cmpd="sng" algn="ctr">
-            <a:noFill/>
-            <a:prstDash val="solid"/>
-            <a:round/>
-            <a:headEnd type="none" w="med" len="med"/>
-            <a:tailEnd type="none" w="med" len="med"/>
-          </a:ln>
-        </p:spPr>
-        <p:style>
-          <a:lnRef idx="0">
-            <a:scrgbClr r="0" g="0" b="0"/>
-          </a:lnRef>
-          <a:fillRef idx="0">
-            <a:scrgbClr r="0" g="0" b="0"/>
-          </a:fillRef>
-          <a:effectRef idx="0">
-            <a:scrgbClr r="0" g="0" b="0"/>
-          </a:effectRef>
-          <a:fontRef idx="minor">
-            <a:schemeClr val="dk1"/>
-          </a:fontRef>
-        </p:style>
-        <p:txBody>
-          <a:bodyPr rtlCol="0" anchor="t"/>
-          <a:lstStyle/>
-          <a:p>
-            <a:r>
-              <a:rPr lang="en-GB" dirty="0"/>
-              <a:t>Characteristic </a:t>
-            </a:r>
-            <a:r>
-              <a:rPr lang="en-GB" b="1" dirty="0"/>
-              <a:t>SLEEP</a:t>
-            </a:r>
-          </a:p>
-        </p:txBody>
-      </p:sp>
-      <p:sp>
-        <p:nvSpPr>
-          <p:cNvPr id="26" name="Rectangle 25">
-            <a:extLst>
-              <a:ext uri="{FF2B5EF4-FFF2-40B4-BE49-F238E27FC236}">
-                <a16:creationId xmlns:a16="http://schemas.microsoft.com/office/drawing/2014/main" id="{E2954E85-782A-4612-B92F-E23DC369B426}"/>
-              </a:ext>
-            </a:extLst>
-          </p:cNvPr>
-          <p:cNvSpPr/>
-          <p:nvPr/>
-        </p:nvSpPr>
-        <p:spPr>
-          <a:xfrm>
-            <a:off x="7999187" y="1725403"/>
-            <a:ext cx="3251200" cy="288000"/>
-          </a:xfrm>
-          <a:prstGeom prst="rect">
-            <a:avLst/>
-          </a:prstGeom>
-          <a:ln>
-            <a:noFill/>
-            <a:headEnd type="none" w="med" len="med"/>
-            <a:tailEnd type="none" w="med" len="med"/>
-          </a:ln>
-        </p:spPr>
-        <p:style>
-          <a:lnRef idx="2">
-            <a:schemeClr val="dk1"/>
-          </a:lnRef>
-          <a:fillRef idx="1">
-            <a:schemeClr val="lt1"/>
-          </a:fillRef>
-          <a:effectRef idx="0">
-            <a:schemeClr val="dk1"/>
-          </a:effectRef>
-          <a:fontRef idx="minor">
-            <a:schemeClr val="dk1"/>
-          </a:fontRef>
-        </p:style>
-        <p:txBody>
-          <a:bodyPr rtlCol="0" anchor="ctr"/>
-          <a:lstStyle/>
-          <a:p>
-            <a:r>
-              <a:rPr lang="en-GB" b="1" dirty="0"/>
-              <a:t>UUID</a:t>
-            </a:r>
-            <a:r>
-              <a:rPr lang="en-GB" dirty="0"/>
-              <a:t> 0x5ACC</a:t>
-            </a:r>
-          </a:p>
-        </p:txBody>
-      </p:sp>
-      <p:sp>
-        <p:nvSpPr>
-          <p:cNvPr id="27" name="Rectangle 26">
-            <a:extLst>
-              <a:ext uri="{FF2B5EF4-FFF2-40B4-BE49-F238E27FC236}">
-                <a16:creationId xmlns:a16="http://schemas.microsoft.com/office/drawing/2014/main" id="{76214DFB-ADEA-40B6-9FDF-98F39A2DE7A6}"/>
-              </a:ext>
-            </a:extLst>
-          </p:cNvPr>
-          <p:cNvSpPr/>
-          <p:nvPr/>
-        </p:nvSpPr>
-        <p:spPr>
-          <a:xfrm>
-            <a:off x="8005537" y="2112753"/>
-            <a:ext cx="3251200" cy="288000"/>
-          </a:xfrm>
-          <a:prstGeom prst="rect">
-            <a:avLst/>
-          </a:prstGeom>
-          <a:ln>
-            <a:noFill/>
-            <a:headEnd type="none" w="med" len="med"/>
-            <a:tailEnd type="none" w="med" len="med"/>
-          </a:ln>
-        </p:spPr>
-        <p:style>
-          <a:lnRef idx="2">
-            <a:schemeClr val="dk1"/>
-          </a:lnRef>
-          <a:fillRef idx="1">
-            <a:schemeClr val="lt1"/>
-          </a:fillRef>
-          <a:effectRef idx="0">
-            <a:schemeClr val="dk1"/>
-          </a:effectRef>
-          <a:fontRef idx="minor">
-            <a:schemeClr val="dk1"/>
-          </a:fontRef>
-        </p:style>
-        <p:txBody>
-          <a:bodyPr rtlCol="0" anchor="ctr"/>
-          <a:lstStyle/>
-          <a:p>
-            <a:r>
-              <a:rPr lang="en-GB" b="1" dirty="0"/>
-              <a:t>Value </a:t>
-            </a:r>
-            <a:r>
-              <a:rPr lang="en-GB" dirty="0"/>
-              <a:t>Sleep</a:t>
-            </a:r>
-          </a:p>
-        </p:txBody>
-      </p:sp>
-      <p:sp>
-        <p:nvSpPr>
-          <p:cNvPr id="33" name="Rectangle 32">
-            <a:extLst>
-              <a:ext uri="{FF2B5EF4-FFF2-40B4-BE49-F238E27FC236}">
-                <a16:creationId xmlns:a16="http://schemas.microsoft.com/office/drawing/2014/main" id="{3CEDB082-4BDE-4E01-B295-35391384F1A3}"/>
-              </a:ext>
-            </a:extLst>
-          </p:cNvPr>
-          <p:cNvSpPr/>
-          <p:nvPr/>
-        </p:nvSpPr>
-        <p:spPr>
-          <a:xfrm>
-            <a:off x="8005537" y="2500103"/>
-            <a:ext cx="3251200" cy="288000"/>
-          </a:xfrm>
-          <a:prstGeom prst="rect">
-            <a:avLst/>
-          </a:prstGeom>
-          <a:ln>
-            <a:noFill/>
-            <a:headEnd type="none" w="med" len="med"/>
-            <a:tailEnd type="none" w="med" len="med"/>
-          </a:ln>
-        </p:spPr>
-        <p:style>
-          <a:lnRef idx="2">
-            <a:schemeClr val="dk1"/>
-          </a:lnRef>
-          <a:fillRef idx="1">
-            <a:schemeClr val="lt1"/>
-          </a:fillRef>
-          <a:effectRef idx="0">
-            <a:schemeClr val="dk1"/>
-          </a:effectRef>
-          <a:fontRef idx="minor">
-            <a:schemeClr val="dk1"/>
-          </a:fontRef>
-        </p:style>
-        <p:txBody>
-          <a:bodyPr rtlCol="0" anchor="ctr"/>
-          <a:lstStyle/>
-          <a:p>
-            <a:r>
-              <a:rPr lang="en-GB" b="1" dirty="0"/>
-              <a:t>Value type </a:t>
-            </a:r>
-            <a:r>
-              <a:rPr lang="en-GB" dirty="0"/>
-              <a:t>Boolean</a:t>
-            </a:r>
-            <a:endParaRPr lang="en-GB" b="1" dirty="0"/>
-          </a:p>
-        </p:txBody>
-      </p:sp>
-      <p:sp>
-        <p:nvSpPr>
-          <p:cNvPr id="34" name="Rectangle 33">
-            <a:extLst>
-              <a:ext uri="{FF2B5EF4-FFF2-40B4-BE49-F238E27FC236}">
-                <a16:creationId xmlns:a16="http://schemas.microsoft.com/office/drawing/2014/main" id="{AA6A75AD-CF70-4D4A-9EFD-6599008DB162}"/>
-              </a:ext>
-            </a:extLst>
-          </p:cNvPr>
-          <p:cNvSpPr/>
-          <p:nvPr/>
-        </p:nvSpPr>
-        <p:spPr>
-          <a:xfrm>
-            <a:off x="8005537" y="2887453"/>
-            <a:ext cx="3251200" cy="288000"/>
-          </a:xfrm>
-          <a:prstGeom prst="rect">
-            <a:avLst/>
-          </a:prstGeom>
-          <a:ln>
-            <a:noFill/>
-            <a:headEnd type="none" w="med" len="med"/>
-            <a:tailEnd type="none" w="med" len="med"/>
-          </a:ln>
-        </p:spPr>
-        <p:style>
-          <a:lnRef idx="2">
-            <a:schemeClr val="dk1"/>
-          </a:lnRef>
-          <a:fillRef idx="1">
-            <a:schemeClr val="lt1"/>
-          </a:fillRef>
-          <a:effectRef idx="0">
-            <a:schemeClr val="dk1"/>
-          </a:effectRef>
-          <a:fontRef idx="minor">
-            <a:schemeClr val="dk1"/>
-          </a:fontRef>
-        </p:style>
-        <p:txBody>
-          <a:bodyPr rtlCol="0" anchor="ctr"/>
-          <a:lstStyle/>
-          <a:p>
-            <a:r>
-              <a:rPr lang="en-GB" b="1" dirty="0"/>
-              <a:t>Properties </a:t>
-            </a:r>
-            <a:r>
-              <a:rPr lang="en-GB" dirty="0"/>
-              <a:t>R | NOTIFY</a:t>
+              <a:t> NOTIFY</a:t>
             </a:r>
           </a:p>
         </p:txBody>
@@ -10801,6 +10537,36 @@
     <p:extLst>
       <p:ext uri="{BB962C8B-B14F-4D97-AF65-F5344CB8AC3E}">
         <p14:creationId xmlns:p14="http://schemas.microsoft.com/office/powerpoint/2010/main" val="1403131863"/>
+      </p:ext>
+    </p:extLst>
+  </p:cSld>
+  <p:clrMapOvr>
+    <a:masterClrMapping/>
+  </p:clrMapOvr>
+</p:sld>
+</file>
+
+<file path=ppt/slides/slide8.xml><?xml version="1.0" encoding="utf-8"?>
+<p:sld xmlns:a="http://schemas.openxmlformats.org/drawingml/2006/main" xmlns:r="http://schemas.openxmlformats.org/officeDocument/2006/relationships" xmlns:p="http://schemas.openxmlformats.org/presentationml/2006/main">
+  <p:cSld>
+    <p:spTree>
+      <p:nvGrpSpPr>
+        <p:cNvPr id="1" name=""/>
+        <p:cNvGrpSpPr/>
+        <p:nvPr/>
+      </p:nvGrpSpPr>
+      <p:grpSpPr>
+        <a:xfrm>
+          <a:off x="0" y="0"/>
+          <a:ext cx="0" cy="0"/>
+          <a:chOff x="0" y="0"/>
+          <a:chExt cx="0" cy="0"/>
+        </a:xfrm>
+      </p:grpSpPr>
+    </p:spTree>
+    <p:extLst>
+      <p:ext uri="{BB962C8B-B14F-4D97-AF65-F5344CB8AC3E}">
+        <p14:creationId xmlns:p14="http://schemas.microsoft.com/office/powerpoint/2010/main" val="1447422639"/>
       </p:ext>
     </p:extLst>
   </p:cSld>

</xml_diff>